<commit_message>
KMeans Graph Code and refactoring for individual nutrients
</commit_message>
<xml_diff>
--- a/Documentation/Mid Review/1MS18CS025_040_043_046.pptx
+++ b/Documentation/Mid Review/1MS18CS025_040_043_046.pptx
@@ -1,29 +1,29 @@
 
 <file path=ppt/presentation.xml><?xml version="1.0" encoding="utf-8"?>
-<p:presentation xmlns:a="http://schemas.openxmlformats.org/drawingml/2006/main" xmlns:r="http://schemas.openxmlformats.org/officeDocument/2006/relationships" xmlns:p="http://schemas.openxmlformats.org/presentationml/2006/main" showSpecialPlsOnTitleSld="0" saveSubsetFonts="1">
+<p:presentation xmlns:a="http://schemas.openxmlformats.org/drawingml/2006/main" xmlns:r="http://schemas.openxmlformats.org/officeDocument/2006/relationships" xmlns:p="http://schemas.openxmlformats.org/presentationml/2006/main" showSpecialPlsOnTitleSld="0">
   <p:sldMasterIdLst>
-    <p:sldMasterId id="2147483768" r:id="rId1"/>
+    <p:sldMasterId id="2147483648" r:id="rId1"/>
   </p:sldMasterIdLst>
   <p:notesMasterIdLst>
-    <p:notesMasterId r:id="rId18"/>
+    <p:notesMasterId r:id="rId9"/>
   </p:notesMasterIdLst>
   <p:sldIdLst>
-    <p:sldId id="411" r:id="rId2"/>
-    <p:sldId id="419" r:id="rId3"/>
-    <p:sldId id="415" r:id="rId4"/>
-    <p:sldId id="412" r:id="rId5"/>
-    <p:sldId id="420" r:id="rId6"/>
-    <p:sldId id="418" r:id="rId7"/>
-    <p:sldId id="423" r:id="rId8"/>
-    <p:sldId id="417" r:id="rId9"/>
-    <p:sldId id="416" r:id="rId10"/>
-    <p:sldId id="424" r:id="rId11"/>
-    <p:sldId id="425" r:id="rId12"/>
-    <p:sldId id="426" r:id="rId13"/>
-    <p:sldId id="427" r:id="rId14"/>
-    <p:sldId id="428" r:id="rId15"/>
-    <p:sldId id="429" r:id="rId16"/>
-    <p:sldId id="414" r:id="rId17"/>
+    <p:sldId id="411" r:id="rId3"/>
+    <p:sldId id="419" r:id="rId4"/>
+    <p:sldId id="415" r:id="rId5"/>
+    <p:sldId id="412" r:id="rId6"/>
+    <p:sldId id="420" r:id="rId7"/>
+    <p:sldId id="418" r:id="rId8"/>
+    <p:sldId id="423" r:id="rId10"/>
+    <p:sldId id="417" r:id="rId11"/>
+    <p:sldId id="416" r:id="rId12"/>
+    <p:sldId id="424" r:id="rId13"/>
+    <p:sldId id="425" r:id="rId14"/>
+    <p:sldId id="426" r:id="rId15"/>
+    <p:sldId id="427" r:id="rId16"/>
+    <p:sldId id="428" r:id="rId17"/>
+    <p:sldId id="429" r:id="rId18"/>
+    <p:sldId id="414" r:id="rId19"/>
   </p:sldIdLst>
   <p:sldSz cx="12192000" cy="6858000"/>
   <p:notesSz cx="6858000" cy="9144000"/>
@@ -122,22 +122,6 @@
       </a:defRPr>
     </a:lvl9pPr>
   </p:defaultTextStyle>
-  <p:extLst>
-    <p:ext uri="{EFAFB233-063F-42B5-8137-9DF3F51BA10A}">
-      <p15:sldGuideLst xmlns:p15="http://schemas.microsoft.com/office/powerpoint/2012/main">
-        <p15:guide id="1" orient="horz" pos="2160">
-          <p15:clr>
-            <a:srgbClr val="A4A3A4"/>
-          </p15:clr>
-        </p15:guide>
-        <p15:guide id="2" pos="3840">
-          <p15:clr>
-            <a:srgbClr val="A4A3A4"/>
-          </p15:clr>
-        </p15:guide>
-      </p15:sldGuideLst>
-    </p:ext>
-  </p:extLst>
 </p:presentation>
 </file>
 
@@ -223,8 +207,6 @@
           <a:p>
             <a:fld id="{5B2243F0-1FB2-41E4-961B-8CAB2AED1024}" type="datetimeFigureOut">
               <a:rPr lang="en-IN" smtClean="0"/>
-              <a:pPr/>
-              <a:t>15/05/22</a:t>
             </a:fld>
             <a:endParaRPr lang="en-IN"/>
           </a:p>
@@ -291,6 +273,7 @@
               <a:rPr lang="en-US"/>
               <a:t>Click to edit Master text styles</a:t>
             </a:r>
+            <a:endParaRPr lang="en-US"/>
           </a:p>
           <a:p>
             <a:pPr lvl="1"/>
@@ -298,6 +281,7 @@
               <a:rPr lang="en-US"/>
               <a:t>Second level</a:t>
             </a:r>
+            <a:endParaRPr lang="en-US"/>
           </a:p>
           <a:p>
             <a:pPr lvl="2"/>
@@ -305,6 +289,7 @@
               <a:rPr lang="en-US"/>
               <a:t>Third level</a:t>
             </a:r>
+            <a:endParaRPr lang="en-US"/>
           </a:p>
           <a:p>
             <a:pPr lvl="3"/>
@@ -312,6 +297,7 @@
               <a:rPr lang="en-US"/>
               <a:t>Fourth level</a:t>
             </a:r>
+            <a:endParaRPr lang="en-US"/>
           </a:p>
           <a:p>
             <a:pPr lvl="4"/>
@@ -383,19 +369,12 @@
           <a:p>
             <a:fld id="{0DF20133-9643-4EF8-94CA-FEF99B36DC3F}" type="slidenum">
               <a:rPr lang="en-IN" smtClean="0"/>
-              <a:pPr/>
-              <a:t>‹#›</a:t>
             </a:fld>
             <a:endParaRPr lang="en-IN"/>
           </a:p>
         </p:txBody>
       </p:sp>
     </p:spTree>
-    <p:extLst>
-      <p:ext uri="{BB962C8B-B14F-4D97-AF65-F5344CB8AC3E}">
-        <p14:creationId xmlns:p14="http://schemas.microsoft.com/office/powerpoint/2010/main" val="1244009194"/>
-      </p:ext>
-    </p:extLst>
   </p:cSld>
   <p:clrMap bg1="lt1" tx1="dk1" bg2="lt2" tx2="dk2" accent1="accent1" accent2="accent2" accent3="accent3" accent4="accent4" accent5="accent5" accent6="accent6" hlink="hlink" folHlink="folHlink"/>
   <p:notesStyle>
@@ -549,6 +528,15 @@
               </a:rPr>
               <a:t>Knowledge Base is driven by three ontologies: </a:t>
             </a:r>
+            <a:endParaRPr lang="en-IN" sz="1200" kern="1200" dirty="0">
+              <a:solidFill>
+                <a:schemeClr val="dk1"/>
+              </a:solidFill>
+              <a:effectLst/>
+              <a:latin typeface="Times New Roman" panose="02020603050405020304" pitchFamily="18" charset="0"/>
+              <a:ea typeface="+mn-ea"/>
+              <a:cs typeface="Times New Roman" panose="02020603050405020304" pitchFamily="18" charset="0"/>
+            </a:endParaRPr>
           </a:p>
           <a:p>
             <a:r>
@@ -575,6 +563,15 @@
               </a:rPr>
               <a:t>. the food ontology, 2) the user profile ontology, and 3) the HL7-based health screening ontology. These provide knowledge acquired from domain experts and the user’s health status to generate a personal diet plan.</a:t>
             </a:r>
+            <a:endParaRPr lang="en-IN" sz="1200" kern="1200" dirty="0">
+              <a:solidFill>
+                <a:schemeClr val="dk1"/>
+              </a:solidFill>
+              <a:effectLst/>
+              <a:latin typeface="Times New Roman" panose="02020603050405020304" pitchFamily="18" charset="0"/>
+              <a:ea typeface="+mn-ea"/>
+              <a:cs typeface="Times New Roman" panose="02020603050405020304" pitchFamily="18" charset="0"/>
+            </a:endParaRPr>
           </a:p>
           <a:p>
             <a:endParaRPr lang="en-US" dirty="0"/>
@@ -598,19 +595,12 @@
           <a:p>
             <a:fld id="{0DF20133-9643-4EF8-94CA-FEF99B36DC3F}" type="slidenum">
               <a:rPr lang="en-IN" smtClean="0"/>
-              <a:pPr/>
-              <a:t>6</a:t>
             </a:fld>
             <a:endParaRPr lang="en-IN"/>
           </a:p>
         </p:txBody>
       </p:sp>
     </p:spTree>
-    <p:extLst>
-      <p:ext uri="{BB962C8B-B14F-4D97-AF65-F5344CB8AC3E}">
-        <p14:creationId xmlns:p14="http://schemas.microsoft.com/office/powerpoint/2010/main" val="991797100"/>
-      </p:ext>
-    </p:extLst>
   </p:cSld>
   <p:clrMapOvr>
     <a:masterClrMapping/>
@@ -673,6 +663,10 @@
               </a:rPr>
               <a:t>The app will enable user to input information like their name, age, height, weight, diseases, medical history, nutritional preference, medications, allergies etc. </a:t>
             </a:r>
+            <a:endParaRPr lang="en-IN" sz="1200" dirty="0">
+              <a:latin typeface="Times New Roman" panose="02020603050405020304" pitchFamily="18" charset="0"/>
+              <a:cs typeface="Times New Roman" panose="02020603050405020304" pitchFamily="18" charset="0"/>
+            </a:endParaRPr>
           </a:p>
           <a:p>
             <a:pPr marL="342900" indent="-342900" algn="just">
@@ -686,6 +680,10 @@
               </a:rPr>
               <a:t>A user profile will be created and processed. The initial phase in the processing will be to take the nutritional preferences indicated by the user, as well as other information such as diseases, activity levels, and so on, and map these to information recorded from a database containing information about age-appropriate nutrition. This will result in a final set of nutritional values that the diet must meet for the specific user. </a:t>
             </a:r>
+            <a:endParaRPr lang="en-IN" sz="1200" dirty="0">
+              <a:latin typeface="Times New Roman" panose="02020603050405020304" pitchFamily="18" charset="0"/>
+              <a:cs typeface="Times New Roman" panose="02020603050405020304" pitchFamily="18" charset="0"/>
+            </a:endParaRPr>
           </a:p>
           <a:p>
             <a:pPr marL="342900" indent="-342900" algn="just">
@@ -699,6 +697,10 @@
               </a:rPr>
               <a:t>Using the Nutrition-Ingredient Data, the nutritional values would then be used to classify food groups (using a ML based classifier such as Random Forest), resulting in the food groups that should be included in the diet. </a:t>
             </a:r>
+            <a:endParaRPr lang="en-IN" sz="1200" dirty="0">
+              <a:latin typeface="Times New Roman" panose="02020603050405020304" pitchFamily="18" charset="0"/>
+              <a:cs typeface="Times New Roman" panose="02020603050405020304" pitchFamily="18" charset="0"/>
+            </a:endParaRPr>
           </a:p>
           <a:p>
             <a:pPr marL="342900" indent="-342900" algn="just">
@@ -712,6 +714,10 @@
               </a:rPr>
               <a:t>After taking into account the user's preferences, such as allergies and dislikes, a collection of ingredients will be developed that will be relevant for the recipe search.</a:t>
             </a:r>
+            <a:endParaRPr lang="en-IN" sz="1200" dirty="0">
+              <a:latin typeface="Times New Roman" panose="02020603050405020304" pitchFamily="18" charset="0"/>
+              <a:cs typeface="Times New Roman" panose="02020603050405020304" pitchFamily="18" charset="0"/>
+            </a:endParaRPr>
           </a:p>
           <a:p>
             <a:pPr algn="just"/>
@@ -742,19 +748,12 @@
           <a:p>
             <a:fld id="{0DF20133-9643-4EF8-94CA-FEF99B36DC3F}" type="slidenum">
               <a:rPr lang="en-IN" smtClean="0"/>
-              <a:pPr/>
-              <a:t>8</a:t>
             </a:fld>
             <a:endParaRPr lang="en-IN"/>
           </a:p>
         </p:txBody>
       </p:sp>
     </p:spTree>
-    <p:extLst>
-      <p:ext uri="{BB962C8B-B14F-4D97-AF65-F5344CB8AC3E}">
-        <p14:creationId xmlns:p14="http://schemas.microsoft.com/office/powerpoint/2010/main" val="3101139279"/>
-      </p:ext>
-    </p:extLst>
   </p:cSld>
   <p:clrMapOvr>
     <a:masterClrMapping/>
@@ -763,7 +762,7 @@
 </file>
 
 <file path=ppt/slideLayouts/slideLayout1.xml><?xml version="1.0" encoding="utf-8"?>
-<p:sldLayout xmlns:a="http://schemas.openxmlformats.org/drawingml/2006/main" xmlns:r="http://schemas.openxmlformats.org/officeDocument/2006/relationships" xmlns:p="http://schemas.openxmlformats.org/presentationml/2006/main" showMasterSp="0" type="title" preserve="1">
+<p:sldLayout xmlns:a="http://schemas.openxmlformats.org/drawingml/2006/main" xmlns:r="http://schemas.openxmlformats.org/officeDocument/2006/relationships" xmlns:p="http://schemas.openxmlformats.org/presentationml/2006/main" type="title" preserve="1" showMasterSp="0">
   <p:cSld name="Title Slide">
     <p:spTree>
       <p:nvGrpSpPr>
@@ -988,8 +987,6 @@
           <a:p>
             <a:fld id="{0CE1AAA1-5EED-45C1-A8CC-2692A48FCA5B}" type="datetime1">
               <a:rPr lang="en-IN" smtClean="0"/>
-              <a:pPr/>
-              <a:t>15/05/22</a:t>
             </a:fld>
             <a:endParaRPr lang="en-IN"/>
           </a:p>
@@ -1035,8 +1032,6 @@
           <a:p>
             <a:fld id="{1245FD78-8DE1-44B0-BD44-E067D054697C}" type="slidenum">
               <a:rPr lang="en-IN" smtClean="0"/>
-              <a:pPr/>
-              <a:t>‹#›</a:t>
             </a:fld>
             <a:endParaRPr lang="en-IN"/>
           </a:p>
@@ -1082,13 +1077,7 @@
       </p:cxnSp>
       <p:pic>
         <p:nvPicPr>
-          <p:cNvPr id="11" name="Picture 2" descr="C:\Users\Srinidhi\Desktop\logo.png">
-            <a:extLst>
-              <a:ext uri="{FF2B5EF4-FFF2-40B4-BE49-F238E27FC236}">
-                <a16:creationId xmlns:a16="http://schemas.microsoft.com/office/drawing/2014/main" id="{C728CEA0-BA7F-4BA3-B201-6B7A8B3DF1C4}"/>
-              </a:ext>
-            </a:extLst>
-          </p:cNvPr>
+          <p:cNvPr id="11" name="Picture 2" descr="C:\Users\Srinidhi\Desktop\logo.png"/>
           <p:cNvPicPr>
             <a:picLocks noChangeAspect="1" noChangeArrowheads="1"/>
           </p:cNvPicPr>
@@ -1113,20 +1102,10 @@
         </p:spPr>
       </p:pic>
     </p:spTree>
-    <p:extLst>
-      <p:ext uri="{BB962C8B-B14F-4D97-AF65-F5344CB8AC3E}">
-        <p14:creationId xmlns:p14="http://schemas.microsoft.com/office/powerpoint/2010/main" val="3847805206"/>
-      </p:ext>
-    </p:extLst>
   </p:cSld>
   <p:clrMapOvr>
     <a:masterClrMapping/>
   </p:clrMapOvr>
-  <p:extLst>
-    <p:ext uri="{DCECCB84-F9BA-43D5-87BE-67443E8EF086}">
-      <p15:sldGuideLst xmlns:p15="http://schemas.microsoft.com/office/powerpoint/2012/main"/>
-    </p:ext>
-  </p:extLst>
 </p:sldLayout>
 </file>
 
@@ -1190,6 +1169,7 @@
               <a:rPr lang="en-US"/>
               <a:t>Click to edit Master text styles</a:t>
             </a:r>
+            <a:endParaRPr lang="en-US"/>
           </a:p>
           <a:p>
             <a:pPr lvl="1"/>
@@ -1197,6 +1177,7 @@
               <a:rPr lang="en-US"/>
               <a:t>Second level</a:t>
             </a:r>
+            <a:endParaRPr lang="en-US"/>
           </a:p>
           <a:p>
             <a:pPr lvl="2"/>
@@ -1204,6 +1185,7 @@
               <a:rPr lang="en-US"/>
               <a:t>Third level</a:t>
             </a:r>
+            <a:endParaRPr lang="en-US"/>
           </a:p>
           <a:p>
             <a:pPr lvl="3"/>
@@ -1211,6 +1193,7 @@
               <a:rPr lang="en-US"/>
               <a:t>Fourth level</a:t>
             </a:r>
+            <a:endParaRPr lang="en-US"/>
           </a:p>
           <a:p>
             <a:pPr lvl="4"/>
@@ -1239,8 +1222,6 @@
           <a:p>
             <a:fld id="{46586A9F-105A-45FD-A610-F581EBE318E5}" type="datetime1">
               <a:rPr lang="en-IN" smtClean="0"/>
-              <a:pPr/>
-              <a:t>15/05/22</a:t>
             </a:fld>
             <a:endParaRPr lang="en-IN"/>
           </a:p>
@@ -1286,8 +1267,6 @@
           <a:p>
             <a:fld id="{1245FD78-8DE1-44B0-BD44-E067D054697C}" type="slidenum">
               <a:rPr lang="en-IN" smtClean="0"/>
-              <a:pPr/>
-              <a:t>‹#›</a:t>
             </a:fld>
             <a:endParaRPr lang="en-IN"/>
           </a:p>
@@ -1295,13 +1274,7 @@
       </p:sp>
       <p:pic>
         <p:nvPicPr>
-          <p:cNvPr id="8" name="Picture 2" descr="C:\Users\Srinidhi\Desktop\logo.png">
-            <a:extLst>
-              <a:ext uri="{FF2B5EF4-FFF2-40B4-BE49-F238E27FC236}">
-                <a16:creationId xmlns:a16="http://schemas.microsoft.com/office/drawing/2014/main" id="{2BFF8954-070D-4352-AC3E-DD7D500D0A59}"/>
-              </a:ext>
-            </a:extLst>
-          </p:cNvPr>
+          <p:cNvPr id="8" name="Picture 2" descr="C:\Users\Srinidhi\Desktop\logo.png"/>
           <p:cNvPicPr>
             <a:picLocks noChangeAspect="1" noChangeArrowheads="1"/>
           </p:cNvPicPr>
@@ -1326,11 +1299,6 @@
         </p:spPr>
       </p:pic>
     </p:spTree>
-    <p:extLst>
-      <p:ext uri="{BB962C8B-B14F-4D97-AF65-F5344CB8AC3E}">
-        <p14:creationId xmlns:p14="http://schemas.microsoft.com/office/powerpoint/2010/main" val="3266751040"/>
-      </p:ext>
-    </p:extLst>
   </p:cSld>
   <p:clrMapOvr>
     <a:masterClrMapping/>
@@ -1339,7 +1307,7 @@
 </file>
 
 <file path=ppt/slideLayouts/slideLayout11.xml><?xml version="1.0" encoding="utf-8"?>
-<p:sldLayout xmlns:a="http://schemas.openxmlformats.org/drawingml/2006/main" xmlns:r="http://schemas.openxmlformats.org/officeDocument/2006/relationships" xmlns:p="http://schemas.openxmlformats.org/presentationml/2006/main" showMasterSp="0" type="vertTitleAndTx" preserve="1">
+<p:sldLayout xmlns:a="http://schemas.openxmlformats.org/drawingml/2006/main" xmlns:r="http://schemas.openxmlformats.org/officeDocument/2006/relationships" xmlns:p="http://schemas.openxmlformats.org/presentationml/2006/main" type="vertTitleAndTx" preserve="1" showMasterSp="0">
   <p:cSld name="Vertical Title and Text">
     <p:spTree>
       <p:nvGrpSpPr>
@@ -1484,6 +1452,7 @@
               <a:rPr lang="en-US"/>
               <a:t>Click to edit Master text styles</a:t>
             </a:r>
+            <a:endParaRPr lang="en-US"/>
           </a:p>
           <a:p>
             <a:pPr lvl="1"/>
@@ -1491,6 +1460,7 @@
               <a:rPr lang="en-US"/>
               <a:t>Second level</a:t>
             </a:r>
+            <a:endParaRPr lang="en-US"/>
           </a:p>
           <a:p>
             <a:pPr lvl="2"/>
@@ -1498,6 +1468,7 @@
               <a:rPr lang="en-US"/>
               <a:t>Third level</a:t>
             </a:r>
+            <a:endParaRPr lang="en-US"/>
           </a:p>
           <a:p>
             <a:pPr lvl="3"/>
@@ -1505,6 +1476,7 @@
               <a:rPr lang="en-US"/>
               <a:t>Fourth level</a:t>
             </a:r>
+            <a:endParaRPr lang="en-US"/>
           </a:p>
           <a:p>
             <a:pPr lvl="4"/>
@@ -1533,8 +1505,6 @@
           <a:p>
             <a:fld id="{203556EE-BA75-4293-9005-9A3AC5F963A1}" type="datetime1">
               <a:rPr lang="en-IN" smtClean="0"/>
-              <a:pPr/>
-              <a:t>15/05/22</a:t>
             </a:fld>
             <a:endParaRPr lang="en-IN"/>
           </a:p>
@@ -1580,8 +1550,6 @@
           <a:p>
             <a:fld id="{1245FD78-8DE1-44B0-BD44-E067D054697C}" type="slidenum">
               <a:rPr lang="en-IN" smtClean="0"/>
-              <a:pPr/>
-              <a:t>‹#›</a:t>
             </a:fld>
             <a:endParaRPr lang="en-IN"/>
           </a:p>
@@ -1589,13 +1557,7 @@
       </p:sp>
       <p:pic>
         <p:nvPicPr>
-          <p:cNvPr id="10" name="Picture 2" descr="C:\Users\Srinidhi\Desktop\logo.png">
-            <a:extLst>
-              <a:ext uri="{FF2B5EF4-FFF2-40B4-BE49-F238E27FC236}">
-                <a16:creationId xmlns:a16="http://schemas.microsoft.com/office/drawing/2014/main" id="{F8681246-1AFA-47C1-8723-E212F3BD6963}"/>
-              </a:ext>
-            </a:extLst>
-          </p:cNvPr>
+          <p:cNvPr id="10" name="Picture 2" descr="C:\Users\Srinidhi\Desktop\logo.png"/>
           <p:cNvPicPr>
             <a:picLocks noChangeAspect="1" noChangeArrowheads="1"/>
           </p:cNvPicPr>
@@ -1620,11 +1582,6 @@
         </p:spPr>
       </p:pic>
     </p:spTree>
-    <p:extLst>
-      <p:ext uri="{BB962C8B-B14F-4D97-AF65-F5344CB8AC3E}">
-        <p14:creationId xmlns:p14="http://schemas.microsoft.com/office/powerpoint/2010/main" val="1165883158"/>
-      </p:ext>
-    </p:extLst>
   </p:cSld>
   <p:clrMapOvr>
     <a:masterClrMapping/>
@@ -1696,6 +1653,7 @@
               <a:rPr lang="en-US"/>
               <a:t>Click to edit Master text styles</a:t>
             </a:r>
+            <a:endParaRPr lang="en-US"/>
           </a:p>
           <a:p>
             <a:pPr lvl="1"/>
@@ -1703,6 +1661,7 @@
               <a:rPr lang="en-US"/>
               <a:t>Second level</a:t>
             </a:r>
+            <a:endParaRPr lang="en-US"/>
           </a:p>
           <a:p>
             <a:pPr lvl="2"/>
@@ -1710,6 +1669,7 @@
               <a:rPr lang="en-US"/>
               <a:t>Third level</a:t>
             </a:r>
+            <a:endParaRPr lang="en-US"/>
           </a:p>
           <a:p>
             <a:pPr lvl="3"/>
@@ -1717,6 +1677,7 @@
               <a:rPr lang="en-US"/>
               <a:t>Fourth level</a:t>
             </a:r>
+            <a:endParaRPr lang="en-US"/>
           </a:p>
           <a:p>
             <a:pPr lvl="4"/>
@@ -1745,8 +1706,6 @@
           <a:p>
             <a:fld id="{7B408FE0-85C4-4B5E-8D92-47082CCA6BB8}" type="datetime1">
               <a:rPr lang="en-IN" smtClean="0"/>
-              <a:pPr/>
-              <a:t>15/05/22</a:t>
             </a:fld>
             <a:endParaRPr lang="en-IN"/>
           </a:p>
@@ -1792,8 +1751,6 @@
           <a:p>
             <a:fld id="{1245FD78-8DE1-44B0-BD44-E067D054697C}" type="slidenum">
               <a:rPr lang="en-IN" smtClean="0"/>
-              <a:pPr/>
-              <a:t>‹#›</a:t>
             </a:fld>
             <a:endParaRPr lang="en-IN"/>
           </a:p>
@@ -1801,13 +1758,7 @@
       </p:sp>
       <p:pic>
         <p:nvPicPr>
-          <p:cNvPr id="8" name="Picture 2" descr="C:\Users\Srinidhi\Desktop\logo.png">
-            <a:extLst>
-              <a:ext uri="{FF2B5EF4-FFF2-40B4-BE49-F238E27FC236}">
-                <a16:creationId xmlns:a16="http://schemas.microsoft.com/office/drawing/2014/main" id="{5E2C67C7-C385-4A44-A78F-D95F8B32544D}"/>
-              </a:ext>
-            </a:extLst>
-          </p:cNvPr>
+          <p:cNvPr id="8" name="Picture 2" descr="C:\Users\Srinidhi\Desktop\logo.png"/>
           <p:cNvPicPr>
             <a:picLocks noChangeAspect="1" noChangeArrowheads="1"/>
           </p:cNvPicPr>
@@ -1832,11 +1783,6 @@
         </p:spPr>
       </p:pic>
     </p:spTree>
-    <p:extLst>
-      <p:ext uri="{BB962C8B-B14F-4D97-AF65-F5344CB8AC3E}">
-        <p14:creationId xmlns:p14="http://schemas.microsoft.com/office/powerpoint/2010/main" val="3780929100"/>
-      </p:ext>
-    </p:extLst>
   </p:cSld>
   <p:clrMapOvr>
     <a:masterClrMapping/>
@@ -1845,7 +1791,7 @@
 </file>
 
 <file path=ppt/slideLayouts/slideLayout3.xml><?xml version="1.0" encoding="utf-8"?>
-<p:sldLayout xmlns:a="http://schemas.openxmlformats.org/drawingml/2006/main" xmlns:r="http://schemas.openxmlformats.org/officeDocument/2006/relationships" xmlns:p="http://schemas.openxmlformats.org/presentationml/2006/main" showMasterSp="0" type="secHead" preserve="1">
+<p:sldLayout xmlns:a="http://schemas.openxmlformats.org/drawingml/2006/main" xmlns:r="http://schemas.openxmlformats.org/officeDocument/2006/relationships" xmlns:p="http://schemas.openxmlformats.org/presentationml/2006/main" type="secHead" preserve="1" showMasterSp="0">
   <p:cSld name="Section Header">
     <p:bg>
       <p:bgPr>
@@ -2106,6 +2052,7 @@
               <a:rPr lang="en-US"/>
               <a:t>Click to edit Master text styles</a:t>
             </a:r>
+            <a:endParaRPr lang="en-US"/>
           </a:p>
         </p:txBody>
       </p:sp>
@@ -2126,8 +2073,6 @@
           <a:p>
             <a:fld id="{02C4F4C7-2495-43FA-A051-996DC06F529F}" type="datetime1">
               <a:rPr lang="en-IN" smtClean="0"/>
-              <a:pPr/>
-              <a:t>15/05/22</a:t>
             </a:fld>
             <a:endParaRPr lang="en-IN"/>
           </a:p>
@@ -2173,8 +2118,6 @@
           <a:p>
             <a:fld id="{1245FD78-8DE1-44B0-BD44-E067D054697C}" type="slidenum">
               <a:rPr lang="en-IN" smtClean="0"/>
-              <a:pPr/>
-              <a:t>‹#›</a:t>
             </a:fld>
             <a:endParaRPr lang="en-IN"/>
           </a:p>
@@ -2220,13 +2163,7 @@
       </p:cxnSp>
       <p:pic>
         <p:nvPicPr>
-          <p:cNvPr id="11" name="Picture 2" descr="C:\Users\Srinidhi\Desktop\logo.png">
-            <a:extLst>
-              <a:ext uri="{FF2B5EF4-FFF2-40B4-BE49-F238E27FC236}">
-                <a16:creationId xmlns:a16="http://schemas.microsoft.com/office/drawing/2014/main" id="{6E4AAF7F-3876-4F6B-8901-E7673BBFDB22}"/>
-              </a:ext>
-            </a:extLst>
-          </p:cNvPr>
+          <p:cNvPr id="11" name="Picture 2" descr="C:\Users\Srinidhi\Desktop\logo.png"/>
           <p:cNvPicPr>
             <a:picLocks noChangeAspect="1" noChangeArrowheads="1"/>
           </p:cNvPicPr>
@@ -2251,11 +2188,6 @@
         </p:spPr>
       </p:pic>
     </p:spTree>
-    <p:extLst>
-      <p:ext uri="{BB962C8B-B14F-4D97-AF65-F5344CB8AC3E}">
-        <p14:creationId xmlns:p14="http://schemas.microsoft.com/office/powerpoint/2010/main" val="1897998160"/>
-      </p:ext>
-    </p:extLst>
   </p:cSld>
   <p:clrMapOvr>
     <a:masterClrMapping/>
@@ -2333,6 +2265,7 @@
               <a:rPr lang="en-US"/>
               <a:t>Click to edit Master text styles</a:t>
             </a:r>
+            <a:endParaRPr lang="en-US"/>
           </a:p>
           <a:p>
             <a:pPr lvl="1"/>
@@ -2340,6 +2273,7 @@
               <a:rPr lang="en-US"/>
               <a:t>Second level</a:t>
             </a:r>
+            <a:endParaRPr lang="en-US"/>
           </a:p>
           <a:p>
             <a:pPr lvl="2"/>
@@ -2347,6 +2281,7 @@
               <a:rPr lang="en-US"/>
               <a:t>Third level</a:t>
             </a:r>
+            <a:endParaRPr lang="en-US"/>
           </a:p>
           <a:p>
             <a:pPr lvl="3"/>
@@ -2354,6 +2289,7 @@
               <a:rPr lang="en-US"/>
               <a:t>Fourth level</a:t>
             </a:r>
+            <a:endParaRPr lang="en-US"/>
           </a:p>
           <a:p>
             <a:pPr lvl="4"/>
@@ -2390,6 +2326,7 @@
               <a:rPr lang="en-US"/>
               <a:t>Click to edit Master text styles</a:t>
             </a:r>
+            <a:endParaRPr lang="en-US"/>
           </a:p>
           <a:p>
             <a:pPr lvl="1"/>
@@ -2397,6 +2334,7 @@
               <a:rPr lang="en-US"/>
               <a:t>Second level</a:t>
             </a:r>
+            <a:endParaRPr lang="en-US"/>
           </a:p>
           <a:p>
             <a:pPr lvl="2"/>
@@ -2404,6 +2342,7 @@
               <a:rPr lang="en-US"/>
               <a:t>Third level</a:t>
             </a:r>
+            <a:endParaRPr lang="en-US"/>
           </a:p>
           <a:p>
             <a:pPr lvl="3"/>
@@ -2411,6 +2350,7 @@
               <a:rPr lang="en-US"/>
               <a:t>Fourth level</a:t>
             </a:r>
+            <a:endParaRPr lang="en-US"/>
           </a:p>
           <a:p>
             <a:pPr lvl="4"/>
@@ -2439,8 +2379,6 @@
           <a:p>
             <a:fld id="{3562AB57-2563-4C1E-AACE-ECD6AF9D6338}" type="datetime1">
               <a:rPr lang="en-IN" smtClean="0"/>
-              <a:pPr/>
-              <a:t>15/05/22</a:t>
             </a:fld>
             <a:endParaRPr lang="en-IN"/>
           </a:p>
@@ -2486,8 +2424,6 @@
           <a:p>
             <a:fld id="{1245FD78-8DE1-44B0-BD44-E067D054697C}" type="slidenum">
               <a:rPr lang="en-IN" smtClean="0"/>
-              <a:pPr/>
-              <a:t>‹#›</a:t>
             </a:fld>
             <a:endParaRPr lang="en-IN"/>
           </a:p>
@@ -2495,13 +2431,7 @@
       </p:sp>
       <p:pic>
         <p:nvPicPr>
-          <p:cNvPr id="2" name="Picture 2" descr="C:\Users\Srinidhi\Desktop\logo.png">
-            <a:extLst>
-              <a:ext uri="{FF2B5EF4-FFF2-40B4-BE49-F238E27FC236}">
-                <a16:creationId xmlns:a16="http://schemas.microsoft.com/office/drawing/2014/main" id="{EF3C39C1-9BAB-4C45-A144-CF8BF2E72B4B}"/>
-              </a:ext>
-            </a:extLst>
-          </p:cNvPr>
+          <p:cNvPr id="2" name="Picture 2" descr="C:\Users\Srinidhi\Desktop\logo.png"/>
           <p:cNvPicPr>
             <a:picLocks noChangeAspect="1" noChangeArrowheads="1"/>
           </p:cNvPicPr>
@@ -2526,11 +2456,6 @@
         </p:spPr>
       </p:pic>
     </p:spTree>
-    <p:extLst>
-      <p:ext uri="{BB962C8B-B14F-4D97-AF65-F5344CB8AC3E}">
-        <p14:creationId xmlns:p14="http://schemas.microsoft.com/office/powerpoint/2010/main" val="923447375"/>
-      </p:ext>
-    </p:extLst>
   </p:cSld>
   <p:clrMapOvr>
     <a:masterClrMapping/>
@@ -2651,6 +2576,7 @@
               <a:rPr lang="en-US"/>
               <a:t>Click to edit Master text styles</a:t>
             </a:r>
+            <a:endParaRPr lang="en-US"/>
           </a:p>
         </p:txBody>
       </p:sp>
@@ -2679,6 +2605,7 @@
               <a:rPr lang="en-US"/>
               <a:t>Click to edit Master text styles</a:t>
             </a:r>
+            <a:endParaRPr lang="en-US"/>
           </a:p>
           <a:p>
             <a:pPr lvl="1"/>
@@ -2686,6 +2613,7 @@
               <a:rPr lang="en-US"/>
               <a:t>Second level</a:t>
             </a:r>
+            <a:endParaRPr lang="en-US"/>
           </a:p>
           <a:p>
             <a:pPr lvl="2"/>
@@ -2693,6 +2621,7 @@
               <a:rPr lang="en-US"/>
               <a:t>Third level</a:t>
             </a:r>
+            <a:endParaRPr lang="en-US"/>
           </a:p>
           <a:p>
             <a:pPr lvl="3"/>
@@ -2700,6 +2629,7 @@
               <a:rPr lang="en-US"/>
               <a:t>Fourth level</a:t>
             </a:r>
+            <a:endParaRPr lang="en-US"/>
           </a:p>
           <a:p>
             <a:pPr lvl="4"/>
@@ -2779,6 +2709,7 @@
               <a:rPr lang="en-US"/>
               <a:t>Click to edit Master text styles</a:t>
             </a:r>
+            <a:endParaRPr lang="en-US"/>
           </a:p>
         </p:txBody>
       </p:sp>
@@ -2807,6 +2738,7 @@
               <a:rPr lang="en-US"/>
               <a:t>Click to edit Master text styles</a:t>
             </a:r>
+            <a:endParaRPr lang="en-US"/>
           </a:p>
           <a:p>
             <a:pPr lvl="1"/>
@@ -2814,6 +2746,7 @@
               <a:rPr lang="en-US"/>
               <a:t>Second level</a:t>
             </a:r>
+            <a:endParaRPr lang="en-US"/>
           </a:p>
           <a:p>
             <a:pPr lvl="2"/>
@@ -2821,6 +2754,7 @@
               <a:rPr lang="en-US"/>
               <a:t>Third level</a:t>
             </a:r>
+            <a:endParaRPr lang="en-US"/>
           </a:p>
           <a:p>
             <a:pPr lvl="3"/>
@@ -2828,6 +2762,7 @@
               <a:rPr lang="en-US"/>
               <a:t>Fourth level</a:t>
             </a:r>
+            <a:endParaRPr lang="en-US"/>
           </a:p>
           <a:p>
             <a:pPr lvl="4"/>
@@ -2856,8 +2791,6 @@
           <a:p>
             <a:fld id="{491E361E-13EA-4D71-AB87-006735CEC8A3}" type="datetime1">
               <a:rPr lang="en-IN" smtClean="0"/>
-              <a:pPr/>
-              <a:t>15/05/22</a:t>
             </a:fld>
             <a:endParaRPr lang="en-IN"/>
           </a:p>
@@ -2903,8 +2836,6 @@
           <a:p>
             <a:fld id="{1245FD78-8DE1-44B0-BD44-E067D054697C}" type="slidenum">
               <a:rPr lang="en-IN" smtClean="0"/>
-              <a:pPr/>
-              <a:t>‹#›</a:t>
             </a:fld>
             <a:endParaRPr lang="en-IN"/>
           </a:p>
@@ -2912,13 +2843,7 @@
       </p:sp>
       <p:pic>
         <p:nvPicPr>
-          <p:cNvPr id="2" name="Picture 2" descr="C:\Users\Srinidhi\Desktop\logo.png">
-            <a:extLst>
-              <a:ext uri="{FF2B5EF4-FFF2-40B4-BE49-F238E27FC236}">
-                <a16:creationId xmlns:a16="http://schemas.microsoft.com/office/drawing/2014/main" id="{1B300F68-EEC8-479F-89B4-B66DB0F421A6}"/>
-              </a:ext>
-            </a:extLst>
-          </p:cNvPr>
+          <p:cNvPr id="2" name="Picture 2" descr="C:\Users\Srinidhi\Desktop\logo.png"/>
           <p:cNvPicPr>
             <a:picLocks noChangeAspect="1" noChangeArrowheads="1"/>
           </p:cNvPicPr>
@@ -2943,11 +2868,6 @@
         </p:spPr>
       </p:pic>
     </p:spTree>
-    <p:extLst>
-      <p:ext uri="{BB962C8B-B14F-4D97-AF65-F5344CB8AC3E}">
-        <p14:creationId xmlns:p14="http://schemas.microsoft.com/office/powerpoint/2010/main" val="2908109091"/>
-      </p:ext>
-    </p:extLst>
   </p:cSld>
   <p:clrMapOvr>
     <a:masterClrMapping/>
@@ -3012,8 +2932,6 @@
           <a:p>
             <a:fld id="{48E433A5-CDF5-414D-BB2C-C9DF07A7F631}" type="datetime1">
               <a:rPr lang="en-IN" smtClean="0"/>
-              <a:pPr/>
-              <a:t>15/05/22</a:t>
             </a:fld>
             <a:endParaRPr lang="en-IN"/>
           </a:p>
@@ -3059,8 +2977,6 @@
           <a:p>
             <a:fld id="{1245FD78-8DE1-44B0-BD44-E067D054697C}" type="slidenum">
               <a:rPr lang="en-IN" smtClean="0"/>
-              <a:pPr/>
-              <a:t>‹#›</a:t>
             </a:fld>
             <a:endParaRPr lang="en-IN"/>
           </a:p>
@@ -3068,13 +2984,7 @@
       </p:sp>
       <p:pic>
         <p:nvPicPr>
-          <p:cNvPr id="7" name="Picture 2" descr="C:\Users\Srinidhi\Desktop\logo.png">
-            <a:extLst>
-              <a:ext uri="{FF2B5EF4-FFF2-40B4-BE49-F238E27FC236}">
-                <a16:creationId xmlns:a16="http://schemas.microsoft.com/office/drawing/2014/main" id="{6720B71A-9CF9-4970-96CA-352F2D5F33C5}"/>
-              </a:ext>
-            </a:extLst>
-          </p:cNvPr>
+          <p:cNvPr id="7" name="Picture 2" descr="C:\Users\Srinidhi\Desktop\logo.png"/>
           <p:cNvPicPr>
             <a:picLocks noChangeAspect="1" noChangeArrowheads="1"/>
           </p:cNvPicPr>
@@ -3099,11 +3009,6 @@
         </p:spPr>
       </p:pic>
     </p:spTree>
-    <p:extLst>
-      <p:ext uri="{BB962C8B-B14F-4D97-AF65-F5344CB8AC3E}">
-        <p14:creationId xmlns:p14="http://schemas.microsoft.com/office/powerpoint/2010/main" val="676499241"/>
-      </p:ext>
-    </p:extLst>
   </p:cSld>
   <p:clrMapOvr>
     <a:masterClrMapping/>
@@ -3112,7 +3017,7 @@
 </file>
 
 <file path=ppt/slideLayouts/slideLayout7.xml><?xml version="1.0" encoding="utf-8"?>
-<p:sldLayout xmlns:a="http://schemas.openxmlformats.org/drawingml/2006/main" xmlns:r="http://schemas.openxmlformats.org/officeDocument/2006/relationships" xmlns:p="http://schemas.openxmlformats.org/presentationml/2006/main" showMasterSp="0" type="blank" preserve="1">
+<p:sldLayout xmlns:a="http://schemas.openxmlformats.org/drawingml/2006/main" xmlns:r="http://schemas.openxmlformats.org/officeDocument/2006/relationships" xmlns:p="http://schemas.openxmlformats.org/presentationml/2006/main" type="blank" preserve="1" showMasterSp="0">
   <p:cSld name="Blank">
     <p:spTree>
       <p:nvGrpSpPr>
@@ -3221,8 +3126,6 @@
           <a:p>
             <a:fld id="{68C89EB3-2841-4B74-BD08-6FDA6A2C0AA5}" type="datetime1">
               <a:rPr lang="en-IN" smtClean="0"/>
-              <a:pPr/>
-              <a:t>15/05/22</a:t>
             </a:fld>
             <a:endParaRPr lang="en-IN"/>
           </a:p>
@@ -3276,8 +3179,6 @@
           <a:p>
             <a:fld id="{1245FD78-8DE1-44B0-BD44-E067D054697C}" type="slidenum">
               <a:rPr lang="en-IN" smtClean="0"/>
-              <a:pPr/>
-              <a:t>‹#›</a:t>
             </a:fld>
             <a:endParaRPr lang="en-IN"/>
           </a:p>
@@ -3285,13 +3186,7 @@
       </p:sp>
       <p:pic>
         <p:nvPicPr>
-          <p:cNvPr id="2" name="Picture 2" descr="C:\Users\Srinidhi\Desktop\logo.png">
-            <a:extLst>
-              <a:ext uri="{FF2B5EF4-FFF2-40B4-BE49-F238E27FC236}">
-                <a16:creationId xmlns:a16="http://schemas.microsoft.com/office/drawing/2014/main" id="{7393EDB9-65C6-42AA-B582-C92413F0DE59}"/>
-              </a:ext>
-            </a:extLst>
-          </p:cNvPr>
+          <p:cNvPr id="2" name="Picture 2" descr="C:\Users\Srinidhi\Desktop\logo.png"/>
           <p:cNvPicPr>
             <a:picLocks noChangeAspect="1" noChangeArrowheads="1"/>
           </p:cNvPicPr>
@@ -3316,25 +3211,15 @@
         </p:spPr>
       </p:pic>
     </p:spTree>
-    <p:extLst>
-      <p:ext uri="{BB962C8B-B14F-4D97-AF65-F5344CB8AC3E}">
-        <p14:creationId xmlns:p14="http://schemas.microsoft.com/office/powerpoint/2010/main" val="2740474254"/>
-      </p:ext>
-    </p:extLst>
   </p:cSld>
   <p:clrMapOvr>
     <a:masterClrMapping/>
   </p:clrMapOvr>
-  <p:extLst>
-    <p:ext uri="{DCECCB84-F9BA-43D5-87BE-67443E8EF086}">
-      <p15:sldGuideLst xmlns:p15="http://schemas.microsoft.com/office/powerpoint/2012/main"/>
-    </p:ext>
-  </p:extLst>
 </p:sldLayout>
 </file>
 
 <file path=ppt/slideLayouts/slideLayout8.xml><?xml version="1.0" encoding="utf-8"?>
-<p:sldLayout xmlns:a="http://schemas.openxmlformats.org/drawingml/2006/main" xmlns:r="http://schemas.openxmlformats.org/officeDocument/2006/relationships" xmlns:p="http://schemas.openxmlformats.org/presentationml/2006/main" showMasterSp="0" type="objTx" preserve="1">
+<p:sldLayout xmlns:a="http://schemas.openxmlformats.org/drawingml/2006/main" xmlns:r="http://schemas.openxmlformats.org/officeDocument/2006/relationships" xmlns:p="http://schemas.openxmlformats.org/presentationml/2006/main" type="objTx" preserve="1" showMasterSp="0">
   <p:cSld name="Content with Caption">
     <p:spTree>
       <p:nvGrpSpPr>
@@ -3489,6 +3374,7 @@
               <a:rPr lang="en-US"/>
               <a:t>Click to edit Master text styles</a:t>
             </a:r>
+            <a:endParaRPr lang="en-US"/>
           </a:p>
           <a:p>
             <a:pPr lvl="1"/>
@@ -3496,6 +3382,7 @@
               <a:rPr lang="en-US"/>
               <a:t>Second level</a:t>
             </a:r>
+            <a:endParaRPr lang="en-US"/>
           </a:p>
           <a:p>
             <a:pPr lvl="2"/>
@@ -3503,6 +3390,7 @@
               <a:rPr lang="en-US"/>
               <a:t>Third level</a:t>
             </a:r>
+            <a:endParaRPr lang="en-US"/>
           </a:p>
           <a:p>
             <a:pPr lvl="3"/>
@@ -3510,6 +3398,7 @@
               <a:rPr lang="en-US"/>
               <a:t>Fourth level</a:t>
             </a:r>
+            <a:endParaRPr lang="en-US"/>
           </a:p>
           <a:p>
             <a:pPr lvl="4"/>
@@ -3589,6 +3478,7 @@
               <a:rPr lang="en-US"/>
               <a:t>Click to edit Master text styles</a:t>
             </a:r>
+            <a:endParaRPr lang="en-US"/>
           </a:p>
         </p:txBody>
       </p:sp>
@@ -3618,8 +3508,6 @@
           <a:p>
             <a:fld id="{861A98C1-704E-4145-A2C8-692D73D56B98}" type="datetime1">
               <a:rPr lang="en-IN" smtClean="0"/>
-              <a:pPr/>
-              <a:t>15/05/22</a:t>
             </a:fld>
             <a:endParaRPr lang="en-IN"/>
           </a:p>
@@ -3686,8 +3574,6 @@
           <a:p>
             <a:fld id="{1245FD78-8DE1-44B0-BD44-E067D054697C}" type="slidenum">
               <a:rPr lang="en-IN" smtClean="0"/>
-              <a:pPr/>
-              <a:t>‹#›</a:t>
             </a:fld>
             <a:endParaRPr lang="en-IN"/>
           </a:p>
@@ -3695,13 +3581,7 @@
       </p:sp>
       <p:pic>
         <p:nvPicPr>
-          <p:cNvPr id="11" name="Picture 2" descr="C:\Users\Srinidhi\Desktop\logo.png">
-            <a:extLst>
-              <a:ext uri="{FF2B5EF4-FFF2-40B4-BE49-F238E27FC236}">
-                <a16:creationId xmlns:a16="http://schemas.microsoft.com/office/drawing/2014/main" id="{6BF8E43F-406B-489A-A07B-CBBB6CD8B66C}"/>
-              </a:ext>
-            </a:extLst>
-          </p:cNvPr>
+          <p:cNvPr id="11" name="Picture 2" descr="C:\Users\Srinidhi\Desktop\logo.png"/>
           <p:cNvPicPr>
             <a:picLocks noChangeAspect="1" noChangeArrowheads="1"/>
           </p:cNvPicPr>
@@ -3726,25 +3606,15 @@
         </p:spPr>
       </p:pic>
     </p:spTree>
-    <p:extLst>
-      <p:ext uri="{BB962C8B-B14F-4D97-AF65-F5344CB8AC3E}">
-        <p14:creationId xmlns:p14="http://schemas.microsoft.com/office/powerpoint/2010/main" val="823331611"/>
-      </p:ext>
-    </p:extLst>
   </p:cSld>
   <p:clrMapOvr>
     <a:masterClrMapping/>
   </p:clrMapOvr>
-  <p:extLst>
-    <p:ext uri="{DCECCB84-F9BA-43D5-87BE-67443E8EF086}">
-      <p15:sldGuideLst xmlns:p15="http://schemas.microsoft.com/office/powerpoint/2012/main"/>
-    </p:ext>
-  </p:extLst>
 </p:sldLayout>
 </file>
 
 <file path=ppt/slideLayouts/slideLayout9.xml><?xml version="1.0" encoding="utf-8"?>
-<p:sldLayout xmlns:a="http://schemas.openxmlformats.org/drawingml/2006/main" xmlns:r="http://schemas.openxmlformats.org/officeDocument/2006/relationships" xmlns:p="http://schemas.openxmlformats.org/presentationml/2006/main" showMasterSp="0" type="picTx" preserve="1">
+<p:sldLayout xmlns:a="http://schemas.openxmlformats.org/drawingml/2006/main" xmlns:r="http://schemas.openxmlformats.org/officeDocument/2006/relationships" xmlns:p="http://schemas.openxmlformats.org/presentationml/2006/main" type="picTx" preserve="1" showMasterSp="0">
   <p:cSld name="Picture with Caption">
     <p:spTree>
       <p:nvGrpSpPr>
@@ -3945,6 +3815,7 @@
               <a:rPr lang="en-US" dirty="0"/>
               <a:t>Click icon to add picture</a:t>
             </a:r>
+            <a:endParaRPr lang="en-US" dirty="0"/>
           </a:p>
         </p:txBody>
       </p:sp>
@@ -4022,6 +3893,7 @@
               <a:rPr lang="en-US"/>
               <a:t>Click to edit Master text styles</a:t>
             </a:r>
+            <a:endParaRPr lang="en-US"/>
           </a:p>
         </p:txBody>
       </p:sp>
@@ -4042,8 +3914,6 @@
           <a:p>
             <a:fld id="{B51075D4-600E-4A33-99CC-B8F0EB0A7ACC}" type="datetime1">
               <a:rPr lang="en-IN" smtClean="0"/>
-              <a:pPr/>
-              <a:t>15/05/22</a:t>
             </a:fld>
             <a:endParaRPr lang="en-IN"/>
           </a:p>
@@ -4089,8 +3959,6 @@
           <a:p>
             <a:fld id="{1245FD78-8DE1-44B0-BD44-E067D054697C}" type="slidenum">
               <a:rPr lang="en-IN" smtClean="0"/>
-              <a:pPr/>
-              <a:t>‹#›</a:t>
             </a:fld>
             <a:endParaRPr lang="en-IN"/>
           </a:p>
@@ -4098,13 +3966,7 @@
       </p:sp>
       <p:pic>
         <p:nvPicPr>
-          <p:cNvPr id="11" name="Picture 2" descr="C:\Users\Srinidhi\Desktop\logo.png">
-            <a:extLst>
-              <a:ext uri="{FF2B5EF4-FFF2-40B4-BE49-F238E27FC236}">
-                <a16:creationId xmlns:a16="http://schemas.microsoft.com/office/drawing/2014/main" id="{8D7279E7-0A06-4D9D-B018-700B7F4A3314}"/>
-              </a:ext>
-            </a:extLst>
-          </p:cNvPr>
+          <p:cNvPr id="11" name="Picture 2" descr="C:\Users\Srinidhi\Desktop\logo.png"/>
           <p:cNvPicPr>
             <a:picLocks noChangeAspect="1" noChangeArrowheads="1"/>
           </p:cNvPicPr>
@@ -4129,11 +3991,6 @@
         </p:spPr>
       </p:pic>
     </p:spTree>
-    <p:extLst>
-      <p:ext uri="{BB962C8B-B14F-4D97-AF65-F5344CB8AC3E}">
-        <p14:creationId xmlns:p14="http://schemas.microsoft.com/office/powerpoint/2010/main" val="3223777996"/>
-      </p:ext>
-    </p:extLst>
   </p:cSld>
   <p:clrMapOvr>
     <a:masterClrMapping/>
@@ -4302,6 +4159,7 @@
               <a:rPr lang="en-US"/>
               <a:t>Click to edit Master text styles</a:t>
             </a:r>
+            <a:endParaRPr lang="en-US"/>
           </a:p>
           <a:p>
             <a:pPr lvl="1"/>
@@ -4309,6 +4167,7 @@
               <a:rPr lang="en-US"/>
               <a:t>Second level</a:t>
             </a:r>
+            <a:endParaRPr lang="en-US"/>
           </a:p>
           <a:p>
             <a:pPr lvl="2"/>
@@ -4316,6 +4175,7 @@
               <a:rPr lang="en-US"/>
               <a:t>Third level</a:t>
             </a:r>
+            <a:endParaRPr lang="en-US"/>
           </a:p>
           <a:p>
             <a:pPr lvl="3"/>
@@ -4323,6 +4183,7 @@
               <a:rPr lang="en-US"/>
               <a:t>Fourth level</a:t>
             </a:r>
+            <a:endParaRPr lang="en-US"/>
           </a:p>
           <a:p>
             <a:pPr lvl="4"/>
@@ -4367,8 +4228,6 @@
           <a:p>
             <a:fld id="{61705F69-1B7A-4F89-B7EA-F9E7165CA2C2}" type="datetime1">
               <a:rPr lang="en-IN" smtClean="0"/>
-              <a:pPr/>
-              <a:t>15/05/22</a:t>
             </a:fld>
             <a:endParaRPr lang="en-IN"/>
           </a:p>
@@ -4446,8 +4305,6 @@
           <a:p>
             <a:fld id="{1245FD78-8DE1-44B0-BD44-E067D054697C}" type="slidenum">
               <a:rPr lang="en-IN" smtClean="0"/>
-              <a:pPr/>
-              <a:t>‹#›</a:t>
             </a:fld>
             <a:endParaRPr lang="en-IN"/>
           </a:p>
@@ -4492,25 +4349,20 @@
         </p:style>
       </p:cxnSp>
     </p:spTree>
-    <p:extLst>
-      <p:ext uri="{BB962C8B-B14F-4D97-AF65-F5344CB8AC3E}">
-        <p14:creationId xmlns:p14="http://schemas.microsoft.com/office/powerpoint/2010/main" val="1422238830"/>
-      </p:ext>
-    </p:extLst>
   </p:cSld>
   <p:clrMap bg1="lt1" tx1="dk1" bg2="lt2" tx2="dk2" accent1="accent1" accent2="accent2" accent3="accent3" accent4="accent4" accent5="accent5" accent6="accent6" hlink="hlink" folHlink="folHlink"/>
   <p:sldLayoutIdLst>
-    <p:sldLayoutId id="2147483769" r:id="rId1"/>
-    <p:sldLayoutId id="2147483770" r:id="rId2"/>
-    <p:sldLayoutId id="2147483771" r:id="rId3"/>
-    <p:sldLayoutId id="2147483772" r:id="rId4"/>
-    <p:sldLayoutId id="2147483773" r:id="rId5"/>
-    <p:sldLayoutId id="2147483774" r:id="rId6"/>
-    <p:sldLayoutId id="2147483775" r:id="rId7"/>
-    <p:sldLayoutId id="2147483776" r:id="rId8"/>
-    <p:sldLayoutId id="2147483777" r:id="rId9"/>
-    <p:sldLayoutId id="2147483778" r:id="rId10"/>
-    <p:sldLayoutId id="2147483779" r:id="rId11"/>
+    <p:sldLayoutId id="2147483649" r:id="rId1"/>
+    <p:sldLayoutId id="2147483650" r:id="rId2"/>
+    <p:sldLayoutId id="2147483651" r:id="rId3"/>
+    <p:sldLayoutId id="2147483652" r:id="rId4"/>
+    <p:sldLayoutId id="2147483653" r:id="rId5"/>
+    <p:sldLayoutId id="2147483654" r:id="rId6"/>
+    <p:sldLayoutId id="2147483655" r:id="rId7"/>
+    <p:sldLayoutId id="2147483656" r:id="rId8"/>
+    <p:sldLayoutId id="2147483657" r:id="rId9"/>
+    <p:sldLayoutId id="2147483658" r:id="rId10"/>
+    <p:sldLayoutId id="2147483659" r:id="rId11"/>
   </p:sldLayoutIdLst>
   <p:hf hdr="0" dt="0"/>
   <p:txStyles>
@@ -4565,7 +4417,7 @@
           <a:cs typeface="+mn-cs"/>
         </a:defRPr>
       </a:lvl1pPr>
-      <a:lvl2pPr marL="384048" indent="-182880" algn="l" defTabSz="914400" rtl="0" eaLnBrk="1" latinLnBrk="0" hangingPunct="1">
+      <a:lvl2pPr marL="384175" indent="-182880" algn="l" defTabSz="914400" rtl="0" eaLnBrk="1" latinLnBrk="0" hangingPunct="1">
         <a:lnSpc>
           <a:spcPct val="90000"/>
         </a:lnSpc>
@@ -4578,7 +4430,7 @@
         <a:buClr>
           <a:schemeClr val="accent1"/>
         </a:buClr>
-        <a:buFont typeface="Calibri" pitchFamily="34" charset="0"/>
+        <a:buFont typeface="Calibri" panose="020F0502020204030204" pitchFamily="34" charset="0"/>
         <a:buChar char="◦"/>
         <a:defRPr sz="1800" kern="1200">
           <a:solidFill>
@@ -4592,7 +4444,7 @@
           <a:cs typeface="+mn-cs"/>
         </a:defRPr>
       </a:lvl2pPr>
-      <a:lvl3pPr marL="566928" indent="-182880" algn="l" defTabSz="914400" rtl="0" eaLnBrk="1" latinLnBrk="0" hangingPunct="1">
+      <a:lvl3pPr marL="567055" indent="-182880" algn="l" defTabSz="914400" rtl="0" eaLnBrk="1" latinLnBrk="0" hangingPunct="1">
         <a:lnSpc>
           <a:spcPct val="90000"/>
         </a:lnSpc>
@@ -4605,7 +4457,7 @@
         <a:buClr>
           <a:schemeClr val="accent1"/>
         </a:buClr>
-        <a:buFont typeface="Calibri" pitchFamily="34" charset="0"/>
+        <a:buFont typeface="Calibri" panose="020F0502020204030204" pitchFamily="34" charset="0"/>
         <a:buChar char="◦"/>
         <a:defRPr sz="1400" kern="1200">
           <a:solidFill>
@@ -4619,7 +4471,7 @@
           <a:cs typeface="+mn-cs"/>
         </a:defRPr>
       </a:lvl3pPr>
-      <a:lvl4pPr marL="749808" indent="-182880" algn="l" defTabSz="914400" rtl="0" eaLnBrk="1" latinLnBrk="0" hangingPunct="1">
+      <a:lvl4pPr marL="749935" indent="-182880" algn="l" defTabSz="914400" rtl="0" eaLnBrk="1" latinLnBrk="0" hangingPunct="1">
         <a:lnSpc>
           <a:spcPct val="90000"/>
         </a:lnSpc>
@@ -4632,7 +4484,7 @@
         <a:buClr>
           <a:schemeClr val="accent1"/>
         </a:buClr>
-        <a:buFont typeface="Calibri" pitchFamily="34" charset="0"/>
+        <a:buFont typeface="Calibri" panose="020F0502020204030204" pitchFamily="34" charset="0"/>
         <a:buChar char="◦"/>
         <a:defRPr sz="1400" kern="1200">
           <a:solidFill>
@@ -4646,7 +4498,7 @@
           <a:cs typeface="+mn-cs"/>
         </a:defRPr>
       </a:lvl4pPr>
-      <a:lvl5pPr marL="932688" indent="-182880" algn="l" defTabSz="914400" rtl="0" eaLnBrk="1" latinLnBrk="0" hangingPunct="1">
+      <a:lvl5pPr marL="932815" indent="-182880" algn="l" defTabSz="914400" rtl="0" eaLnBrk="1" latinLnBrk="0" hangingPunct="1">
         <a:lnSpc>
           <a:spcPct val="90000"/>
         </a:lnSpc>
@@ -4659,7 +4511,7 @@
         <a:buClr>
           <a:schemeClr val="accent1"/>
         </a:buClr>
-        <a:buFont typeface="Calibri" pitchFamily="34" charset="0"/>
+        <a:buFont typeface="Calibri" panose="020F0502020204030204" pitchFamily="34" charset="0"/>
         <a:buChar char="◦"/>
         <a:defRPr sz="1400" kern="1200">
           <a:solidFill>
@@ -4673,7 +4525,7 @@
           <a:cs typeface="+mn-cs"/>
         </a:defRPr>
       </a:lvl5pPr>
-      <a:lvl6pPr marL="1100000" indent="-228600" algn="l" defTabSz="914400" rtl="0" eaLnBrk="1" latinLnBrk="0" hangingPunct="1">
+      <a:lvl6pPr marL="1099820" indent="-228600" algn="l" defTabSz="914400" rtl="0" eaLnBrk="1" latinLnBrk="0" hangingPunct="1">
         <a:lnSpc>
           <a:spcPct val="90000"/>
         </a:lnSpc>
@@ -4686,7 +4538,7 @@
         <a:buClr>
           <a:schemeClr val="accent1"/>
         </a:buClr>
-        <a:buFont typeface="Calibri" pitchFamily="34" charset="0"/>
+        <a:buFont typeface="Calibri" panose="020F0502020204030204" pitchFamily="34" charset="0"/>
         <a:buChar char="◦"/>
         <a:defRPr sz="1400" kern="1200">
           <a:solidFill>
@@ -4700,7 +4552,7 @@
           <a:cs typeface="+mn-cs"/>
         </a:defRPr>
       </a:lvl6pPr>
-      <a:lvl7pPr marL="1300000" indent="-228600" algn="l" defTabSz="914400" rtl="0" eaLnBrk="1" latinLnBrk="0" hangingPunct="1">
+      <a:lvl7pPr marL="1299845" indent="-228600" algn="l" defTabSz="914400" rtl="0" eaLnBrk="1" latinLnBrk="0" hangingPunct="1">
         <a:lnSpc>
           <a:spcPct val="90000"/>
         </a:lnSpc>
@@ -4713,7 +4565,7 @@
         <a:buClr>
           <a:schemeClr val="accent1"/>
         </a:buClr>
-        <a:buFont typeface="Calibri" pitchFamily="34" charset="0"/>
+        <a:buFont typeface="Calibri" panose="020F0502020204030204" pitchFamily="34" charset="0"/>
         <a:buChar char="◦"/>
         <a:defRPr sz="1400" kern="1200">
           <a:solidFill>
@@ -4727,7 +4579,7 @@
           <a:cs typeface="+mn-cs"/>
         </a:defRPr>
       </a:lvl7pPr>
-      <a:lvl8pPr marL="1500000" indent="-228600" algn="l" defTabSz="914400" rtl="0" eaLnBrk="1" latinLnBrk="0" hangingPunct="1">
+      <a:lvl8pPr marL="1499870" indent="-228600" algn="l" defTabSz="914400" rtl="0" eaLnBrk="1" latinLnBrk="0" hangingPunct="1">
         <a:lnSpc>
           <a:spcPct val="90000"/>
         </a:lnSpc>
@@ -4740,7 +4592,7 @@
         <a:buClr>
           <a:schemeClr val="accent1"/>
         </a:buClr>
-        <a:buFont typeface="Calibri" pitchFamily="34" charset="0"/>
+        <a:buFont typeface="Calibri" panose="020F0502020204030204" pitchFamily="34" charset="0"/>
         <a:buChar char="◦"/>
         <a:defRPr sz="1400" kern="1200">
           <a:solidFill>
@@ -4754,7 +4606,7 @@
           <a:cs typeface="+mn-cs"/>
         </a:defRPr>
       </a:lvl8pPr>
-      <a:lvl9pPr marL="1700000" indent="-228600" algn="l" defTabSz="914400" rtl="0" eaLnBrk="1" latinLnBrk="0" hangingPunct="1">
+      <a:lvl9pPr marL="1699895" indent="-228600" algn="l" defTabSz="914400" rtl="0" eaLnBrk="1" latinLnBrk="0" hangingPunct="1">
         <a:lnSpc>
           <a:spcPct val="90000"/>
         </a:lnSpc>
@@ -4767,7 +4619,7 @@
         <a:buClr>
           <a:schemeClr val="accent1"/>
         </a:buClr>
-        <a:buFont typeface="Calibri" pitchFamily="34" charset="0"/>
+        <a:buFont typeface="Calibri" panose="020F0502020204030204" pitchFamily="34" charset="0"/>
         <a:buChar char="◦"/>
         <a:defRPr sz="1400" kern="1200">
           <a:solidFill>
@@ -4878,11 +4730,6 @@
       </a:lvl9pPr>
     </p:otherStyle>
   </p:txStyles>
-  <p:extLst>
-    <p:ext uri="{27BBF7A9-308A-43DC-89C8-2F10F3537804}">
-      <p15:sldGuideLst xmlns:p15="http://schemas.microsoft.com/office/powerpoint/2012/main"/>
-    </p:ext>
-  </p:extLst>
 </p:sldMaster>
 </file>
 
@@ -5042,9 +4889,7 @@
       <p:sp>
         <p:nvSpPr>
           <p:cNvPr id="5" name="Title 1"/>
-          <p:cNvSpPr txBox="1">
-            <a:spLocks/>
-          </p:cNvSpPr>
+          <p:cNvSpPr txBox="1"/>
           <p:nvPr/>
         </p:nvSpPr>
         <p:spPr bwMode="auto">
@@ -5059,8 +4904,6 @@
           <a:ln w="9525">
             <a:noFill/>
             <a:miter lim="800000"/>
-            <a:headEnd/>
-            <a:tailEnd/>
           </a:ln>
         </p:spPr>
         <p:txBody>
@@ -5084,13 +4927,7 @@
       </p:sp>
       <p:sp>
         <p:nvSpPr>
-          <p:cNvPr id="3" name="TextBox 2">
-            <a:extLst>
-              <a:ext uri="{FF2B5EF4-FFF2-40B4-BE49-F238E27FC236}">
-                <a16:creationId xmlns:a16="http://schemas.microsoft.com/office/drawing/2014/main" id="{EC9641BE-B7C9-4946-A565-227D0582DC3F}"/>
-              </a:ext>
-            </a:extLst>
-          </p:cNvPr>
+          <p:cNvPr id="3" name="TextBox 2"/>
           <p:cNvSpPr txBox="1"/>
           <p:nvPr/>
         </p:nvSpPr>
@@ -5117,6 +4954,10 @@
               </a:rPr>
               <a:t>MSRIT Mentor:</a:t>
             </a:r>
+            <a:endParaRPr lang="en-IN" sz="1600" dirty="0">
+              <a:latin typeface="Times New Roman" panose="02020603050405020304" pitchFamily="18" charset="0"/>
+              <a:cs typeface="Times New Roman" panose="02020603050405020304" pitchFamily="18" charset="0"/>
+            </a:endParaRPr>
           </a:p>
           <a:p>
             <a:r>
@@ -5126,6 +4967,10 @@
               </a:rPr>
               <a:t>Dr Shilpa Shashikant Chaudhari</a:t>
             </a:r>
+            <a:endParaRPr lang="en-IN" sz="1600" dirty="0">
+              <a:latin typeface="Times New Roman" panose="02020603050405020304" pitchFamily="18" charset="0"/>
+              <a:cs typeface="Times New Roman" panose="02020603050405020304" pitchFamily="18" charset="0"/>
+            </a:endParaRPr>
           </a:p>
           <a:p>
             <a:r>
@@ -5135,18 +4980,16 @@
               </a:rPr>
               <a:t>Associate Professor</a:t>
             </a:r>
-          </a:p>
-        </p:txBody>
-      </p:sp>
-      <p:sp>
-        <p:nvSpPr>
-          <p:cNvPr id="6" name="TextBox 5">
-            <a:extLst>
-              <a:ext uri="{FF2B5EF4-FFF2-40B4-BE49-F238E27FC236}">
-                <a16:creationId xmlns:a16="http://schemas.microsoft.com/office/drawing/2014/main" id="{EC9641BE-B7C9-4946-A565-227D0582DC3F}"/>
-              </a:ext>
-            </a:extLst>
-          </p:cNvPr>
+            <a:endParaRPr lang="en-IN" sz="1600" dirty="0">
+              <a:latin typeface="Times New Roman" panose="02020603050405020304" pitchFamily="18" charset="0"/>
+              <a:cs typeface="Times New Roman" panose="02020603050405020304" pitchFamily="18" charset="0"/>
+            </a:endParaRPr>
+          </a:p>
+        </p:txBody>
+      </p:sp>
+      <p:sp>
+        <p:nvSpPr>
+          <p:cNvPr id="6" name="TextBox 5"/>
           <p:cNvSpPr txBox="1"/>
           <p:nvPr/>
         </p:nvSpPr>
@@ -5180,6 +5023,10 @@
               </a:rPr>
               <a:t>:</a:t>
             </a:r>
+            <a:endParaRPr lang="en-IN" dirty="0">
+              <a:latin typeface="Times New Roman" panose="02020603050405020304" pitchFamily="18" charset="0"/>
+              <a:cs typeface="Times New Roman" panose="02020603050405020304" pitchFamily="18" charset="0"/>
+            </a:endParaRPr>
           </a:p>
         </p:txBody>
       </p:sp>
@@ -5225,13 +5072,7 @@
           <p:cNvGraphicFramePr>
             <a:graphicFrameLocks noGrp="1"/>
           </p:cNvGraphicFramePr>
-          <p:nvPr>
-            <p:extLst>
-              <p:ext uri="{D42A27DB-BD31-4B8C-83A1-F6EECF244321}">
-                <p14:modId xmlns:p14="http://schemas.microsoft.com/office/powerpoint/2010/main" val="2513779718"/>
-              </p:ext>
-            </p:extLst>
-          </p:nvPr>
+          <p:nvPr/>
         </p:nvGraphicFramePr>
         <p:xfrm>
           <a:off x="1192566" y="4738506"/>
@@ -5244,20 +5085,8 @@
                 <a:tableStyleId>{69CF1AB2-1976-4502-BF36-3FF5EA218861}</a:tableStyleId>
               </a:tblPr>
               <a:tblGrid>
-                <a:gridCol w="1535430">
-                  <a:extLst>
-                    <a:ext uri="{9D8B030D-6E8A-4147-A177-3AD203B41FA5}">
-                      <a16:colId xmlns:a16="http://schemas.microsoft.com/office/drawing/2014/main" val="20000"/>
-                    </a:ext>
-                  </a:extLst>
-                </a:gridCol>
-                <a:gridCol w="1752600">
-                  <a:extLst>
-                    <a:ext uri="{9D8B030D-6E8A-4147-A177-3AD203B41FA5}">
-                      <a16:colId xmlns:a16="http://schemas.microsoft.com/office/drawing/2014/main" val="20001"/>
-                    </a:ext>
-                  </a:extLst>
-                </a:gridCol>
+                <a:gridCol w="1535430"/>
+                <a:gridCol w="1752600"/>
               </a:tblGrid>
               <a:tr h="309741">
                 <a:tc>
@@ -5300,11 +5129,6 @@
                   </a:txBody>
                   <a:tcPr/>
                 </a:tc>
-                <a:extLst>
-                  <a:ext uri="{0D108BD9-81ED-4DB2-BD59-A6C34878D82A}">
-                    <a16:rowId xmlns:a16="http://schemas.microsoft.com/office/drawing/2014/main" val="10000"/>
-                  </a:ext>
-                </a:extLst>
               </a:tr>
               <a:tr h="337899">
                 <a:tc>
@@ -5319,6 +5143,10 @@
                         </a:rPr>
                         <a:t>1MS18CS040</a:t>
                       </a:r>
+                      <a:endParaRPr lang="en-IN" sz="1600" dirty="0">
+                        <a:latin typeface="Times New Roman" panose="02020603050405020304" pitchFamily="18" charset="0"/>
+                        <a:cs typeface="Times New Roman" panose="02020603050405020304" pitchFamily="18" charset="0"/>
+                      </a:endParaRPr>
                     </a:p>
                   </a:txBody>
                   <a:tcPr/>
@@ -5335,15 +5163,14 @@
                         </a:rPr>
                         <a:t>Dheeraj Bhat</a:t>
                       </a:r>
+                      <a:endParaRPr lang="en-IN" sz="1600" dirty="0">
+                        <a:latin typeface="Times New Roman" panose="02020603050405020304" pitchFamily="18" charset="0"/>
+                        <a:cs typeface="Times New Roman" panose="02020603050405020304" pitchFamily="18" charset="0"/>
+                      </a:endParaRPr>
                     </a:p>
                   </a:txBody>
                   <a:tcPr/>
                 </a:tc>
-                <a:extLst>
-                  <a:ext uri="{0D108BD9-81ED-4DB2-BD59-A6C34878D82A}">
-                    <a16:rowId xmlns:a16="http://schemas.microsoft.com/office/drawing/2014/main" val="10001"/>
-                  </a:ext>
-                </a:extLst>
               </a:tr>
               <a:tr h="337899">
                 <a:tc>
@@ -5358,6 +5185,10 @@
                         </a:rPr>
                         <a:t>1MS18CS043</a:t>
                       </a:r>
+                      <a:endParaRPr lang="en-IN" sz="1600" dirty="0">
+                        <a:latin typeface="Times New Roman" panose="02020603050405020304" pitchFamily="18" charset="0"/>
+                        <a:cs typeface="Times New Roman" panose="02020603050405020304" pitchFamily="18" charset="0"/>
+                      </a:endParaRPr>
                     </a:p>
                   </a:txBody>
                   <a:tcPr/>
@@ -5382,11 +5213,6 @@
                   </a:txBody>
                   <a:tcPr/>
                 </a:tc>
-                <a:extLst>
-                  <a:ext uri="{0D108BD9-81ED-4DB2-BD59-A6C34878D82A}">
-                    <a16:rowId xmlns:a16="http://schemas.microsoft.com/office/drawing/2014/main" val="10002"/>
-                  </a:ext>
-                </a:extLst>
               </a:tr>
               <a:tr h="337899">
                 <a:tc>
@@ -5401,6 +5227,10 @@
                         </a:rPr>
                         <a:t>1MS18CS046</a:t>
                       </a:r>
+                      <a:endParaRPr lang="en-IN" sz="1600" dirty="0">
+                        <a:latin typeface="Times New Roman" panose="02020603050405020304" pitchFamily="18" charset="0"/>
+                        <a:cs typeface="Times New Roman" panose="02020603050405020304" pitchFamily="18" charset="0"/>
+                      </a:endParaRPr>
                     </a:p>
                   </a:txBody>
                   <a:tcPr/>
@@ -5417,26 +5247,20 @@
                         </a:rPr>
                         <a:t>Gaurav V</a:t>
                       </a:r>
+                      <a:endParaRPr lang="en-IN" sz="1600" dirty="0">
+                        <a:latin typeface="Times New Roman" panose="02020603050405020304" pitchFamily="18" charset="0"/>
+                        <a:cs typeface="Times New Roman" panose="02020603050405020304" pitchFamily="18" charset="0"/>
+                      </a:endParaRPr>
                     </a:p>
                   </a:txBody>
                   <a:tcPr/>
                 </a:tc>
-                <a:extLst>
-                  <a:ext uri="{0D108BD9-81ED-4DB2-BD59-A6C34878D82A}">
-                    <a16:rowId xmlns:a16="http://schemas.microsoft.com/office/drawing/2014/main" val="10003"/>
-                  </a:ext>
-                </a:extLst>
               </a:tr>
             </a:tbl>
           </a:graphicData>
         </a:graphic>
       </p:graphicFrame>
     </p:spTree>
-    <p:extLst>
-      <p:ext uri="{BB962C8B-B14F-4D97-AF65-F5344CB8AC3E}">
-        <p14:creationId xmlns:p14="http://schemas.microsoft.com/office/powerpoint/2010/main" val="3003919897"/>
-      </p:ext>
-    </p:extLst>
   </p:cSld>
   <p:clrMapOvr>
     <a:masterClrMapping/>
@@ -5463,13 +5287,7 @@
       </p:grpSpPr>
       <p:sp>
         <p:nvSpPr>
-          <p:cNvPr id="12" name="Rectangle 11">
-            <a:extLst>
-              <a:ext uri="{FF2B5EF4-FFF2-40B4-BE49-F238E27FC236}">
-                <a16:creationId xmlns:a16="http://schemas.microsoft.com/office/drawing/2014/main" id="{AB4C5CC9-0AC8-4668-EEA0-04A15C0D71A4}"/>
-              </a:ext>
-            </a:extLst>
-          </p:cNvPr>
+          <p:cNvPr id="12" name="Rectangle 11"/>
           <p:cNvSpPr/>
           <p:nvPr/>
         </p:nvSpPr>
@@ -5512,13 +5330,7 @@
       </p:sp>
       <p:sp>
         <p:nvSpPr>
-          <p:cNvPr id="4" name="Footer Placeholder 3">
-            <a:extLst>
-              <a:ext uri="{FF2B5EF4-FFF2-40B4-BE49-F238E27FC236}">
-                <a16:creationId xmlns:a16="http://schemas.microsoft.com/office/drawing/2014/main" id="{B7087C30-2490-7977-69FA-F388E19A0FE5}"/>
-              </a:ext>
-            </a:extLst>
-          </p:cNvPr>
+          <p:cNvPr id="4" name="Footer Placeholder 3"/>
           <p:cNvSpPr>
             <a:spLocks noGrp="1"/>
           </p:cNvSpPr>
@@ -5541,13 +5353,7 @@
       </p:sp>
       <p:sp>
         <p:nvSpPr>
-          <p:cNvPr id="5" name="Slide Number Placeholder 4">
-            <a:extLst>
-              <a:ext uri="{FF2B5EF4-FFF2-40B4-BE49-F238E27FC236}">
-                <a16:creationId xmlns:a16="http://schemas.microsoft.com/office/drawing/2014/main" id="{BE1E4C4F-2ED2-B5E8-9348-D4862D7146C6}"/>
-              </a:ext>
-            </a:extLst>
-          </p:cNvPr>
+          <p:cNvPr id="5" name="Slide Number Placeholder 4"/>
           <p:cNvSpPr>
             <a:spLocks noGrp="1"/>
           </p:cNvSpPr>
@@ -5562,8 +5368,6 @@
           <a:p>
             <a:fld id="{1245FD78-8DE1-44B0-BD44-E067D054697C}" type="slidenum">
               <a:rPr lang="en-IN" smtClean="0"/>
-              <a:pPr/>
-              <a:t>10</a:t>
             </a:fld>
             <a:endParaRPr lang="en-IN"/>
           </a:p>
@@ -5571,13 +5375,7 @@
       </p:sp>
       <p:sp>
         <p:nvSpPr>
-          <p:cNvPr id="6" name="TextBox 5">
-            <a:extLst>
-              <a:ext uri="{FF2B5EF4-FFF2-40B4-BE49-F238E27FC236}">
-                <a16:creationId xmlns:a16="http://schemas.microsoft.com/office/drawing/2014/main" id="{A205B894-1AD7-602C-9EAB-4F2CE62D70C8}"/>
-              </a:ext>
-            </a:extLst>
-          </p:cNvPr>
+          <p:cNvPr id="6" name="TextBox 5"/>
           <p:cNvSpPr txBox="1"/>
           <p:nvPr/>
         </p:nvSpPr>
@@ -5604,18 +5402,16 @@
               </a:rPr>
               <a:t>SYSTEM DESIGN</a:t>
             </a:r>
-          </a:p>
-        </p:txBody>
-      </p:sp>
-      <p:sp>
-        <p:nvSpPr>
-          <p:cNvPr id="13" name="TextBox 12">
-            <a:extLst>
-              <a:ext uri="{FF2B5EF4-FFF2-40B4-BE49-F238E27FC236}">
-                <a16:creationId xmlns:a16="http://schemas.microsoft.com/office/drawing/2014/main" id="{72BF2B76-F193-4588-FCA5-905B642621DB}"/>
-              </a:ext>
-            </a:extLst>
-          </p:cNvPr>
+            <a:endParaRPr lang="en-US" sz="2000" dirty="0">
+              <a:latin typeface="Times New Roman" panose="02020603050405020304" pitchFamily="18" charset="0"/>
+              <a:cs typeface="Times New Roman" panose="02020603050405020304" pitchFamily="18" charset="0"/>
+            </a:endParaRPr>
+          </a:p>
+        </p:txBody>
+      </p:sp>
+      <p:sp>
+        <p:nvSpPr>
+          <p:cNvPr id="13" name="TextBox 12"/>
           <p:cNvSpPr txBox="1"/>
           <p:nvPr/>
         </p:nvSpPr>
@@ -5642,18 +5438,16 @@
               </a:rPr>
               <a:t>High Level Design</a:t>
             </a:r>
+            <a:endParaRPr lang="en-US" sz="1600" dirty="0">
+              <a:latin typeface="Times New Roman" panose="02020603050405020304" pitchFamily="18" charset="0"/>
+              <a:cs typeface="Times New Roman" panose="02020603050405020304" pitchFamily="18" charset="0"/>
+            </a:endParaRPr>
           </a:p>
         </p:txBody>
       </p:sp>
       <p:cxnSp>
         <p:nvCxnSpPr>
-          <p:cNvPr id="15" name="Straight Connector 14">
-            <a:extLst>
-              <a:ext uri="{FF2B5EF4-FFF2-40B4-BE49-F238E27FC236}">
-                <a16:creationId xmlns:a16="http://schemas.microsoft.com/office/drawing/2014/main" id="{FFDBE096-E6BE-14AE-CBDA-29295CCFBDF0}"/>
-              </a:ext>
-            </a:extLst>
-          </p:cNvPr>
+          <p:cNvPr id="15" name="Straight Connector 14"/>
           <p:cNvCxnSpPr/>
           <p:nvPr/>
         </p:nvCxnSpPr>
@@ -5683,13 +5477,7 @@
       </p:cxnSp>
       <p:cxnSp>
         <p:nvCxnSpPr>
-          <p:cNvPr id="16" name="Straight Connector 15">
-            <a:extLst>
-              <a:ext uri="{FF2B5EF4-FFF2-40B4-BE49-F238E27FC236}">
-                <a16:creationId xmlns:a16="http://schemas.microsoft.com/office/drawing/2014/main" id="{7136D1FD-972B-7B26-8F3D-CFD6C7F43882}"/>
-              </a:ext>
-            </a:extLst>
-          </p:cNvPr>
+          <p:cNvPr id="16" name="Straight Connector 15"/>
           <p:cNvCxnSpPr/>
           <p:nvPr/>
         </p:nvCxnSpPr>
@@ -5719,13 +5507,7 @@
       </p:cxnSp>
       <p:pic>
         <p:nvPicPr>
-          <p:cNvPr id="11" name="Picture 1" descr="page3image35998768">
-            <a:extLst>
-              <a:ext uri="{FF2B5EF4-FFF2-40B4-BE49-F238E27FC236}">
-                <a16:creationId xmlns:a16="http://schemas.microsoft.com/office/drawing/2014/main" id="{B5520202-2272-51B0-11D8-C039EF50B6E3}"/>
-              </a:ext>
-            </a:extLst>
-          </p:cNvPr>
+          <p:cNvPr id="11" name="Picture 1" descr="page3image35998768"/>
           <p:cNvPicPr>
             <a:picLocks noGrp="1" noChangeAspect="1" noChangeArrowheads="1"/>
           </p:cNvPicPr>
@@ -5734,7 +5516,7 @@
           </p:nvPr>
         </p:nvPicPr>
         <p:blipFill>
-          <a:blip r:embed="rId2">
+          <a:blip r:embed="rId1">
             <a:extLst>
               <a:ext uri="{28A0092B-C50C-407E-A947-70E740481C1C}">
                 <a14:useLocalDpi xmlns:a14="http://schemas.microsoft.com/office/drawing/2010/main" val="0"/>
@@ -5767,11 +5549,6 @@
         </p:spPr>
       </p:pic>
     </p:spTree>
-    <p:extLst>
-      <p:ext uri="{BB962C8B-B14F-4D97-AF65-F5344CB8AC3E}">
-        <p14:creationId xmlns:p14="http://schemas.microsoft.com/office/powerpoint/2010/main" val="2477062257"/>
-      </p:ext>
-    </p:extLst>
   </p:cSld>
   <p:clrMapOvr>
     <a:masterClrMapping/>
@@ -5798,13 +5575,7 @@
       </p:grpSpPr>
       <p:sp>
         <p:nvSpPr>
-          <p:cNvPr id="4" name="Footer Placeholder 3">
-            <a:extLst>
-              <a:ext uri="{FF2B5EF4-FFF2-40B4-BE49-F238E27FC236}">
-                <a16:creationId xmlns:a16="http://schemas.microsoft.com/office/drawing/2014/main" id="{F5AC22D2-E9B6-CF70-9277-2F67F641D48C}"/>
-              </a:ext>
-            </a:extLst>
-          </p:cNvPr>
+          <p:cNvPr id="4" name="Footer Placeholder 3"/>
           <p:cNvSpPr>
             <a:spLocks noGrp="1"/>
           </p:cNvSpPr>
@@ -5827,13 +5598,7 @@
       </p:sp>
       <p:sp>
         <p:nvSpPr>
-          <p:cNvPr id="5" name="Slide Number Placeholder 4">
-            <a:extLst>
-              <a:ext uri="{FF2B5EF4-FFF2-40B4-BE49-F238E27FC236}">
-                <a16:creationId xmlns:a16="http://schemas.microsoft.com/office/drawing/2014/main" id="{54AF1378-43FB-AFA0-3FB8-007E64958519}"/>
-              </a:ext>
-            </a:extLst>
-          </p:cNvPr>
+          <p:cNvPr id="5" name="Slide Number Placeholder 4"/>
           <p:cNvSpPr>
             <a:spLocks noGrp="1"/>
           </p:cNvSpPr>
@@ -5848,8 +5613,6 @@
           <a:p>
             <a:fld id="{1245FD78-8DE1-44B0-BD44-E067D054697C}" type="slidenum">
               <a:rPr lang="en-IN" smtClean="0"/>
-              <a:pPr/>
-              <a:t>11</a:t>
             </a:fld>
             <a:endParaRPr lang="en-IN"/>
           </a:p>
@@ -5857,13 +5620,7 @@
       </p:sp>
       <p:sp>
         <p:nvSpPr>
-          <p:cNvPr id="6" name="TextBox 5">
-            <a:extLst>
-              <a:ext uri="{FF2B5EF4-FFF2-40B4-BE49-F238E27FC236}">
-                <a16:creationId xmlns:a16="http://schemas.microsoft.com/office/drawing/2014/main" id="{E679590D-A1A8-6769-BE30-8C32395A62F3}"/>
-              </a:ext>
-            </a:extLst>
-          </p:cNvPr>
+          <p:cNvPr id="6" name="TextBox 5"/>
           <p:cNvSpPr txBox="1"/>
           <p:nvPr/>
         </p:nvSpPr>
@@ -5890,18 +5647,16 @@
               </a:rPr>
               <a:t>Low Level Designs</a:t>
             </a:r>
+            <a:endParaRPr lang="en-US" sz="1600" dirty="0">
+              <a:latin typeface="Times New Roman" panose="02020603050405020304" pitchFamily="18" charset="0"/>
+              <a:cs typeface="Times New Roman" panose="02020603050405020304" pitchFamily="18" charset="0"/>
+            </a:endParaRPr>
           </a:p>
         </p:txBody>
       </p:sp>
       <p:cxnSp>
         <p:nvCxnSpPr>
-          <p:cNvPr id="7" name="Straight Connector 6">
-            <a:extLst>
-              <a:ext uri="{FF2B5EF4-FFF2-40B4-BE49-F238E27FC236}">
-                <a16:creationId xmlns:a16="http://schemas.microsoft.com/office/drawing/2014/main" id="{B312CFFA-687D-96A3-4CA1-6250106E4780}"/>
-              </a:ext>
-            </a:extLst>
-          </p:cNvPr>
+          <p:cNvPr id="7" name="Straight Connector 6"/>
           <p:cNvCxnSpPr/>
           <p:nvPr/>
         </p:nvCxnSpPr>
@@ -5931,13 +5686,7 @@
       </p:cxnSp>
       <p:cxnSp>
         <p:nvCxnSpPr>
-          <p:cNvPr id="8" name="Straight Connector 7">
-            <a:extLst>
-              <a:ext uri="{FF2B5EF4-FFF2-40B4-BE49-F238E27FC236}">
-                <a16:creationId xmlns:a16="http://schemas.microsoft.com/office/drawing/2014/main" id="{DAC9B81A-0678-EAF3-C194-CF18A259FA95}"/>
-              </a:ext>
-            </a:extLst>
-          </p:cNvPr>
+          <p:cNvPr id="8" name="Straight Connector 7"/>
           <p:cNvCxnSpPr/>
           <p:nvPr/>
         </p:nvCxnSpPr>
@@ -5967,13 +5716,7 @@
       </p:cxnSp>
       <p:sp>
         <p:nvSpPr>
-          <p:cNvPr id="9" name="Rectangle 8">
-            <a:extLst>
-              <a:ext uri="{FF2B5EF4-FFF2-40B4-BE49-F238E27FC236}">
-                <a16:creationId xmlns:a16="http://schemas.microsoft.com/office/drawing/2014/main" id="{772BCB37-44D3-59AB-490A-CD3772F8E5A3}"/>
-              </a:ext>
-            </a:extLst>
-          </p:cNvPr>
+          <p:cNvPr id="9" name="Rectangle 8"/>
           <p:cNvSpPr/>
           <p:nvPr/>
         </p:nvSpPr>
@@ -6016,20 +5759,14 @@
       </p:sp>
       <p:pic>
         <p:nvPicPr>
-          <p:cNvPr id="23" name="Picture 22">
-            <a:extLst>
-              <a:ext uri="{FF2B5EF4-FFF2-40B4-BE49-F238E27FC236}">
-                <a16:creationId xmlns:a16="http://schemas.microsoft.com/office/drawing/2014/main" id="{6CB74B0B-35E5-B646-7E04-4D68677B37FE}"/>
-              </a:ext>
-            </a:extLst>
-          </p:cNvPr>
+          <p:cNvPr id="23" name="Picture 22"/>
           <p:cNvPicPr>
             <a:picLocks noChangeAspect="1"/>
           </p:cNvPicPr>
           <p:nvPr/>
         </p:nvPicPr>
         <p:blipFill>
-          <a:blip r:embed="rId2">
+          <a:blip r:embed="rId1">
             <a:extLst>
               <a:ext uri="{28A0092B-C50C-407E-A947-70E740481C1C}">
                 <a14:useLocalDpi xmlns:a14="http://schemas.microsoft.com/office/drawing/2010/main" val="0"/>
@@ -6052,13 +5789,7 @@
       </p:pic>
       <p:sp>
         <p:nvSpPr>
-          <p:cNvPr id="13" name="TextBox 12">
-            <a:extLst>
-              <a:ext uri="{FF2B5EF4-FFF2-40B4-BE49-F238E27FC236}">
-                <a16:creationId xmlns:a16="http://schemas.microsoft.com/office/drawing/2014/main" id="{CC470E55-2720-443D-7E26-9EF4B7C4EB80}"/>
-              </a:ext>
-            </a:extLst>
-          </p:cNvPr>
+          <p:cNvPr id="13" name="TextBox 12"/>
           <p:cNvSpPr txBox="1"/>
           <p:nvPr/>
         </p:nvSpPr>
@@ -6082,15 +5813,11 @@
               <a:rPr lang="en-US" sz="1400" i="1" dirty="0"/>
               <a:t>(a) Comparing standard nutrition values and user’s nutrition values to detect deficiencies</a:t>
             </a:r>
+            <a:endParaRPr lang="en-US" sz="1400" i="1" dirty="0"/>
           </a:p>
         </p:txBody>
       </p:sp>
     </p:spTree>
-    <p:extLst>
-      <p:ext uri="{BB962C8B-B14F-4D97-AF65-F5344CB8AC3E}">
-        <p14:creationId xmlns:p14="http://schemas.microsoft.com/office/powerpoint/2010/main" val="2827657208"/>
-      </p:ext>
-    </p:extLst>
   </p:cSld>
   <p:clrMapOvr>
     <a:masterClrMapping/>
@@ -6117,13 +5844,7 @@
       </p:grpSpPr>
       <p:sp>
         <p:nvSpPr>
-          <p:cNvPr id="4" name="Footer Placeholder 3">
-            <a:extLst>
-              <a:ext uri="{FF2B5EF4-FFF2-40B4-BE49-F238E27FC236}">
-                <a16:creationId xmlns:a16="http://schemas.microsoft.com/office/drawing/2014/main" id="{F5AC22D2-E9B6-CF70-9277-2F67F641D48C}"/>
-              </a:ext>
-            </a:extLst>
-          </p:cNvPr>
+          <p:cNvPr id="4" name="Footer Placeholder 3"/>
           <p:cNvSpPr>
             <a:spLocks noGrp="1"/>
           </p:cNvSpPr>
@@ -6146,13 +5867,7 @@
       </p:sp>
       <p:sp>
         <p:nvSpPr>
-          <p:cNvPr id="5" name="Slide Number Placeholder 4">
-            <a:extLst>
-              <a:ext uri="{FF2B5EF4-FFF2-40B4-BE49-F238E27FC236}">
-                <a16:creationId xmlns:a16="http://schemas.microsoft.com/office/drawing/2014/main" id="{54AF1378-43FB-AFA0-3FB8-007E64958519}"/>
-              </a:ext>
-            </a:extLst>
-          </p:cNvPr>
+          <p:cNvPr id="5" name="Slide Number Placeholder 4"/>
           <p:cNvSpPr>
             <a:spLocks noGrp="1"/>
           </p:cNvSpPr>
@@ -6167,8 +5882,6 @@
           <a:p>
             <a:fld id="{1245FD78-8DE1-44B0-BD44-E067D054697C}" type="slidenum">
               <a:rPr lang="en-IN" smtClean="0"/>
-              <a:pPr/>
-              <a:t>12</a:t>
             </a:fld>
             <a:endParaRPr lang="en-IN"/>
           </a:p>
@@ -6176,13 +5889,7 @@
       </p:sp>
       <p:sp>
         <p:nvSpPr>
-          <p:cNvPr id="6" name="TextBox 5">
-            <a:extLst>
-              <a:ext uri="{FF2B5EF4-FFF2-40B4-BE49-F238E27FC236}">
-                <a16:creationId xmlns:a16="http://schemas.microsoft.com/office/drawing/2014/main" id="{E679590D-A1A8-6769-BE30-8C32395A62F3}"/>
-              </a:ext>
-            </a:extLst>
-          </p:cNvPr>
+          <p:cNvPr id="6" name="TextBox 5"/>
           <p:cNvSpPr txBox="1"/>
           <p:nvPr/>
         </p:nvSpPr>
@@ -6209,18 +5916,16 @@
               </a:rPr>
               <a:t>Low Level Designs</a:t>
             </a:r>
+            <a:endParaRPr lang="en-US" sz="1600" dirty="0">
+              <a:latin typeface="Times New Roman" panose="02020603050405020304" pitchFamily="18" charset="0"/>
+              <a:cs typeface="Times New Roman" panose="02020603050405020304" pitchFamily="18" charset="0"/>
+            </a:endParaRPr>
           </a:p>
         </p:txBody>
       </p:sp>
       <p:cxnSp>
         <p:nvCxnSpPr>
-          <p:cNvPr id="7" name="Straight Connector 6">
-            <a:extLst>
-              <a:ext uri="{FF2B5EF4-FFF2-40B4-BE49-F238E27FC236}">
-                <a16:creationId xmlns:a16="http://schemas.microsoft.com/office/drawing/2014/main" id="{B312CFFA-687D-96A3-4CA1-6250106E4780}"/>
-              </a:ext>
-            </a:extLst>
-          </p:cNvPr>
+          <p:cNvPr id="7" name="Straight Connector 6"/>
           <p:cNvCxnSpPr/>
           <p:nvPr/>
         </p:nvCxnSpPr>
@@ -6250,13 +5955,7 @@
       </p:cxnSp>
       <p:cxnSp>
         <p:nvCxnSpPr>
-          <p:cNvPr id="8" name="Straight Connector 7">
-            <a:extLst>
-              <a:ext uri="{FF2B5EF4-FFF2-40B4-BE49-F238E27FC236}">
-                <a16:creationId xmlns:a16="http://schemas.microsoft.com/office/drawing/2014/main" id="{DAC9B81A-0678-EAF3-C194-CF18A259FA95}"/>
-              </a:ext>
-            </a:extLst>
-          </p:cNvPr>
+          <p:cNvPr id="8" name="Straight Connector 7"/>
           <p:cNvCxnSpPr/>
           <p:nvPr/>
         </p:nvCxnSpPr>
@@ -6286,13 +5985,7 @@
       </p:cxnSp>
       <p:sp>
         <p:nvSpPr>
-          <p:cNvPr id="9" name="Rectangle 8">
-            <a:extLst>
-              <a:ext uri="{FF2B5EF4-FFF2-40B4-BE49-F238E27FC236}">
-                <a16:creationId xmlns:a16="http://schemas.microsoft.com/office/drawing/2014/main" id="{772BCB37-44D3-59AB-490A-CD3772F8E5A3}"/>
-              </a:ext>
-            </a:extLst>
-          </p:cNvPr>
+          <p:cNvPr id="9" name="Rectangle 8"/>
           <p:cNvSpPr/>
           <p:nvPr/>
         </p:nvSpPr>
@@ -6335,20 +6028,14 @@
       </p:sp>
       <p:pic>
         <p:nvPicPr>
-          <p:cNvPr id="25" name="Picture 24">
-            <a:extLst>
-              <a:ext uri="{FF2B5EF4-FFF2-40B4-BE49-F238E27FC236}">
-                <a16:creationId xmlns:a16="http://schemas.microsoft.com/office/drawing/2014/main" id="{66381D09-BFEF-6F97-1B71-51DC254CD7DD}"/>
-              </a:ext>
-            </a:extLst>
-          </p:cNvPr>
+          <p:cNvPr id="25" name="Picture 24"/>
           <p:cNvPicPr>
             <a:picLocks noChangeAspect="1"/>
           </p:cNvPicPr>
           <p:nvPr/>
         </p:nvPicPr>
         <p:blipFill>
-          <a:blip r:embed="rId2">
+          <a:blip r:embed="rId1">
             <a:extLst>
               <a:ext uri="{28A0092B-C50C-407E-A947-70E740481C1C}">
                 <a14:useLocalDpi xmlns:a14="http://schemas.microsoft.com/office/drawing/2010/main" val="0"/>
@@ -6371,13 +6058,7 @@
       </p:pic>
       <p:sp>
         <p:nvSpPr>
-          <p:cNvPr id="2" name="TextBox 1">
-            <a:extLst>
-              <a:ext uri="{FF2B5EF4-FFF2-40B4-BE49-F238E27FC236}">
-                <a16:creationId xmlns:a16="http://schemas.microsoft.com/office/drawing/2014/main" id="{DBE64F7E-515B-56A1-8CE4-A179179C7A6E}"/>
-              </a:ext>
-            </a:extLst>
-          </p:cNvPr>
+          <p:cNvPr id="2" name="TextBox 1"/>
           <p:cNvSpPr txBox="1"/>
           <p:nvPr/>
         </p:nvSpPr>
@@ -6401,15 +6082,11 @@
               <a:rPr lang="en-US" sz="1400" i="1" dirty="0"/>
               <a:t>(b)Detecting ingredients required for the user</a:t>
             </a:r>
+            <a:endParaRPr lang="en-US" sz="1400" i="1" dirty="0"/>
           </a:p>
         </p:txBody>
       </p:sp>
     </p:spTree>
-    <p:extLst>
-      <p:ext uri="{BB962C8B-B14F-4D97-AF65-F5344CB8AC3E}">
-        <p14:creationId xmlns:p14="http://schemas.microsoft.com/office/powerpoint/2010/main" val="3370257765"/>
-      </p:ext>
-    </p:extLst>
   </p:cSld>
   <p:clrMapOvr>
     <a:masterClrMapping/>
@@ -6436,13 +6113,7 @@
       </p:grpSpPr>
       <p:sp>
         <p:nvSpPr>
-          <p:cNvPr id="4" name="Footer Placeholder 3">
-            <a:extLst>
-              <a:ext uri="{FF2B5EF4-FFF2-40B4-BE49-F238E27FC236}">
-                <a16:creationId xmlns:a16="http://schemas.microsoft.com/office/drawing/2014/main" id="{F5AC22D2-E9B6-CF70-9277-2F67F641D48C}"/>
-              </a:ext>
-            </a:extLst>
-          </p:cNvPr>
+          <p:cNvPr id="4" name="Footer Placeholder 3"/>
           <p:cNvSpPr>
             <a:spLocks noGrp="1"/>
           </p:cNvSpPr>
@@ -6465,13 +6136,7 @@
       </p:sp>
       <p:sp>
         <p:nvSpPr>
-          <p:cNvPr id="5" name="Slide Number Placeholder 4">
-            <a:extLst>
-              <a:ext uri="{FF2B5EF4-FFF2-40B4-BE49-F238E27FC236}">
-                <a16:creationId xmlns:a16="http://schemas.microsoft.com/office/drawing/2014/main" id="{54AF1378-43FB-AFA0-3FB8-007E64958519}"/>
-              </a:ext>
-            </a:extLst>
-          </p:cNvPr>
+          <p:cNvPr id="5" name="Slide Number Placeholder 4"/>
           <p:cNvSpPr>
             <a:spLocks noGrp="1"/>
           </p:cNvSpPr>
@@ -6486,8 +6151,6 @@
           <a:p>
             <a:fld id="{1245FD78-8DE1-44B0-BD44-E067D054697C}" type="slidenum">
               <a:rPr lang="en-IN" smtClean="0"/>
-              <a:pPr/>
-              <a:t>13</a:t>
             </a:fld>
             <a:endParaRPr lang="en-IN"/>
           </a:p>
@@ -6495,13 +6158,7 @@
       </p:sp>
       <p:sp>
         <p:nvSpPr>
-          <p:cNvPr id="6" name="TextBox 5">
-            <a:extLst>
-              <a:ext uri="{FF2B5EF4-FFF2-40B4-BE49-F238E27FC236}">
-                <a16:creationId xmlns:a16="http://schemas.microsoft.com/office/drawing/2014/main" id="{E679590D-A1A8-6769-BE30-8C32395A62F3}"/>
-              </a:ext>
-            </a:extLst>
-          </p:cNvPr>
+          <p:cNvPr id="6" name="TextBox 5"/>
           <p:cNvSpPr txBox="1"/>
           <p:nvPr/>
         </p:nvSpPr>
@@ -6528,18 +6185,16 @@
               </a:rPr>
               <a:t>Low Level Designs</a:t>
             </a:r>
+            <a:endParaRPr lang="en-US" sz="1600" dirty="0">
+              <a:latin typeface="Times New Roman" panose="02020603050405020304" pitchFamily="18" charset="0"/>
+              <a:cs typeface="Times New Roman" panose="02020603050405020304" pitchFamily="18" charset="0"/>
+            </a:endParaRPr>
           </a:p>
         </p:txBody>
       </p:sp>
       <p:cxnSp>
         <p:nvCxnSpPr>
-          <p:cNvPr id="7" name="Straight Connector 6">
-            <a:extLst>
-              <a:ext uri="{FF2B5EF4-FFF2-40B4-BE49-F238E27FC236}">
-                <a16:creationId xmlns:a16="http://schemas.microsoft.com/office/drawing/2014/main" id="{B312CFFA-687D-96A3-4CA1-6250106E4780}"/>
-              </a:ext>
-            </a:extLst>
-          </p:cNvPr>
+          <p:cNvPr id="7" name="Straight Connector 6"/>
           <p:cNvCxnSpPr/>
           <p:nvPr/>
         </p:nvCxnSpPr>
@@ -6569,13 +6224,7 @@
       </p:cxnSp>
       <p:cxnSp>
         <p:nvCxnSpPr>
-          <p:cNvPr id="8" name="Straight Connector 7">
-            <a:extLst>
-              <a:ext uri="{FF2B5EF4-FFF2-40B4-BE49-F238E27FC236}">
-                <a16:creationId xmlns:a16="http://schemas.microsoft.com/office/drawing/2014/main" id="{DAC9B81A-0678-EAF3-C194-CF18A259FA95}"/>
-              </a:ext>
-            </a:extLst>
-          </p:cNvPr>
+          <p:cNvPr id="8" name="Straight Connector 7"/>
           <p:cNvCxnSpPr/>
           <p:nvPr/>
         </p:nvCxnSpPr>
@@ -6605,13 +6254,7 @@
       </p:cxnSp>
       <p:sp>
         <p:nvSpPr>
-          <p:cNvPr id="9" name="Rectangle 8">
-            <a:extLst>
-              <a:ext uri="{FF2B5EF4-FFF2-40B4-BE49-F238E27FC236}">
-                <a16:creationId xmlns:a16="http://schemas.microsoft.com/office/drawing/2014/main" id="{772BCB37-44D3-59AB-490A-CD3772F8E5A3}"/>
-              </a:ext>
-            </a:extLst>
-          </p:cNvPr>
+          <p:cNvPr id="9" name="Rectangle 8"/>
           <p:cNvSpPr/>
           <p:nvPr/>
         </p:nvSpPr>
@@ -6654,20 +6297,14 @@
       </p:sp>
       <p:pic>
         <p:nvPicPr>
-          <p:cNvPr id="27" name="Picture 26">
-            <a:extLst>
-              <a:ext uri="{FF2B5EF4-FFF2-40B4-BE49-F238E27FC236}">
-                <a16:creationId xmlns:a16="http://schemas.microsoft.com/office/drawing/2014/main" id="{95DDC053-91BB-AA50-8690-A9F18877FE64}"/>
-              </a:ext>
-            </a:extLst>
-          </p:cNvPr>
+          <p:cNvPr id="27" name="Picture 26"/>
           <p:cNvPicPr>
             <a:picLocks noChangeAspect="1"/>
           </p:cNvPicPr>
           <p:nvPr/>
         </p:nvPicPr>
         <p:blipFill>
-          <a:blip r:embed="rId2">
+          <a:blip r:embed="rId1">
             <a:extLst>
               <a:ext uri="{28A0092B-C50C-407E-A947-70E740481C1C}">
                 <a14:useLocalDpi xmlns:a14="http://schemas.microsoft.com/office/drawing/2010/main" val="0"/>
@@ -6690,13 +6327,7 @@
       </p:pic>
       <p:sp>
         <p:nvSpPr>
-          <p:cNvPr id="11" name="TextBox 10">
-            <a:extLst>
-              <a:ext uri="{FF2B5EF4-FFF2-40B4-BE49-F238E27FC236}">
-                <a16:creationId xmlns:a16="http://schemas.microsoft.com/office/drawing/2014/main" id="{8A22CE9E-069C-D0BC-F145-6D56530D2B80}"/>
-              </a:ext>
-            </a:extLst>
-          </p:cNvPr>
+          <p:cNvPr id="11" name="TextBox 10"/>
           <p:cNvSpPr txBox="1"/>
           <p:nvPr/>
         </p:nvSpPr>
@@ -6720,15 +6351,11 @@
               <a:rPr lang="en-US" sz="1400" i="1" dirty="0"/>
               <a:t>(c) Obtaining foods with the specific set of ingredients</a:t>
             </a:r>
+            <a:endParaRPr lang="en-US" sz="1400" i="1" dirty="0"/>
           </a:p>
         </p:txBody>
       </p:sp>
     </p:spTree>
-    <p:extLst>
-      <p:ext uri="{BB962C8B-B14F-4D97-AF65-F5344CB8AC3E}">
-        <p14:creationId xmlns:p14="http://schemas.microsoft.com/office/powerpoint/2010/main" val="1950374326"/>
-      </p:ext>
-    </p:extLst>
   </p:cSld>
   <p:clrMapOvr>
     <a:masterClrMapping/>
@@ -6755,13 +6382,7 @@
       </p:grpSpPr>
       <p:sp>
         <p:nvSpPr>
-          <p:cNvPr id="4" name="Footer Placeholder 3">
-            <a:extLst>
-              <a:ext uri="{FF2B5EF4-FFF2-40B4-BE49-F238E27FC236}">
-                <a16:creationId xmlns:a16="http://schemas.microsoft.com/office/drawing/2014/main" id="{F5AC22D2-E9B6-CF70-9277-2F67F641D48C}"/>
-              </a:ext>
-            </a:extLst>
-          </p:cNvPr>
+          <p:cNvPr id="4" name="Footer Placeholder 3"/>
           <p:cNvSpPr>
             <a:spLocks noGrp="1"/>
           </p:cNvSpPr>
@@ -6784,13 +6405,7 @@
       </p:sp>
       <p:sp>
         <p:nvSpPr>
-          <p:cNvPr id="5" name="Slide Number Placeholder 4">
-            <a:extLst>
-              <a:ext uri="{FF2B5EF4-FFF2-40B4-BE49-F238E27FC236}">
-                <a16:creationId xmlns:a16="http://schemas.microsoft.com/office/drawing/2014/main" id="{54AF1378-43FB-AFA0-3FB8-007E64958519}"/>
-              </a:ext>
-            </a:extLst>
-          </p:cNvPr>
+          <p:cNvPr id="5" name="Slide Number Placeholder 4"/>
           <p:cNvSpPr>
             <a:spLocks noGrp="1"/>
           </p:cNvSpPr>
@@ -6805,8 +6420,6 @@
           <a:p>
             <a:fld id="{1245FD78-8DE1-44B0-BD44-E067D054697C}" type="slidenum">
               <a:rPr lang="en-IN" smtClean="0"/>
-              <a:pPr/>
-              <a:t>14</a:t>
             </a:fld>
             <a:endParaRPr lang="en-IN"/>
           </a:p>
@@ -6814,13 +6427,7 @@
       </p:sp>
       <p:sp>
         <p:nvSpPr>
-          <p:cNvPr id="6" name="TextBox 5">
-            <a:extLst>
-              <a:ext uri="{FF2B5EF4-FFF2-40B4-BE49-F238E27FC236}">
-                <a16:creationId xmlns:a16="http://schemas.microsoft.com/office/drawing/2014/main" id="{E679590D-A1A8-6769-BE30-8C32395A62F3}"/>
-              </a:ext>
-            </a:extLst>
-          </p:cNvPr>
+          <p:cNvPr id="6" name="TextBox 5"/>
           <p:cNvSpPr txBox="1"/>
           <p:nvPr/>
         </p:nvSpPr>
@@ -6847,18 +6454,16 @@
               </a:rPr>
               <a:t>Low Level Designs</a:t>
             </a:r>
+            <a:endParaRPr lang="en-US" sz="1600" dirty="0">
+              <a:latin typeface="Times New Roman" panose="02020603050405020304" pitchFamily="18" charset="0"/>
+              <a:cs typeface="Times New Roman" panose="02020603050405020304" pitchFamily="18" charset="0"/>
+            </a:endParaRPr>
           </a:p>
         </p:txBody>
       </p:sp>
       <p:cxnSp>
         <p:nvCxnSpPr>
-          <p:cNvPr id="7" name="Straight Connector 6">
-            <a:extLst>
-              <a:ext uri="{FF2B5EF4-FFF2-40B4-BE49-F238E27FC236}">
-                <a16:creationId xmlns:a16="http://schemas.microsoft.com/office/drawing/2014/main" id="{B312CFFA-687D-96A3-4CA1-6250106E4780}"/>
-              </a:ext>
-            </a:extLst>
-          </p:cNvPr>
+          <p:cNvPr id="7" name="Straight Connector 6"/>
           <p:cNvCxnSpPr/>
           <p:nvPr/>
         </p:nvCxnSpPr>
@@ -6888,13 +6493,7 @@
       </p:cxnSp>
       <p:cxnSp>
         <p:nvCxnSpPr>
-          <p:cNvPr id="8" name="Straight Connector 7">
-            <a:extLst>
-              <a:ext uri="{FF2B5EF4-FFF2-40B4-BE49-F238E27FC236}">
-                <a16:creationId xmlns:a16="http://schemas.microsoft.com/office/drawing/2014/main" id="{DAC9B81A-0678-EAF3-C194-CF18A259FA95}"/>
-              </a:ext>
-            </a:extLst>
-          </p:cNvPr>
+          <p:cNvPr id="8" name="Straight Connector 7"/>
           <p:cNvCxnSpPr/>
           <p:nvPr/>
         </p:nvCxnSpPr>
@@ -6924,13 +6523,7 @@
       </p:cxnSp>
       <p:sp>
         <p:nvSpPr>
-          <p:cNvPr id="9" name="Rectangle 8">
-            <a:extLst>
-              <a:ext uri="{FF2B5EF4-FFF2-40B4-BE49-F238E27FC236}">
-                <a16:creationId xmlns:a16="http://schemas.microsoft.com/office/drawing/2014/main" id="{772BCB37-44D3-59AB-490A-CD3772F8E5A3}"/>
-              </a:ext>
-            </a:extLst>
-          </p:cNvPr>
+          <p:cNvPr id="9" name="Rectangle 8"/>
           <p:cNvSpPr/>
           <p:nvPr/>
         </p:nvSpPr>
@@ -6973,20 +6566,14 @@
       </p:sp>
       <p:pic>
         <p:nvPicPr>
-          <p:cNvPr id="29" name="Picture 28">
-            <a:extLst>
-              <a:ext uri="{FF2B5EF4-FFF2-40B4-BE49-F238E27FC236}">
-                <a16:creationId xmlns:a16="http://schemas.microsoft.com/office/drawing/2014/main" id="{E252FE89-3B53-817B-60FA-BB219872D477}"/>
-              </a:ext>
-            </a:extLst>
-          </p:cNvPr>
+          <p:cNvPr id="29" name="Picture 28"/>
           <p:cNvPicPr>
             <a:picLocks noChangeAspect="1"/>
           </p:cNvPicPr>
           <p:nvPr/>
         </p:nvPicPr>
         <p:blipFill>
-          <a:blip r:embed="rId2">
+          <a:blip r:embed="rId1">
             <a:extLst>
               <a:ext uri="{28A0092B-C50C-407E-A947-70E740481C1C}">
                 <a14:useLocalDpi xmlns:a14="http://schemas.microsoft.com/office/drawing/2010/main" val="0"/>
@@ -7009,13 +6596,7 @@
       </p:pic>
       <p:sp>
         <p:nvSpPr>
-          <p:cNvPr id="2" name="TextBox 1">
-            <a:extLst>
-              <a:ext uri="{FF2B5EF4-FFF2-40B4-BE49-F238E27FC236}">
-                <a16:creationId xmlns:a16="http://schemas.microsoft.com/office/drawing/2014/main" id="{92697617-0B15-F335-CDFA-742CE30FCDE6}"/>
-              </a:ext>
-            </a:extLst>
-          </p:cNvPr>
+          <p:cNvPr id="2" name="TextBox 1"/>
           <p:cNvSpPr txBox="1"/>
           <p:nvPr/>
         </p:nvSpPr>
@@ -7039,15 +6620,11 @@
               <a:rPr lang="en-US" sz="1400" i="1" dirty="0"/>
               <a:t>(d) Scraping nutritional value of cooked products</a:t>
             </a:r>
+            <a:endParaRPr lang="en-US" sz="1400" i="1" dirty="0"/>
           </a:p>
         </p:txBody>
       </p:sp>
     </p:spTree>
-    <p:extLst>
-      <p:ext uri="{BB962C8B-B14F-4D97-AF65-F5344CB8AC3E}">
-        <p14:creationId xmlns:p14="http://schemas.microsoft.com/office/powerpoint/2010/main" val="358380602"/>
-      </p:ext>
-    </p:extLst>
   </p:cSld>
   <p:clrMapOvr>
     <a:masterClrMapping/>
@@ -7074,13 +6651,7 @@
       </p:grpSpPr>
       <p:sp>
         <p:nvSpPr>
-          <p:cNvPr id="4" name="Footer Placeholder 3">
-            <a:extLst>
-              <a:ext uri="{FF2B5EF4-FFF2-40B4-BE49-F238E27FC236}">
-                <a16:creationId xmlns:a16="http://schemas.microsoft.com/office/drawing/2014/main" id="{F5AC22D2-E9B6-CF70-9277-2F67F641D48C}"/>
-              </a:ext>
-            </a:extLst>
-          </p:cNvPr>
+          <p:cNvPr id="4" name="Footer Placeholder 3"/>
           <p:cNvSpPr>
             <a:spLocks noGrp="1"/>
           </p:cNvSpPr>
@@ -7103,13 +6674,7 @@
       </p:sp>
       <p:sp>
         <p:nvSpPr>
-          <p:cNvPr id="5" name="Slide Number Placeholder 4">
-            <a:extLst>
-              <a:ext uri="{FF2B5EF4-FFF2-40B4-BE49-F238E27FC236}">
-                <a16:creationId xmlns:a16="http://schemas.microsoft.com/office/drawing/2014/main" id="{54AF1378-43FB-AFA0-3FB8-007E64958519}"/>
-              </a:ext>
-            </a:extLst>
-          </p:cNvPr>
+          <p:cNvPr id="5" name="Slide Number Placeholder 4"/>
           <p:cNvSpPr>
             <a:spLocks noGrp="1"/>
           </p:cNvSpPr>
@@ -7124,8 +6689,6 @@
           <a:p>
             <a:fld id="{1245FD78-8DE1-44B0-BD44-E067D054697C}" type="slidenum">
               <a:rPr lang="en-IN" smtClean="0"/>
-              <a:pPr/>
-              <a:t>15</a:t>
             </a:fld>
             <a:endParaRPr lang="en-IN"/>
           </a:p>
@@ -7133,13 +6696,7 @@
       </p:sp>
       <p:sp>
         <p:nvSpPr>
-          <p:cNvPr id="6" name="TextBox 5">
-            <a:extLst>
-              <a:ext uri="{FF2B5EF4-FFF2-40B4-BE49-F238E27FC236}">
-                <a16:creationId xmlns:a16="http://schemas.microsoft.com/office/drawing/2014/main" id="{E679590D-A1A8-6769-BE30-8C32395A62F3}"/>
-              </a:ext>
-            </a:extLst>
-          </p:cNvPr>
+          <p:cNvPr id="6" name="TextBox 5"/>
           <p:cNvSpPr txBox="1"/>
           <p:nvPr/>
         </p:nvSpPr>
@@ -7166,18 +6723,16 @@
               </a:rPr>
               <a:t>Low Level Designs</a:t>
             </a:r>
+            <a:endParaRPr lang="en-US" sz="1600" dirty="0">
+              <a:latin typeface="Times New Roman" panose="02020603050405020304" pitchFamily="18" charset="0"/>
+              <a:cs typeface="Times New Roman" panose="02020603050405020304" pitchFamily="18" charset="0"/>
+            </a:endParaRPr>
           </a:p>
         </p:txBody>
       </p:sp>
       <p:cxnSp>
         <p:nvCxnSpPr>
-          <p:cNvPr id="7" name="Straight Connector 6">
-            <a:extLst>
-              <a:ext uri="{FF2B5EF4-FFF2-40B4-BE49-F238E27FC236}">
-                <a16:creationId xmlns:a16="http://schemas.microsoft.com/office/drawing/2014/main" id="{B312CFFA-687D-96A3-4CA1-6250106E4780}"/>
-              </a:ext>
-            </a:extLst>
-          </p:cNvPr>
+          <p:cNvPr id="7" name="Straight Connector 6"/>
           <p:cNvCxnSpPr/>
           <p:nvPr/>
         </p:nvCxnSpPr>
@@ -7207,13 +6762,7 @@
       </p:cxnSp>
       <p:cxnSp>
         <p:nvCxnSpPr>
-          <p:cNvPr id="8" name="Straight Connector 7">
-            <a:extLst>
-              <a:ext uri="{FF2B5EF4-FFF2-40B4-BE49-F238E27FC236}">
-                <a16:creationId xmlns:a16="http://schemas.microsoft.com/office/drawing/2014/main" id="{DAC9B81A-0678-EAF3-C194-CF18A259FA95}"/>
-              </a:ext>
-            </a:extLst>
-          </p:cNvPr>
+          <p:cNvPr id="8" name="Straight Connector 7"/>
           <p:cNvCxnSpPr/>
           <p:nvPr/>
         </p:nvCxnSpPr>
@@ -7243,13 +6792,7 @@
       </p:cxnSp>
       <p:sp>
         <p:nvSpPr>
-          <p:cNvPr id="9" name="Rectangle 8">
-            <a:extLst>
-              <a:ext uri="{FF2B5EF4-FFF2-40B4-BE49-F238E27FC236}">
-                <a16:creationId xmlns:a16="http://schemas.microsoft.com/office/drawing/2014/main" id="{772BCB37-44D3-59AB-490A-CD3772F8E5A3}"/>
-              </a:ext>
-            </a:extLst>
-          </p:cNvPr>
+          <p:cNvPr id="9" name="Rectangle 8"/>
           <p:cNvSpPr/>
           <p:nvPr/>
         </p:nvSpPr>
@@ -7292,13 +6835,37 @@
       </p:sp>
       <p:pic>
         <p:nvPicPr>
-          <p:cNvPr id="31" name="Picture 30">
+          <p:cNvPr id="31" name="Picture 30"/>
+          <p:cNvPicPr>
+            <a:picLocks noChangeAspect="1"/>
+          </p:cNvPicPr>
+          <p:nvPr/>
+        </p:nvPicPr>
+        <p:blipFill>
+          <a:blip r:embed="rId1">
             <a:extLst>
-              <a:ext uri="{FF2B5EF4-FFF2-40B4-BE49-F238E27FC236}">
-                <a16:creationId xmlns:a16="http://schemas.microsoft.com/office/drawing/2014/main" id="{67154E55-C4DA-D355-54F0-2CCEA11FC36C}"/>
+              <a:ext uri="{28A0092B-C50C-407E-A947-70E740481C1C}">
+                <a14:useLocalDpi xmlns:a14="http://schemas.microsoft.com/office/drawing/2010/main" val="0"/>
               </a:ext>
             </a:extLst>
-          </p:cNvPr>
+          </a:blip>
+          <a:stretch>
+            <a:fillRect/>
+          </a:stretch>
+        </p:blipFill>
+        <p:spPr>
+          <a:xfrm>
+            <a:off x="2649371" y="1715845"/>
+            <a:ext cx="2073628" cy="2937640"/>
+          </a:xfrm>
+          <a:prstGeom prst="rect">
+            <a:avLst/>
+          </a:prstGeom>
+        </p:spPr>
+      </p:pic>
+      <p:pic>
+        <p:nvPicPr>
+          <p:cNvPr id="33" name="Picture 32"/>
           <p:cNvPicPr>
             <a:picLocks noChangeAspect="1"/>
           </p:cNvPicPr>
@@ -7318,59 +6885,17 @@
         </p:blipFill>
         <p:spPr>
           <a:xfrm>
-            <a:off x="2649371" y="1715845"/>
-            <a:ext cx="2073628" cy="2937640"/>
+            <a:off x="7942031" y="1715845"/>
+            <a:ext cx="1958427" cy="2937640"/>
           </a:xfrm>
           <a:prstGeom prst="rect">
             <a:avLst/>
           </a:prstGeom>
         </p:spPr>
       </p:pic>
-      <p:pic>
-        <p:nvPicPr>
-          <p:cNvPr id="33" name="Picture 32">
-            <a:extLst>
-              <a:ext uri="{FF2B5EF4-FFF2-40B4-BE49-F238E27FC236}">
-                <a16:creationId xmlns:a16="http://schemas.microsoft.com/office/drawing/2014/main" id="{FD88AF96-D710-31BE-731B-76A151902C1D}"/>
-              </a:ext>
-            </a:extLst>
-          </p:cNvPr>
-          <p:cNvPicPr>
-            <a:picLocks noChangeAspect="1"/>
-          </p:cNvPicPr>
-          <p:nvPr/>
-        </p:nvPicPr>
-        <p:blipFill>
-          <a:blip r:embed="rId3">
-            <a:extLst>
-              <a:ext uri="{28A0092B-C50C-407E-A947-70E740481C1C}">
-                <a14:useLocalDpi xmlns:a14="http://schemas.microsoft.com/office/drawing/2010/main" val="0"/>
-              </a:ext>
-            </a:extLst>
-          </a:blip>
-          <a:stretch>
-            <a:fillRect/>
-          </a:stretch>
-        </p:blipFill>
-        <p:spPr>
-          <a:xfrm>
-            <a:off x="7942031" y="1715845"/>
-            <a:ext cx="1958427" cy="2937640"/>
-          </a:xfrm>
-          <a:prstGeom prst="rect">
-            <a:avLst/>
-          </a:prstGeom>
-        </p:spPr>
-      </p:pic>
-      <p:sp>
-        <p:nvSpPr>
-          <p:cNvPr id="2" name="TextBox 1">
-            <a:extLst>
-              <a:ext uri="{FF2B5EF4-FFF2-40B4-BE49-F238E27FC236}">
-                <a16:creationId xmlns:a16="http://schemas.microsoft.com/office/drawing/2014/main" id="{0F694E39-E5DD-C7F9-3766-34FA7D3D580D}"/>
-              </a:ext>
-            </a:extLst>
-          </p:cNvPr>
+      <p:sp>
+        <p:nvSpPr>
+          <p:cNvPr id="2" name="TextBox 1"/>
           <p:cNvSpPr txBox="1"/>
           <p:nvPr/>
         </p:nvSpPr>
@@ -7394,18 +6919,13 @@
               <a:rPr lang="en-US" sz="1400" i="1" dirty="0"/>
               <a:t>(e) Obtaining best recommendations for user</a:t>
             </a:r>
-          </a:p>
-        </p:txBody>
-      </p:sp>
-      <p:sp>
-        <p:nvSpPr>
-          <p:cNvPr id="3" name="TextBox 2">
-            <a:extLst>
-              <a:ext uri="{FF2B5EF4-FFF2-40B4-BE49-F238E27FC236}">
-                <a16:creationId xmlns:a16="http://schemas.microsoft.com/office/drawing/2014/main" id="{FDDDFD9C-2655-2B36-2E8D-B1FE5E5C511D}"/>
-              </a:ext>
-            </a:extLst>
-          </p:cNvPr>
+            <a:endParaRPr lang="en-US" sz="1400" i="1" dirty="0"/>
+          </a:p>
+        </p:txBody>
+      </p:sp>
+      <p:sp>
+        <p:nvSpPr>
+          <p:cNvPr id="3" name="TextBox 2"/>
           <p:cNvSpPr txBox="1"/>
           <p:nvPr/>
         </p:nvSpPr>
@@ -7429,15 +6949,11 @@
               <a:rPr lang="en-US" sz="1400" i="1" dirty="0"/>
               <a:t>(f) Redirecting user to the video containing the recipes of the top recommendations</a:t>
             </a:r>
+            <a:endParaRPr lang="en-US" sz="1400" i="1" dirty="0"/>
           </a:p>
         </p:txBody>
       </p:sp>
     </p:spTree>
-    <p:extLst>
-      <p:ext uri="{BB962C8B-B14F-4D97-AF65-F5344CB8AC3E}">
-        <p14:creationId xmlns:p14="http://schemas.microsoft.com/office/powerpoint/2010/main" val="2690733349"/>
-      </p:ext>
-    </p:extLst>
   </p:cSld>
   <p:clrMapOvr>
     <a:masterClrMapping/>
@@ -7477,7 +6993,7 @@
             <a:avLst/>
           </a:prstGeom>
           <a:blipFill>
-            <a:blip r:embed="rId2" cstate="print"/>
+            <a:blip r:embed="rId1" cstate="print"/>
             <a:stretch>
               <a:fillRect/>
             </a:stretch>
@@ -7486,9 +7002,7 @@
         <p:txBody>
           <a:bodyPr wrap="square" lIns="0" tIns="0" rIns="0" bIns="0" rtlCol="0"/>
           <a:lstStyle/>
-          <a:p>
-            <a:endParaRPr/>
-          </a:p>
+          <a:p/>
         </p:txBody>
       </p:sp>
       <p:sp>
@@ -7568,7 +7082,7 @@
               <a:buClr>
                 <a:srgbClr val="FFFFFF"/>
               </a:buClr>
-              <a:buFont typeface="Arial"/>
+              <a:buFont typeface="Arial" panose="020B0604020202020204"/>
               <a:buChar char="•"/>
               <a:tabLst>
                 <a:tab pos="321945" algn="l"/>
@@ -7617,18 +7131,16 @@
               </a:rPr>
               <a:t>Thank You</a:t>
             </a:r>
-          </a:p>
-        </p:txBody>
-      </p:sp>
-      <p:sp>
-        <p:nvSpPr>
-          <p:cNvPr id="10" name="TextBox 9">
-            <a:extLst>
-              <a:ext uri="{FF2B5EF4-FFF2-40B4-BE49-F238E27FC236}">
-                <a16:creationId xmlns:a16="http://schemas.microsoft.com/office/drawing/2014/main" id="{AEF1C737-BDB6-BC6E-9FC0-7EA315C5F746}"/>
-              </a:ext>
-            </a:extLst>
-          </p:cNvPr>
+            <a:endParaRPr lang="en-IN" dirty="0">
+              <a:latin typeface="Times New Roman" panose="02020603050405020304" pitchFamily="18" charset="0"/>
+              <a:cs typeface="Times New Roman" panose="02020603050405020304" pitchFamily="18" charset="0"/>
+            </a:endParaRPr>
+          </a:p>
+        </p:txBody>
+      </p:sp>
+      <p:sp>
+        <p:nvSpPr>
+          <p:cNvPr id="10" name="TextBox 9"/>
           <p:cNvSpPr txBox="1"/>
           <p:nvPr/>
         </p:nvSpPr>
@@ -7655,18 +7167,16 @@
               </a:rPr>
               <a:t>FUTURE WORK</a:t>
             </a:r>
+            <a:endParaRPr lang="en-US" sz="2000" dirty="0">
+              <a:latin typeface="Times New Roman" panose="02020603050405020304" pitchFamily="18" charset="0"/>
+              <a:cs typeface="Times New Roman" panose="02020603050405020304" pitchFamily="18" charset="0"/>
+            </a:endParaRPr>
           </a:p>
         </p:txBody>
       </p:sp>
       <p:cxnSp>
         <p:nvCxnSpPr>
-          <p:cNvPr id="11" name="Straight Connector 10">
-            <a:extLst>
-              <a:ext uri="{FF2B5EF4-FFF2-40B4-BE49-F238E27FC236}">
-                <a16:creationId xmlns:a16="http://schemas.microsoft.com/office/drawing/2014/main" id="{3F3279F2-CAE1-63F3-F671-E797010EA683}"/>
-              </a:ext>
-            </a:extLst>
-          </p:cNvPr>
+          <p:cNvPr id="11" name="Straight Connector 10"/>
           <p:cNvCxnSpPr/>
           <p:nvPr/>
         </p:nvCxnSpPr>
@@ -7696,13 +7206,7 @@
       </p:cxnSp>
       <p:cxnSp>
         <p:nvCxnSpPr>
-          <p:cNvPr id="12" name="Straight Connector 11">
-            <a:extLst>
-              <a:ext uri="{FF2B5EF4-FFF2-40B4-BE49-F238E27FC236}">
-                <a16:creationId xmlns:a16="http://schemas.microsoft.com/office/drawing/2014/main" id="{4B4ADDE5-6665-BCD0-93E3-0B83185235C9}"/>
-              </a:ext>
-            </a:extLst>
-          </p:cNvPr>
+          <p:cNvPr id="12" name="Straight Connector 11"/>
           <p:cNvCxnSpPr/>
           <p:nvPr/>
         </p:nvCxnSpPr>
@@ -7732,13 +7236,7 @@
       </p:cxnSp>
       <p:sp>
         <p:nvSpPr>
-          <p:cNvPr id="17" name="Content Placeholder 2">
-            <a:extLst>
-              <a:ext uri="{FF2B5EF4-FFF2-40B4-BE49-F238E27FC236}">
-                <a16:creationId xmlns:a16="http://schemas.microsoft.com/office/drawing/2014/main" id="{69B4A928-FC4F-92F9-751A-76FCB503E9F4}"/>
-              </a:ext>
-            </a:extLst>
-          </p:cNvPr>
+          <p:cNvPr id="17" name="Content Placeholder 2"/>
           <p:cNvSpPr>
             <a:spLocks noGrp="1"/>
           </p:cNvSpPr>
@@ -7762,7 +7260,7 @@
               <a:spcBef>
                 <a:spcPts val="1200"/>
               </a:spcBef>
-              <a:buFont typeface="Wingdings" pitchFamily="2" charset="2"/>
+              <a:buFont typeface="Wingdings" panose="05000000000000000000" pitchFamily="2" charset="2"/>
               <a:buChar char="§"/>
             </a:pPr>
             <a:r>
@@ -7775,13 +7273,20 @@
               </a:rPr>
               <a:t>We have successfully implemented the first three functional modules of the system architecture i.e. Nutritional Requirements, Mapping Dataset Ingredients and Getting Food Products through API. Remaining modules are yet to be implemented.</a:t>
             </a:r>
+            <a:endParaRPr lang="en-IN" sz="1600" dirty="0">
+              <a:solidFill>
+                <a:schemeClr val="tx1"/>
+              </a:solidFill>
+              <a:latin typeface="Times New Roman" panose="02020603050405020304" pitchFamily="18" charset="0"/>
+              <a:cs typeface="Times New Roman" panose="02020603050405020304" pitchFamily="18" charset="0"/>
+            </a:endParaRPr>
           </a:p>
           <a:p>
             <a:pPr lvl="1" algn="just">
               <a:spcBef>
                 <a:spcPts val="1200"/>
               </a:spcBef>
-              <a:buFont typeface="Wingdings" pitchFamily="2" charset="2"/>
+              <a:buFont typeface="Wingdings" panose="05000000000000000000" pitchFamily="2" charset="2"/>
               <a:buChar char="§"/>
             </a:pPr>
             <a:r>
@@ -7794,13 +7299,20 @@
               </a:rPr>
               <a:t>Integration all functional modules in an end-to-end application with a sophisticated user-friendly UI/UX. </a:t>
             </a:r>
+            <a:endParaRPr lang="en-IN" sz="1600" dirty="0">
+              <a:solidFill>
+                <a:schemeClr val="tx1"/>
+              </a:solidFill>
+              <a:latin typeface="Times New Roman" panose="02020603050405020304" pitchFamily="18" charset="0"/>
+              <a:cs typeface="Times New Roman" panose="02020603050405020304" pitchFamily="18" charset="0"/>
+            </a:endParaRPr>
           </a:p>
           <a:p>
             <a:pPr lvl="1" algn="just">
               <a:spcBef>
                 <a:spcPts val="1200"/>
               </a:spcBef>
-              <a:buFont typeface="Wingdings" pitchFamily="2" charset="2"/>
+              <a:buFont typeface="Wingdings" panose="05000000000000000000" pitchFamily="2" charset="2"/>
               <a:buChar char="§"/>
             </a:pPr>
             <a:r>
@@ -7813,13 +7325,20 @@
               </a:rPr>
               <a:t>Testing on real-time user data.</a:t>
             </a:r>
+            <a:endParaRPr lang="en-IN" sz="1600" dirty="0">
+              <a:solidFill>
+                <a:schemeClr val="tx1"/>
+              </a:solidFill>
+              <a:latin typeface="Times New Roman" panose="02020603050405020304" pitchFamily="18" charset="0"/>
+              <a:cs typeface="Times New Roman" panose="02020603050405020304" pitchFamily="18" charset="0"/>
+            </a:endParaRPr>
           </a:p>
           <a:p>
             <a:pPr lvl="1" algn="just">
               <a:spcBef>
                 <a:spcPts val="1200"/>
               </a:spcBef>
-              <a:buFont typeface="Wingdings" pitchFamily="2" charset="2"/>
+              <a:buFont typeface="Wingdings" panose="05000000000000000000" pitchFamily="2" charset="2"/>
               <a:buChar char="§"/>
             </a:pPr>
             <a:r>
@@ -7832,13 +7351,20 @@
               </a:rPr>
               <a:t>Documentation of the research and results in a scientific paper.</a:t>
             </a:r>
+            <a:endParaRPr lang="en-IN" sz="1600" dirty="0">
+              <a:solidFill>
+                <a:schemeClr val="tx1"/>
+              </a:solidFill>
+              <a:latin typeface="Times New Roman" panose="02020603050405020304" pitchFamily="18" charset="0"/>
+              <a:cs typeface="Times New Roman" panose="02020603050405020304" pitchFamily="18" charset="0"/>
+            </a:endParaRPr>
           </a:p>
           <a:p>
             <a:pPr lvl="1" algn="just">
               <a:spcBef>
                 <a:spcPts val="1200"/>
               </a:spcBef>
-              <a:buFont typeface="Wingdings" pitchFamily="2" charset="2"/>
+              <a:buFont typeface="Wingdings" panose="05000000000000000000" pitchFamily="2" charset="2"/>
               <a:buChar char="§"/>
             </a:pPr>
             <a:endParaRPr lang="en-IN" sz="1600" dirty="0">
@@ -7852,11 +7378,6 @@
         </p:txBody>
       </p:sp>
     </p:spTree>
-    <p:extLst>
-      <p:ext uri="{BB962C8B-B14F-4D97-AF65-F5344CB8AC3E}">
-        <p14:creationId xmlns:p14="http://schemas.microsoft.com/office/powerpoint/2010/main" val="1853199553"/>
-      </p:ext>
-    </p:extLst>
   </p:cSld>
   <p:clrMapOvr>
     <a:masterClrMapping/>
@@ -7901,10 +7422,6 @@
             </a:pPr>
             <a:fld id="{EED0D648-989B-4034-9BD3-6FBF9A769E5B}" type="slidenum">
               <a:rPr lang="en-US" smtClean="0"/>
-              <a:pPr>
-                <a:defRPr/>
-              </a:pPr>
-              <a:t>2</a:t>
             </a:fld>
             <a:endParaRPr lang="en-US"/>
           </a:p>
@@ -7937,6 +7454,10 @@
               </a:rPr>
               <a:t>Introduction</a:t>
             </a:r>
+            <a:endParaRPr lang="en-IN" sz="1600" dirty="0">
+              <a:latin typeface="Times New Roman" panose="02020603050405020304" pitchFamily="18" charset="0"/>
+              <a:cs typeface="Times New Roman" panose="02020603050405020304" pitchFamily="18" charset="0"/>
+            </a:endParaRPr>
           </a:p>
           <a:p>
             <a:pPr marL="342900" indent="-342900">
@@ -7949,6 +7470,10 @@
               </a:rPr>
               <a:t>Problem Statement</a:t>
             </a:r>
+            <a:endParaRPr lang="en-IN" sz="1600" dirty="0">
+              <a:latin typeface="Times New Roman" panose="02020603050405020304" pitchFamily="18" charset="0"/>
+              <a:cs typeface="Times New Roman" panose="02020603050405020304" pitchFamily="18" charset="0"/>
+            </a:endParaRPr>
           </a:p>
           <a:p>
             <a:pPr marL="342900" indent="-342900">
@@ -7961,6 +7486,10 @@
               </a:rPr>
               <a:t>Objectives</a:t>
             </a:r>
+            <a:endParaRPr lang="en-IN" sz="1600" dirty="0">
+              <a:latin typeface="Times New Roman" panose="02020603050405020304" pitchFamily="18" charset="0"/>
+              <a:cs typeface="Times New Roman" panose="02020603050405020304" pitchFamily="18" charset="0"/>
+            </a:endParaRPr>
           </a:p>
           <a:p>
             <a:pPr marL="342900" indent="-342900">
@@ -7973,6 +7502,10 @@
               </a:rPr>
               <a:t>Literature Survey</a:t>
             </a:r>
+            <a:endParaRPr lang="en-IN" sz="1600" dirty="0">
+              <a:latin typeface="Times New Roman" panose="02020603050405020304" pitchFamily="18" charset="0"/>
+              <a:cs typeface="Times New Roman" panose="02020603050405020304" pitchFamily="18" charset="0"/>
+            </a:endParaRPr>
           </a:p>
           <a:p>
             <a:pPr marL="342900" indent="-342900">
@@ -7985,6 +7518,10 @@
               </a:rPr>
               <a:t>Proposed methodology &amp; Concept Diagram</a:t>
             </a:r>
+            <a:endParaRPr lang="en-IN" sz="1600" dirty="0">
+              <a:latin typeface="Times New Roman" panose="02020603050405020304" pitchFamily="18" charset="0"/>
+              <a:cs typeface="Times New Roman" panose="02020603050405020304" pitchFamily="18" charset="0"/>
+            </a:endParaRPr>
           </a:p>
           <a:p>
             <a:pPr marL="342900" indent="-342900">
@@ -7997,6 +7534,10 @@
               </a:rPr>
               <a:t>Hardware &amp; Software used</a:t>
             </a:r>
+            <a:endParaRPr lang="en-IN" sz="1600" dirty="0">
+              <a:latin typeface="Times New Roman" panose="02020603050405020304" pitchFamily="18" charset="0"/>
+              <a:cs typeface="Times New Roman" panose="02020603050405020304" pitchFamily="18" charset="0"/>
+            </a:endParaRPr>
           </a:p>
           <a:p>
             <a:pPr marL="342900" indent="-342900">
@@ -8009,6 +7550,10 @@
               </a:rPr>
               <a:t>System Design </a:t>
             </a:r>
+            <a:endParaRPr lang="en-IN" sz="1600" dirty="0">
+              <a:latin typeface="Times New Roman" panose="02020603050405020304" pitchFamily="18" charset="0"/>
+              <a:cs typeface="Times New Roman" panose="02020603050405020304" pitchFamily="18" charset="0"/>
+            </a:endParaRPr>
           </a:p>
           <a:p>
             <a:pPr marL="342900" indent="-342900">
@@ -8021,6 +7566,10 @@
               </a:rPr>
               <a:t>Future Work</a:t>
             </a:r>
+            <a:endParaRPr lang="en-IN" sz="1600" dirty="0">
+              <a:latin typeface="Times New Roman" panose="02020603050405020304" pitchFamily="18" charset="0"/>
+              <a:cs typeface="Times New Roman" panose="02020603050405020304" pitchFamily="18" charset="0"/>
+            </a:endParaRPr>
           </a:p>
           <a:p>
             <a:pPr marL="342900" indent="-342900">
@@ -8035,13 +7584,7 @@
       </p:sp>
       <p:sp>
         <p:nvSpPr>
-          <p:cNvPr id="2" name="TextBox 1">
-            <a:extLst>
-              <a:ext uri="{FF2B5EF4-FFF2-40B4-BE49-F238E27FC236}">
-                <a16:creationId xmlns:a16="http://schemas.microsoft.com/office/drawing/2014/main" id="{8DAEBDCE-7C6C-CD0F-1DA6-8804A0AF2569}"/>
-              </a:ext>
-            </a:extLst>
-          </p:cNvPr>
+          <p:cNvPr id="2" name="TextBox 1"/>
           <p:cNvSpPr txBox="1"/>
           <p:nvPr/>
         </p:nvSpPr>
@@ -8068,15 +7611,14 @@
               </a:rPr>
               <a:t>AGENDA</a:t>
             </a:r>
+            <a:endParaRPr lang="en-US" sz="2000" dirty="0">
+              <a:latin typeface="Times New Roman" panose="02020603050405020304" pitchFamily="18" charset="0"/>
+              <a:cs typeface="Times New Roman" panose="02020603050405020304" pitchFamily="18" charset="0"/>
+            </a:endParaRPr>
           </a:p>
         </p:txBody>
       </p:sp>
     </p:spTree>
-    <p:extLst>
-      <p:ext uri="{BB962C8B-B14F-4D97-AF65-F5344CB8AC3E}">
-        <p14:creationId xmlns:p14="http://schemas.microsoft.com/office/powerpoint/2010/main" val="172969474"/>
-      </p:ext>
-    </p:extLst>
   </p:cSld>
   <p:clrMapOvr>
     <a:masterClrMapping/>
@@ -8121,10 +7663,6 @@
             </a:pPr>
             <a:fld id="{EED0D648-989B-4034-9BD3-6FBF9A769E5B}" type="slidenum">
               <a:rPr lang="en-US" smtClean="0"/>
-              <a:pPr>
-                <a:defRPr/>
-              </a:pPr>
-              <a:t>3</a:t>
             </a:fld>
             <a:endParaRPr lang="en-US"/>
           </a:p>
@@ -8156,7 +7694,7 @@
               <a:spcBef>
                 <a:spcPts val="1200"/>
               </a:spcBef>
-              <a:buFont typeface="Wingdings" pitchFamily="2" charset="2"/>
+              <a:buFont typeface="Wingdings" panose="05000000000000000000" pitchFamily="2" charset="2"/>
               <a:buChar char="§"/>
             </a:pPr>
             <a:r>
@@ -8169,13 +7707,20 @@
               </a:rPr>
               <a:t>Nutrition is the supply of food that we need as an organism to feed our cells and keep them alive. Nutrients can be obtained from products such as vitamin supplements.</a:t>
             </a:r>
+            <a:endParaRPr lang="en-IN" sz="1600" dirty="0">
+              <a:solidFill>
+                <a:schemeClr val="tx1"/>
+              </a:solidFill>
+              <a:latin typeface="Times New Roman" panose="02020603050405020304" pitchFamily="18" charset="0"/>
+              <a:cs typeface="Times New Roman" panose="02020603050405020304" pitchFamily="18" charset="0"/>
+            </a:endParaRPr>
           </a:p>
           <a:p>
             <a:pPr lvl="1" algn="just">
               <a:spcBef>
                 <a:spcPts val="1200"/>
               </a:spcBef>
-              <a:buFont typeface="Wingdings" pitchFamily="2" charset="2"/>
+              <a:buFont typeface="Wingdings" panose="05000000000000000000" pitchFamily="2" charset="2"/>
               <a:buChar char="§"/>
             </a:pPr>
             <a:r>
@@ -8188,13 +7733,20 @@
               </a:rPr>
               <a:t>Without nutrition, humans grow weak, sick and at the very worst can even die. Humans miss developmental milestones and can’t put their bodies through the daily mental and physical tasks that one needs them to.</a:t>
             </a:r>
+            <a:endParaRPr lang="en-IN" sz="1600" dirty="0">
+              <a:solidFill>
+                <a:schemeClr val="tx1"/>
+              </a:solidFill>
+              <a:latin typeface="Times New Roman" panose="02020603050405020304" pitchFamily="18" charset="0"/>
+              <a:cs typeface="Times New Roman" panose="02020603050405020304" pitchFamily="18" charset="0"/>
+            </a:endParaRPr>
           </a:p>
           <a:p>
             <a:pPr lvl="1" algn="just">
               <a:spcBef>
                 <a:spcPts val="1200"/>
               </a:spcBef>
-              <a:buFont typeface="Wingdings" pitchFamily="2" charset="2"/>
+              <a:buFont typeface="Wingdings" panose="05000000000000000000" pitchFamily="2" charset="2"/>
               <a:buChar char="§"/>
             </a:pPr>
             <a:r>
@@ -8207,13 +7759,20 @@
               </a:rPr>
               <a:t>Recipe recommendation involves taking various types of inputs such as nutritional values or ingredients or preferences and suggesting/ranking relevant food products and recipes as outputs. </a:t>
             </a:r>
+            <a:endParaRPr lang="en-IN" sz="1600" dirty="0">
+              <a:solidFill>
+                <a:schemeClr val="tx1"/>
+              </a:solidFill>
+              <a:latin typeface="Times New Roman" panose="02020603050405020304" pitchFamily="18" charset="0"/>
+              <a:cs typeface="Times New Roman" panose="02020603050405020304" pitchFamily="18" charset="0"/>
+            </a:endParaRPr>
           </a:p>
           <a:p>
             <a:pPr lvl="1" algn="just">
               <a:spcBef>
                 <a:spcPts val="1200"/>
               </a:spcBef>
-              <a:buFont typeface="Wingdings" pitchFamily="2" charset="2"/>
+              <a:buFont typeface="Wingdings" panose="05000000000000000000" pitchFamily="2" charset="2"/>
               <a:buChar char="§"/>
             </a:pPr>
             <a:r>
@@ -8226,18 +7785,19 @@
               </a:rPr>
               <a:t>This project aims to detect nutritional shortcomings of a user by taking various inputs that can easily be obtained through standard blood tests and overcome deficiencies if detected by recommending food and recipes using an intelligent algorithm.</a:t>
             </a:r>
-          </a:p>
-        </p:txBody>
-      </p:sp>
-      <p:sp>
-        <p:nvSpPr>
-          <p:cNvPr id="2" name="TextBox 1">
-            <a:extLst>
-              <a:ext uri="{FF2B5EF4-FFF2-40B4-BE49-F238E27FC236}">
-                <a16:creationId xmlns:a16="http://schemas.microsoft.com/office/drawing/2014/main" id="{073915DB-97A7-7343-D3E8-00254B9994E1}"/>
-              </a:ext>
-            </a:extLst>
-          </p:cNvPr>
+            <a:endParaRPr lang="en-IN" sz="1600" dirty="0">
+              <a:solidFill>
+                <a:schemeClr val="tx1"/>
+              </a:solidFill>
+              <a:latin typeface="Times New Roman" panose="02020603050405020304" pitchFamily="18" charset="0"/>
+              <a:cs typeface="Times New Roman" panose="02020603050405020304" pitchFamily="18" charset="0"/>
+            </a:endParaRPr>
+          </a:p>
+        </p:txBody>
+      </p:sp>
+      <p:sp>
+        <p:nvSpPr>
+          <p:cNvPr id="2" name="TextBox 1"/>
           <p:cNvSpPr txBox="1"/>
           <p:nvPr/>
         </p:nvSpPr>
@@ -8264,15 +7824,14 @@
               </a:rPr>
               <a:t>INTRODUCTION</a:t>
             </a:r>
+            <a:endParaRPr lang="en-US" sz="2000" dirty="0">
+              <a:latin typeface="Times New Roman" panose="02020603050405020304" pitchFamily="18" charset="0"/>
+              <a:cs typeface="Times New Roman" panose="02020603050405020304" pitchFamily="18" charset="0"/>
+            </a:endParaRPr>
           </a:p>
         </p:txBody>
       </p:sp>
     </p:spTree>
-    <p:extLst>
-      <p:ext uri="{BB962C8B-B14F-4D97-AF65-F5344CB8AC3E}">
-        <p14:creationId xmlns:p14="http://schemas.microsoft.com/office/powerpoint/2010/main" val="3547549614"/>
-      </p:ext>
-    </p:extLst>
   </p:cSld>
   <p:clrMapOvr>
     <a:masterClrMapping/>
@@ -8317,10 +7876,6 @@
             </a:pPr>
             <a:fld id="{EED0D648-989B-4034-9BD3-6FBF9A769E5B}" type="slidenum">
               <a:rPr lang="en-US" smtClean="0"/>
-              <a:pPr>
-                <a:defRPr/>
-              </a:pPr>
-              <a:t>4</a:t>
             </a:fld>
             <a:endParaRPr lang="en-US"/>
           </a:p>
@@ -8328,13 +7883,7 @@
       </p:sp>
       <p:sp>
         <p:nvSpPr>
-          <p:cNvPr id="5" name="Content Placeholder 4">
-            <a:extLst>
-              <a:ext uri="{FF2B5EF4-FFF2-40B4-BE49-F238E27FC236}">
-                <a16:creationId xmlns:a16="http://schemas.microsoft.com/office/drawing/2014/main" id="{C9715DAD-C189-D76F-5F2C-FE437BF2B6C9}"/>
-              </a:ext>
-            </a:extLst>
-          </p:cNvPr>
+          <p:cNvPr id="5" name="Content Placeholder 4"/>
           <p:cNvSpPr>
             <a:spLocks noGrp="1"/>
           </p:cNvSpPr>
@@ -8356,7 +7905,7 @@
               <a:spcBef>
                 <a:spcPts val="1200"/>
               </a:spcBef>
-              <a:buFont typeface="Wingdings" pitchFamily="2" charset="2"/>
+              <a:buFont typeface="Wingdings" panose="05000000000000000000" pitchFamily="2" charset="2"/>
               <a:buChar char="§"/>
             </a:pPr>
             <a:r>
@@ -8369,13 +7918,20 @@
               </a:rPr>
               <a:t>Nutrient management in the context of this project aims to quantize the consumption of essential nutrients in an efficient format such that it leads to a healthy and balanced lifestyle. Several recent studies have shown the importance of quality-based consumption of nutrients which could otherwise lead to serious health issues that could even be fatal at times.</a:t>
             </a:r>
+            <a:endParaRPr lang="en-IN" sz="1600" dirty="0">
+              <a:solidFill>
+                <a:schemeClr val="tx1"/>
+              </a:solidFill>
+              <a:latin typeface="Times New Roman" panose="02020603050405020304" pitchFamily="18" charset="0"/>
+              <a:cs typeface="Times New Roman" panose="02020603050405020304" pitchFamily="18" charset="0"/>
+            </a:endParaRPr>
           </a:p>
           <a:p>
             <a:pPr lvl="1" algn="just">
               <a:spcBef>
                 <a:spcPts val="1200"/>
               </a:spcBef>
-              <a:buFont typeface="Wingdings" pitchFamily="2" charset="2"/>
+              <a:buFont typeface="Wingdings" panose="05000000000000000000" pitchFamily="2" charset="2"/>
               <a:buChar char="§"/>
             </a:pPr>
             <a:r>
@@ -8388,13 +7944,20 @@
               </a:rPr>
               <a:t>The emergence of advanced scientific methods to determine the presence of various nutrients or lack thereof has led to widespread awareness amongst individuals to keep a track of their nutrient consumption. Increased consciousness towards one’s health has recently been in the limelight which creates the need for an intelligent system specially customized for the individual that can analyse your consumption’s quality and suggest options that could essentially fulfil your body’s need to lead a healthy lifestyle. </a:t>
             </a:r>
+            <a:endParaRPr lang="en-IN" sz="1600" dirty="0">
+              <a:solidFill>
+                <a:schemeClr val="tx1"/>
+              </a:solidFill>
+              <a:latin typeface="Times New Roman" panose="02020603050405020304" pitchFamily="18" charset="0"/>
+              <a:cs typeface="Times New Roman" panose="02020603050405020304" pitchFamily="18" charset="0"/>
+            </a:endParaRPr>
           </a:p>
           <a:p>
             <a:pPr lvl="1" algn="just">
               <a:spcBef>
                 <a:spcPts val="1200"/>
               </a:spcBef>
-              <a:buFont typeface="Wingdings" pitchFamily="2" charset="2"/>
+              <a:buFont typeface="Wingdings" panose="05000000000000000000" pitchFamily="2" charset="2"/>
               <a:buChar char="§"/>
             </a:pPr>
             <a:r>
@@ -8407,18 +7970,19 @@
               </a:rPr>
               <a:t>The presence of this particular system can hugely impact individuals as this would save a considerable amount of time in finding a recipe that would not only suit the user’s preference but also encapsulate all the nourishing factors that an individual would require. </a:t>
             </a:r>
-          </a:p>
-        </p:txBody>
-      </p:sp>
-      <p:sp>
-        <p:nvSpPr>
-          <p:cNvPr id="6" name="TextBox 5">
-            <a:extLst>
-              <a:ext uri="{FF2B5EF4-FFF2-40B4-BE49-F238E27FC236}">
-                <a16:creationId xmlns:a16="http://schemas.microsoft.com/office/drawing/2014/main" id="{5AE7299E-6DFD-9FF8-5B91-8252D3F223E9}"/>
-              </a:ext>
-            </a:extLst>
-          </p:cNvPr>
+            <a:endParaRPr lang="en-IN" sz="1600" dirty="0">
+              <a:solidFill>
+                <a:schemeClr val="tx1"/>
+              </a:solidFill>
+              <a:latin typeface="Times New Roman" panose="02020603050405020304" pitchFamily="18" charset="0"/>
+              <a:cs typeface="Times New Roman" panose="02020603050405020304" pitchFamily="18" charset="0"/>
+            </a:endParaRPr>
+          </a:p>
+        </p:txBody>
+      </p:sp>
+      <p:sp>
+        <p:nvSpPr>
+          <p:cNvPr id="6" name="TextBox 5"/>
           <p:cNvSpPr txBox="1"/>
           <p:nvPr/>
         </p:nvSpPr>
@@ -8445,6 +8009,10 @@
               </a:rPr>
               <a:t>PROBLEM STATEMENT</a:t>
             </a:r>
+            <a:endParaRPr lang="en-US" sz="2000" dirty="0">
+              <a:latin typeface="Times New Roman" panose="02020603050405020304" pitchFamily="18" charset="0"/>
+              <a:cs typeface="Times New Roman" panose="02020603050405020304" pitchFamily="18" charset="0"/>
+            </a:endParaRPr>
           </a:p>
         </p:txBody>
       </p:sp>
@@ -8493,10 +8061,6 @@
             </a:pPr>
             <a:fld id="{EED0D648-989B-4034-9BD3-6FBF9A769E5B}" type="slidenum">
               <a:rPr lang="en-US" smtClean="0"/>
-              <a:pPr>
-                <a:defRPr/>
-              </a:pPr>
-              <a:t>5</a:t>
             </a:fld>
             <a:endParaRPr lang="en-US"/>
           </a:p>
@@ -8504,13 +8068,7 @@
       </p:sp>
       <p:sp>
         <p:nvSpPr>
-          <p:cNvPr id="5" name="Content Placeholder 4">
-            <a:extLst>
-              <a:ext uri="{FF2B5EF4-FFF2-40B4-BE49-F238E27FC236}">
-                <a16:creationId xmlns:a16="http://schemas.microsoft.com/office/drawing/2014/main" id="{DAB994D0-40D2-6693-87A3-4C0FA0B7BE98}"/>
-              </a:ext>
-            </a:extLst>
-          </p:cNvPr>
+          <p:cNvPr id="5" name="Content Placeholder 4"/>
           <p:cNvSpPr>
             <a:spLocks noGrp="1"/>
           </p:cNvSpPr>
@@ -8530,7 +8088,7 @@
           </a:bodyPr>
           <a:lstStyle/>
           <a:p>
-            <a:pPr marL="201168" lvl="1" indent="0" algn="just">
+            <a:pPr marL="201295" lvl="1" indent="0" algn="just">
               <a:spcBef>
                 <a:spcPts val="1200"/>
               </a:spcBef>
@@ -8546,9 +8104,16 @@
               </a:rPr>
               <a:t>The project's main goal is to create an intelligent recipe recommender that would aid in the development of a diet that allows all users to make healthy choices in their daily lives while still enjoying food and keeping healthy. </a:t>
             </a:r>
-          </a:p>
-          <a:p>
-            <a:pPr marL="201168" lvl="1" indent="0" algn="just">
+            <a:endParaRPr lang="en-IN" sz="1600" dirty="0">
+              <a:solidFill>
+                <a:schemeClr val="tx1"/>
+              </a:solidFill>
+              <a:latin typeface="Times New Roman" panose="02020603050405020304" pitchFamily="18" charset="0"/>
+              <a:cs typeface="Times New Roman" panose="02020603050405020304" pitchFamily="18" charset="0"/>
+            </a:endParaRPr>
+          </a:p>
+          <a:p>
+            <a:pPr marL="201295" lvl="1" indent="0" algn="just">
               <a:spcBef>
                 <a:spcPts val="1200"/>
               </a:spcBef>
@@ -8564,9 +8129,16 @@
               </a:rPr>
               <a:t>The main objectives of this project are : </a:t>
             </a:r>
-          </a:p>
-          <a:p>
-            <a:pPr marL="544068" lvl="1" indent="-342900" algn="just">
+            <a:endParaRPr lang="en-IN" sz="1600" dirty="0">
+              <a:solidFill>
+                <a:schemeClr val="tx1"/>
+              </a:solidFill>
+              <a:latin typeface="Times New Roman" panose="02020603050405020304" pitchFamily="18" charset="0"/>
+              <a:cs typeface="Times New Roman" panose="02020603050405020304" pitchFamily="18" charset="0"/>
+            </a:endParaRPr>
+          </a:p>
+          <a:p>
+            <a:pPr marL="544195" lvl="1" indent="-342900" algn="just">
               <a:spcBef>
                 <a:spcPts val="1200"/>
               </a:spcBef>
@@ -8583,9 +8155,16 @@
               </a:rPr>
               <a:t>Develop an algorithm that maps the required nutrients tailored for every user to the information put in by them like age, gender, activity levels, diseases and allergies and personal health goals.</a:t>
             </a:r>
-          </a:p>
-          <a:p>
-            <a:pPr marL="544068" lvl="1" indent="-342900" algn="just">
+            <a:endParaRPr lang="en-IN" sz="1600" dirty="0">
+              <a:solidFill>
+                <a:schemeClr val="tx1"/>
+              </a:solidFill>
+              <a:latin typeface="Times New Roman" panose="02020603050405020304" pitchFamily="18" charset="0"/>
+              <a:cs typeface="Times New Roman" panose="02020603050405020304" pitchFamily="18" charset="0"/>
+            </a:endParaRPr>
+          </a:p>
+          <a:p>
+            <a:pPr marL="544195" lvl="1" indent="-342900" algn="just">
               <a:spcBef>
                 <a:spcPts val="1200"/>
               </a:spcBef>
@@ -8602,9 +8181,16 @@
               </a:rPr>
               <a:t>Develop a classification model that can classify and output food groups that are rich in specific groups of nutritional values.</a:t>
             </a:r>
-          </a:p>
-          <a:p>
-            <a:pPr marL="544068" lvl="1" indent="-342900" algn="just">
+            <a:endParaRPr lang="en-IN" sz="1600" dirty="0">
+              <a:solidFill>
+                <a:schemeClr val="tx1"/>
+              </a:solidFill>
+              <a:latin typeface="Times New Roman" panose="02020603050405020304" pitchFamily="18" charset="0"/>
+              <a:cs typeface="Times New Roman" panose="02020603050405020304" pitchFamily="18" charset="0"/>
+            </a:endParaRPr>
+          </a:p>
+          <a:p>
+            <a:pPr marL="544195" lvl="1" indent="-342900" algn="just">
               <a:spcBef>
                 <a:spcPts val="1200"/>
               </a:spcBef>
@@ -8621,13 +8207,20 @@
               </a:rPr>
               <a:t>Develop a ranking system that maps the user inputs explaining their preferences and scrapes the web for recipes for the right diet. </a:t>
             </a:r>
+            <a:endParaRPr lang="en-IN" sz="1600" dirty="0">
+              <a:solidFill>
+                <a:schemeClr val="tx1"/>
+              </a:solidFill>
+              <a:latin typeface="Times New Roman" panose="02020603050405020304" pitchFamily="18" charset="0"/>
+              <a:cs typeface="Times New Roman" panose="02020603050405020304" pitchFamily="18" charset="0"/>
+            </a:endParaRPr>
           </a:p>
           <a:p>
             <a:pPr lvl="1" algn="just">
               <a:spcBef>
                 <a:spcPts val="1200"/>
               </a:spcBef>
-              <a:buFont typeface="Wingdings" pitchFamily="2" charset="2"/>
+              <a:buFont typeface="Wingdings" panose="05000000000000000000" pitchFamily="2" charset="2"/>
               <a:buChar char="§"/>
             </a:pPr>
             <a:endParaRPr lang="en-US" sz="1600" dirty="0">
@@ -8642,13 +8235,7 @@
       </p:sp>
       <p:sp>
         <p:nvSpPr>
-          <p:cNvPr id="7" name="TextBox 6">
-            <a:extLst>
-              <a:ext uri="{FF2B5EF4-FFF2-40B4-BE49-F238E27FC236}">
-                <a16:creationId xmlns:a16="http://schemas.microsoft.com/office/drawing/2014/main" id="{CAB74514-4814-DC12-F708-DDBD85114204}"/>
-              </a:ext>
-            </a:extLst>
-          </p:cNvPr>
+          <p:cNvPr id="7" name="TextBox 6"/>
           <p:cNvSpPr txBox="1"/>
           <p:nvPr/>
         </p:nvSpPr>
@@ -8675,15 +8262,14 @@
               </a:rPr>
               <a:t>OBJECTIVES</a:t>
             </a:r>
+            <a:endParaRPr lang="en-US" sz="2000" dirty="0">
+              <a:latin typeface="Times New Roman" panose="02020603050405020304" pitchFamily="18" charset="0"/>
+              <a:cs typeface="Times New Roman" panose="02020603050405020304" pitchFamily="18" charset="0"/>
+            </a:endParaRPr>
           </a:p>
         </p:txBody>
       </p:sp>
     </p:spTree>
-    <p:extLst>
-      <p:ext uri="{BB962C8B-B14F-4D97-AF65-F5344CB8AC3E}">
-        <p14:creationId xmlns:p14="http://schemas.microsoft.com/office/powerpoint/2010/main" val="538425791"/>
-      </p:ext>
-    </p:extLst>
   </p:cSld>
   <p:clrMapOvr>
     <a:masterClrMapping/>
@@ -8710,13 +8296,7 @@
       </p:grpSpPr>
       <p:sp>
         <p:nvSpPr>
-          <p:cNvPr id="2" name="Title 1">
-            <a:extLst>
-              <a:ext uri="{FF2B5EF4-FFF2-40B4-BE49-F238E27FC236}">
-                <a16:creationId xmlns:a16="http://schemas.microsoft.com/office/drawing/2014/main" id="{307660C9-03D1-4A2B-F364-ED4A9CA7CF08}"/>
-              </a:ext>
-            </a:extLst>
-          </p:cNvPr>
+          <p:cNvPr id="2" name="Title 1"/>
           <p:cNvSpPr>
             <a:spLocks noGrp="1"/>
           </p:cNvSpPr>
@@ -8747,28 +8327,25 @@
               </a:rPr>
               <a:t>LITERATURE SURVEY</a:t>
             </a:r>
+            <a:endParaRPr lang="en-US" sz="2000" dirty="0">
+              <a:solidFill>
+                <a:schemeClr val="tx1"/>
+              </a:solidFill>
+              <a:latin typeface="Times New Roman" panose="02020603050405020304" pitchFamily="18" charset="0"/>
+              <a:ea typeface="+mn-ea"/>
+              <a:cs typeface="Times New Roman" panose="02020603050405020304" pitchFamily="18" charset="0"/>
+            </a:endParaRPr>
           </a:p>
         </p:txBody>
       </p:sp>
       <p:graphicFrame>
         <p:nvGraphicFramePr>
-          <p:cNvPr id="6" name="Table 6">
-            <a:extLst>
-              <a:ext uri="{FF2B5EF4-FFF2-40B4-BE49-F238E27FC236}">
-                <a16:creationId xmlns:a16="http://schemas.microsoft.com/office/drawing/2014/main" id="{9D8E7230-27E3-39FB-84B2-1A9762A9A274}"/>
-              </a:ext>
-            </a:extLst>
-          </p:cNvPr>
+          <p:cNvPr id="6" name="Table 6"/>
           <p:cNvGraphicFramePr>
             <a:graphicFrameLocks noGrp="1"/>
           </p:cNvGraphicFramePr>
           <p:nvPr>
             <p:ph idx="1"/>
-            <p:extLst>
-              <p:ext uri="{D42A27DB-BD31-4B8C-83A1-F6EECF244321}">
-                <p14:modId xmlns:p14="http://schemas.microsoft.com/office/powerpoint/2010/main" val="2476135048"/>
-              </p:ext>
-            </p:extLst>
           </p:nvPr>
         </p:nvGraphicFramePr>
         <p:xfrm>
@@ -8782,34 +8359,10 @@
                 <a:tableStyleId>{5C22544A-7EE6-4342-B048-85BDC9FD1C3A}</a:tableStyleId>
               </a:tblPr>
               <a:tblGrid>
-                <a:gridCol w="2289145">
-                  <a:extLst>
-                    <a:ext uri="{9D8B030D-6E8A-4147-A177-3AD203B41FA5}">
-                      <a16:colId xmlns:a16="http://schemas.microsoft.com/office/drawing/2014/main" val="2916784461"/>
-                    </a:ext>
-                  </a:extLst>
-                </a:gridCol>
-                <a:gridCol w="2493577">
-                  <a:extLst>
-                    <a:ext uri="{9D8B030D-6E8A-4147-A177-3AD203B41FA5}">
-                      <a16:colId xmlns:a16="http://schemas.microsoft.com/office/drawing/2014/main" val="3587481715"/>
-                    </a:ext>
-                  </a:extLst>
-                </a:gridCol>
-                <a:gridCol w="2722455">
-                  <a:extLst>
-                    <a:ext uri="{9D8B030D-6E8A-4147-A177-3AD203B41FA5}">
-                      <a16:colId xmlns:a16="http://schemas.microsoft.com/office/drawing/2014/main" val="3854324525"/>
-                    </a:ext>
-                  </a:extLst>
-                </a:gridCol>
-                <a:gridCol w="3758079">
-                  <a:extLst>
-                    <a:ext uri="{9D8B030D-6E8A-4147-A177-3AD203B41FA5}">
-                      <a16:colId xmlns:a16="http://schemas.microsoft.com/office/drawing/2014/main" val="2424694502"/>
-                    </a:ext>
-                  </a:extLst>
-                </a:gridCol>
+                <a:gridCol w="2289145"/>
+                <a:gridCol w="2493577"/>
+                <a:gridCol w="2722455"/>
+                <a:gridCol w="3758079"/>
               </a:tblGrid>
               <a:tr h="549869">
                 <a:tc>
@@ -8828,6 +8381,13 @@
                         </a:rPr>
                         <a:t>Title and Author</a:t>
                       </a:r>
+                      <a:endParaRPr lang="en-US" sz="1600" dirty="0">
+                        <a:solidFill>
+                          <a:schemeClr val="tx1"/>
+                        </a:solidFill>
+                        <a:latin typeface="Times New Roman" panose="02020603050405020304" pitchFamily="18" charset="0"/>
+                        <a:cs typeface="Times New Roman" panose="02020603050405020304" pitchFamily="18" charset="0"/>
+                      </a:endParaRPr>
                     </a:p>
                   </a:txBody>
                   <a:tcPr/>
@@ -8848,6 +8408,13 @@
                         </a:rPr>
                         <a:t>Technique Used</a:t>
                       </a:r>
+                      <a:endParaRPr lang="en-US" sz="1600" dirty="0">
+                        <a:solidFill>
+                          <a:schemeClr val="tx1"/>
+                        </a:solidFill>
+                        <a:latin typeface="Times New Roman" panose="02020603050405020304" pitchFamily="18" charset="0"/>
+                        <a:cs typeface="Times New Roman" panose="02020603050405020304" pitchFamily="18" charset="0"/>
+                      </a:endParaRPr>
                     </a:p>
                   </a:txBody>
                   <a:tcPr/>
@@ -8906,11 +8473,6 @@
                   </a:txBody>
                   <a:tcPr/>
                 </a:tc>
-                <a:extLst>
-                  <a:ext uri="{0D108BD9-81ED-4DB2-BD59-A6C34878D82A}">
-                    <a16:rowId xmlns:a16="http://schemas.microsoft.com/office/drawing/2014/main" val="4046470187"/>
-                  </a:ext>
-                </a:extLst>
               </a:tr>
               <a:tr h="1461699">
                 <a:tc>
@@ -8932,7 +8494,6 @@
                         <a:buSzTx/>
                         <a:buFontTx/>
                         <a:buNone/>
-                        <a:tabLst/>
                         <a:defRPr/>
                       </a:pPr>
                       <a:r>
@@ -9031,6 +8592,15 @@
                         </a:rPr>
                         <a:t>.   </a:t>
                       </a:r>
+                      <a:endParaRPr lang="en-IN" sz="1200" kern="1200" dirty="0">
+                        <a:solidFill>
+                          <a:schemeClr val="dk1"/>
+                        </a:solidFill>
+                        <a:effectLst/>
+                        <a:latin typeface="Times New Roman" panose="02020603050405020304" pitchFamily="18" charset="0"/>
+                        <a:ea typeface="+mn-ea"/>
+                        <a:cs typeface="Times New Roman" panose="02020603050405020304" pitchFamily="18" charset="0"/>
+                      </a:endParaRPr>
                     </a:p>
                     <a:p>
                       <a:pPr algn="just"/>
@@ -9065,6 +8635,15 @@
                         </a:rPr>
                         <a:t>Diet-Aid Ontological Knowledge Engine (DOKE)</a:t>
                       </a:r>
+                      <a:endParaRPr lang="en-IN" sz="1200" kern="1200" dirty="0">
+                        <a:solidFill>
+                          <a:schemeClr val="dk1"/>
+                        </a:solidFill>
+                        <a:effectLst/>
+                        <a:latin typeface="Times New Roman" panose="02020603050405020304" pitchFamily="18" charset="0"/>
+                        <a:ea typeface="+mn-ea"/>
+                        <a:cs typeface="Times New Roman" panose="02020603050405020304" pitchFamily="18" charset="0"/>
+                      </a:endParaRPr>
                     </a:p>
                   </a:txBody>
                   <a:tcPr/>
@@ -9130,6 +8709,15 @@
                         </a:rPr>
                         <a:t>he system adds nutrition information about the ingredients, such as amount of vitamins in the ingredients for users to consider. </a:t>
                       </a:r>
+                      <a:endParaRPr lang="en-IN" sz="1200" kern="1200" dirty="0">
+                        <a:solidFill>
+                          <a:schemeClr val="dk1"/>
+                        </a:solidFill>
+                        <a:effectLst/>
+                        <a:latin typeface="Times New Roman" panose="02020603050405020304" pitchFamily="18" charset="0"/>
+                        <a:ea typeface="+mn-ea"/>
+                        <a:cs typeface="Times New Roman" panose="02020603050405020304" pitchFamily="18" charset="0"/>
+                      </a:endParaRPr>
                     </a:p>
                     <a:p>
                       <a:pPr algn="just">
@@ -9174,11 +8762,6 @@
                   </a:txBody>
                   <a:tcPr/>
                 </a:tc>
-                <a:extLst>
-                  <a:ext uri="{0D108BD9-81ED-4DB2-BD59-A6C34878D82A}">
-                    <a16:rowId xmlns:a16="http://schemas.microsoft.com/office/drawing/2014/main" val="1707140070"/>
-                  </a:ext>
-                </a:extLst>
               </a:tr>
               <a:tr h="1374297">
                 <a:tc>
@@ -9200,7 +8783,6 @@
                         <a:buSzTx/>
                         <a:buFontTx/>
                         <a:buNone/>
-                        <a:tabLst/>
                         <a:defRPr/>
                       </a:pPr>
                       <a:r>
@@ -9323,6 +8905,15 @@
                         </a:rPr>
                         <a:t>. </a:t>
                       </a:r>
+                      <a:endParaRPr lang="en-IN" sz="1200" kern="1200" dirty="0">
+                        <a:solidFill>
+                          <a:schemeClr val="dk1"/>
+                        </a:solidFill>
+                        <a:effectLst/>
+                        <a:latin typeface="Times New Roman" panose="02020603050405020304" pitchFamily="18" charset="0"/>
+                        <a:ea typeface="+mn-ea"/>
+                        <a:cs typeface="Times New Roman" panose="02020603050405020304" pitchFamily="18" charset="0"/>
+                      </a:endParaRPr>
                     </a:p>
                     <a:p>
                       <a:pPr algn="just"/>
@@ -9431,6 +9022,15 @@
                         </a:rPr>
                         <a:t>Does not overlook the various food-related relations, especially the ingredient-ingredient relations, leading to comprehensive representations.</a:t>
                       </a:r>
+                      <a:endParaRPr lang="en-IN" sz="1200" kern="1200" dirty="0">
+                        <a:solidFill>
+                          <a:schemeClr val="dk1"/>
+                        </a:solidFill>
+                        <a:effectLst/>
+                        <a:latin typeface="Times New Roman" panose="02020603050405020304" pitchFamily="18" charset="0"/>
+                        <a:ea typeface="+mn-ea"/>
+                        <a:cs typeface="Times New Roman" panose="02020603050405020304" pitchFamily="18" charset="0"/>
+                      </a:endParaRPr>
                     </a:p>
                     <a:p>
                       <a:pPr algn="just">
@@ -9475,11 +9075,6 @@
                   </a:txBody>
                   <a:tcPr/>
                 </a:tc>
-                <a:extLst>
-                  <a:ext uri="{0D108BD9-81ED-4DB2-BD59-A6C34878D82A}">
-                    <a16:rowId xmlns:a16="http://schemas.microsoft.com/office/drawing/2014/main" val="2340044838"/>
-                  </a:ext>
-                </a:extLst>
               </a:tr>
               <a:tr h="1461699">
                 <a:tc>
@@ -9501,7 +9096,6 @@
                         <a:buSzTx/>
                         <a:buFontTx/>
                         <a:buNone/>
-                        <a:tabLst/>
                         <a:defRPr/>
                       </a:pPr>
                       <a:r>
@@ -9552,6 +9146,15 @@
                         </a:rPr>
                         <a:t>, Markus. </a:t>
                       </a:r>
+                      <a:endParaRPr lang="en-IN" sz="1200" kern="1200" dirty="0">
+                        <a:solidFill>
+                          <a:schemeClr val="dk1"/>
+                        </a:solidFill>
+                        <a:effectLst/>
+                        <a:latin typeface="Times New Roman" panose="02020603050405020304" pitchFamily="18" charset="0"/>
+                        <a:ea typeface="+mn-ea"/>
+                        <a:cs typeface="Times New Roman" panose="02020603050405020304" pitchFamily="18" charset="0"/>
+                      </a:endParaRPr>
                     </a:p>
                     <a:p>
                       <a:endParaRPr lang="en-US" sz="1200" kern="1200" dirty="0">
@@ -9585,6 +9188,15 @@
                         </a:rPr>
                         <a:t>Visualisations of intrinsic statistical properties from a new source of data, </a:t>
                       </a:r>
+                      <a:endParaRPr lang="en-IN" sz="1200" kern="1200" dirty="0">
+                        <a:solidFill>
+                          <a:schemeClr val="dk1"/>
+                        </a:solidFill>
+                        <a:effectLst/>
+                        <a:latin typeface="Times New Roman" panose="02020603050405020304" pitchFamily="18" charset="0"/>
+                        <a:ea typeface="+mn-ea"/>
+                        <a:cs typeface="Times New Roman" panose="02020603050405020304" pitchFamily="18" charset="0"/>
+                      </a:endParaRPr>
                     </a:p>
                     <a:p>
                       <a:pPr algn="just"/>
@@ -9674,15 +9286,19 @@
                         </a:rPr>
                         <a:t>Presents a comprehensive multi-dimensional approach which allows to dig into the nature and evolution of users’ online food preferences. </a:t>
                       </a:r>
+                      <a:endParaRPr lang="en-IN" sz="1200" kern="1200" dirty="0">
+                        <a:solidFill>
+                          <a:schemeClr val="dk1"/>
+                        </a:solidFill>
+                        <a:effectLst/>
+                        <a:latin typeface="Times New Roman" panose="02020603050405020304" pitchFamily="18" charset="0"/>
+                        <a:ea typeface="+mn-ea"/>
+                        <a:cs typeface="Times New Roman" panose="02020603050405020304" pitchFamily="18" charset="0"/>
+                      </a:endParaRPr>
                     </a:p>
                   </a:txBody>
                   <a:tcPr/>
                 </a:tc>
-                <a:extLst>
-                  <a:ext uri="{0D108BD9-81ED-4DB2-BD59-A6C34878D82A}">
-                    <a16:rowId xmlns:a16="http://schemas.microsoft.com/office/drawing/2014/main" val="3687394570"/>
-                  </a:ext>
-                </a:extLst>
               </a:tr>
             </a:tbl>
           </a:graphicData>
@@ -9690,13 +9306,7 @@
       </p:graphicFrame>
       <p:sp>
         <p:nvSpPr>
-          <p:cNvPr id="4" name="Footer Placeholder 3">
-            <a:extLst>
-              <a:ext uri="{FF2B5EF4-FFF2-40B4-BE49-F238E27FC236}">
-                <a16:creationId xmlns:a16="http://schemas.microsoft.com/office/drawing/2014/main" id="{CACFDA2F-AE41-4D16-3466-BC55C058D939}"/>
-              </a:ext>
-            </a:extLst>
-          </p:cNvPr>
+          <p:cNvPr id="4" name="Footer Placeholder 3"/>
           <p:cNvSpPr>
             <a:spLocks noGrp="1"/>
           </p:cNvSpPr>
@@ -9719,13 +9329,7 @@
       </p:sp>
       <p:sp>
         <p:nvSpPr>
-          <p:cNvPr id="5" name="Slide Number Placeholder 4">
-            <a:extLst>
-              <a:ext uri="{FF2B5EF4-FFF2-40B4-BE49-F238E27FC236}">
-                <a16:creationId xmlns:a16="http://schemas.microsoft.com/office/drawing/2014/main" id="{938861A3-0F92-567E-33A2-7C309DD4B5A4}"/>
-              </a:ext>
-            </a:extLst>
-          </p:cNvPr>
+          <p:cNvPr id="5" name="Slide Number Placeholder 4"/>
           <p:cNvSpPr>
             <a:spLocks noGrp="1"/>
           </p:cNvSpPr>
@@ -9740,8 +9344,6 @@
           <a:p>
             <a:fld id="{1245FD78-8DE1-44B0-BD44-E067D054697C}" type="slidenum">
               <a:rPr lang="en-IN" smtClean="0"/>
-              <a:pPr/>
-              <a:t>6</a:t>
             </a:fld>
             <a:endParaRPr lang="en-IN"/>
           </a:p>
@@ -9749,16 +9351,8 @@
       </p:sp>
       <p:cxnSp>
         <p:nvCxnSpPr>
-          <p:cNvPr id="7" name="Straight Connector 6">
-            <a:extLst>
-              <a:ext uri="{FF2B5EF4-FFF2-40B4-BE49-F238E27FC236}">
-                <a16:creationId xmlns:a16="http://schemas.microsoft.com/office/drawing/2014/main" id="{5029C1BE-4BE3-55B6-7D67-3B498CB5D677}"/>
-              </a:ext>
-            </a:extLst>
-          </p:cNvPr>
-          <p:cNvCxnSpPr>
-            <a:cxnSpLocks/>
-          </p:cNvCxnSpPr>
+          <p:cNvPr id="7" name="Straight Connector 6"/>
+          <p:cNvCxnSpPr/>
           <p:nvPr/>
         </p:nvCxnSpPr>
         <p:spPr>
@@ -9794,11 +9388,6 @@
         </p:style>
       </p:cxnSp>
     </p:spTree>
-    <p:extLst>
-      <p:ext uri="{BB962C8B-B14F-4D97-AF65-F5344CB8AC3E}">
-        <p14:creationId xmlns:p14="http://schemas.microsoft.com/office/powerpoint/2010/main" val="771703423"/>
-      </p:ext>
-    </p:extLst>
   </p:cSld>
   <p:clrMapOvr>
     <a:masterClrMapping/>
@@ -9825,13 +9414,7 @@
       </p:grpSpPr>
       <p:sp>
         <p:nvSpPr>
-          <p:cNvPr id="4" name="Footer Placeholder 3">
-            <a:extLst>
-              <a:ext uri="{FF2B5EF4-FFF2-40B4-BE49-F238E27FC236}">
-                <a16:creationId xmlns:a16="http://schemas.microsoft.com/office/drawing/2014/main" id="{30F037C7-4D76-50C6-49C3-6672C8E5E0B7}"/>
-              </a:ext>
-            </a:extLst>
-          </p:cNvPr>
+          <p:cNvPr id="4" name="Footer Placeholder 3"/>
           <p:cNvSpPr>
             <a:spLocks noGrp="1"/>
           </p:cNvSpPr>
@@ -9854,13 +9437,7 @@
       </p:sp>
       <p:sp>
         <p:nvSpPr>
-          <p:cNvPr id="5" name="Slide Number Placeholder 4">
-            <a:extLst>
-              <a:ext uri="{FF2B5EF4-FFF2-40B4-BE49-F238E27FC236}">
-                <a16:creationId xmlns:a16="http://schemas.microsoft.com/office/drawing/2014/main" id="{BA003570-82C7-4AC9-F438-6A2B1637E229}"/>
-              </a:ext>
-            </a:extLst>
-          </p:cNvPr>
+          <p:cNvPr id="5" name="Slide Number Placeholder 4"/>
           <p:cNvSpPr>
             <a:spLocks noGrp="1"/>
           </p:cNvSpPr>
@@ -9875,8 +9452,6 @@
           <a:p>
             <a:fld id="{1245FD78-8DE1-44B0-BD44-E067D054697C}" type="slidenum">
               <a:rPr lang="en-IN" smtClean="0"/>
-              <a:pPr/>
-              <a:t>7</a:t>
             </a:fld>
             <a:endParaRPr lang="en-IN"/>
           </a:p>
@@ -9884,23 +9459,12 @@
       </p:sp>
       <p:graphicFrame>
         <p:nvGraphicFramePr>
-          <p:cNvPr id="6" name="Table 6">
-            <a:extLst>
-              <a:ext uri="{FF2B5EF4-FFF2-40B4-BE49-F238E27FC236}">
-                <a16:creationId xmlns:a16="http://schemas.microsoft.com/office/drawing/2014/main" id="{0888AFB2-FF3D-6A25-17AF-41728F6AAD95}"/>
-              </a:ext>
-            </a:extLst>
-          </p:cNvPr>
+          <p:cNvPr id="6" name="Table 6"/>
           <p:cNvGraphicFramePr>
             <a:graphicFrameLocks noGrp="1"/>
           </p:cNvGraphicFramePr>
           <p:nvPr>
             <p:ph idx="1"/>
-            <p:extLst>
-              <p:ext uri="{D42A27DB-BD31-4B8C-83A1-F6EECF244321}">
-                <p14:modId xmlns:p14="http://schemas.microsoft.com/office/powerpoint/2010/main" val="3847028321"/>
-              </p:ext>
-            </p:extLst>
           </p:nvPr>
         </p:nvGraphicFramePr>
         <p:xfrm>
@@ -9914,34 +9478,10 @@
                 <a:tableStyleId>{5C22544A-7EE6-4342-B048-85BDC9FD1C3A}</a:tableStyleId>
               </a:tblPr>
               <a:tblGrid>
-                <a:gridCol w="2289146">
-                  <a:extLst>
-                    <a:ext uri="{9D8B030D-6E8A-4147-A177-3AD203B41FA5}">
-                      <a16:colId xmlns:a16="http://schemas.microsoft.com/office/drawing/2014/main" val="2916784461"/>
-                    </a:ext>
-                  </a:extLst>
-                </a:gridCol>
-                <a:gridCol w="2493577">
-                  <a:extLst>
-                    <a:ext uri="{9D8B030D-6E8A-4147-A177-3AD203B41FA5}">
-                      <a16:colId xmlns:a16="http://schemas.microsoft.com/office/drawing/2014/main" val="3587481715"/>
-                    </a:ext>
-                  </a:extLst>
-                </a:gridCol>
-                <a:gridCol w="2722455">
-                  <a:extLst>
-                    <a:ext uri="{9D8B030D-6E8A-4147-A177-3AD203B41FA5}">
-                      <a16:colId xmlns:a16="http://schemas.microsoft.com/office/drawing/2014/main" val="3854324525"/>
-                    </a:ext>
-                  </a:extLst>
-                </a:gridCol>
-                <a:gridCol w="3758080">
-                  <a:extLst>
-                    <a:ext uri="{9D8B030D-6E8A-4147-A177-3AD203B41FA5}">
-                      <a16:colId xmlns:a16="http://schemas.microsoft.com/office/drawing/2014/main" val="2424694502"/>
-                    </a:ext>
-                  </a:extLst>
-                </a:gridCol>
+                <a:gridCol w="2289146"/>
+                <a:gridCol w="2493577"/>
+                <a:gridCol w="2722455"/>
+                <a:gridCol w="3758080"/>
               </a:tblGrid>
               <a:tr h="515975">
                 <a:tc>
@@ -9960,6 +9500,13 @@
                         </a:rPr>
                         <a:t>Title and Author</a:t>
                       </a:r>
+                      <a:endParaRPr lang="en-US" sz="1600" dirty="0">
+                        <a:solidFill>
+                          <a:schemeClr val="tx1"/>
+                        </a:solidFill>
+                        <a:latin typeface="Times New Roman" panose="02020603050405020304" pitchFamily="18" charset="0"/>
+                        <a:cs typeface="Times New Roman" panose="02020603050405020304" pitchFamily="18" charset="0"/>
+                      </a:endParaRPr>
                     </a:p>
                   </a:txBody>
                   <a:tcPr/>
@@ -9980,6 +9527,13 @@
                         </a:rPr>
                         <a:t>Technique Used</a:t>
                       </a:r>
+                      <a:endParaRPr lang="en-US" sz="1600" dirty="0">
+                        <a:solidFill>
+                          <a:schemeClr val="tx1"/>
+                        </a:solidFill>
+                        <a:latin typeface="Times New Roman" panose="02020603050405020304" pitchFamily="18" charset="0"/>
+                        <a:cs typeface="Times New Roman" panose="02020603050405020304" pitchFamily="18" charset="0"/>
+                      </a:endParaRPr>
                     </a:p>
                   </a:txBody>
                   <a:tcPr/>
@@ -10038,11 +9592,6 @@
                   </a:txBody>
                   <a:tcPr/>
                 </a:tc>
-                <a:extLst>
-                  <a:ext uri="{0D108BD9-81ED-4DB2-BD59-A6C34878D82A}">
-                    <a16:rowId xmlns:a16="http://schemas.microsoft.com/office/drawing/2014/main" val="4046470187"/>
-                  </a:ext>
-                </a:extLst>
               </a:tr>
               <a:tr h="943964">
                 <a:tc>
@@ -10064,7 +9613,6 @@
                         <a:buSzTx/>
                         <a:buFontTx/>
                         <a:buNone/>
-                        <a:tabLst/>
                         <a:defRPr/>
                       </a:pPr>
                       <a:r>
@@ -10321,11 +9869,6 @@
                   </a:txBody>
                   <a:tcPr/>
                 </a:tc>
-                <a:extLst>
-                  <a:ext uri="{0D108BD9-81ED-4DB2-BD59-A6C34878D82A}">
-                    <a16:rowId xmlns:a16="http://schemas.microsoft.com/office/drawing/2014/main" val="1707140070"/>
-                  </a:ext>
-                </a:extLst>
               </a:tr>
               <a:tr h="1358653">
                 <a:tc>
@@ -10347,7 +9890,6 @@
                         <a:buSzTx/>
                         <a:buFontTx/>
                         <a:buNone/>
-                        <a:tabLst/>
                         <a:defRPr/>
                       </a:pPr>
                       <a:r>
@@ -10550,7 +10092,6 @@
                         <a:buSzTx/>
                         <a:buFontTx/>
                         <a:buNone/>
-                        <a:tabLst/>
                         <a:defRPr/>
                       </a:pPr>
                       <a:r>
@@ -10628,7 +10169,6 @@
                         <a:buSzTx/>
                         <a:buFontTx/>
                         <a:buNone/>
-                        <a:tabLst/>
                         <a:defRPr/>
                       </a:pPr>
                       <a:r>
@@ -10720,11 +10260,6 @@
                   </a:txBody>
                   <a:tcPr/>
                 </a:tc>
-                <a:extLst>
-                  <a:ext uri="{0D108BD9-81ED-4DB2-BD59-A6C34878D82A}">
-                    <a16:rowId xmlns:a16="http://schemas.microsoft.com/office/drawing/2014/main" val="2340044838"/>
-                  </a:ext>
-                </a:extLst>
               </a:tr>
             </a:tbl>
           </a:graphicData>
@@ -10732,13 +10267,7 @@
       </p:graphicFrame>
       <p:sp>
         <p:nvSpPr>
-          <p:cNvPr id="7" name="TextBox 6">
-            <a:extLst>
-              <a:ext uri="{FF2B5EF4-FFF2-40B4-BE49-F238E27FC236}">
-                <a16:creationId xmlns:a16="http://schemas.microsoft.com/office/drawing/2014/main" id="{7D2F6AF7-B0A9-68FD-513F-28B7A399CCF6}"/>
-              </a:ext>
-            </a:extLst>
-          </p:cNvPr>
+          <p:cNvPr id="7" name="TextBox 6"/>
           <p:cNvSpPr txBox="1"/>
           <p:nvPr/>
         </p:nvSpPr>
@@ -10758,7 +10287,7 @@
           </a:bodyPr>
           <a:lstStyle/>
           <a:p>
-            <a:pPr marL="384048" lvl="1" indent="-182880" algn="just" defTabSz="914400">
+            <a:pPr marL="384175" lvl="1" indent="-182880" algn="just" defTabSz="914400">
               <a:lnSpc>
                 <a:spcPct val="90000"/>
               </a:lnSpc>
@@ -10771,7 +10300,7 @@
               <a:buClr>
                 <a:schemeClr val="accent1"/>
               </a:buClr>
-              <a:buFont typeface="Wingdings" pitchFamily="2" charset="2"/>
+              <a:buFont typeface="Wingdings" panose="05000000000000000000" pitchFamily="2" charset="2"/>
               <a:buChar char="§"/>
             </a:pPr>
             <a:r>
@@ -10781,9 +10310,13 @@
               </a:rPr>
               <a:t>Our system considers standard nutritional values related to gender and age along with nutritional information including deficiencies which makes are system unique to existing models.</a:t>
             </a:r>
-          </a:p>
-          <a:p>
-            <a:pPr marL="384048" lvl="1" indent="-182880" algn="just" defTabSz="914400">
+            <a:endParaRPr lang="en-US" sz="1600" dirty="0">
+              <a:latin typeface="Times New Roman" panose="02020603050405020304" pitchFamily="18" charset="0"/>
+              <a:cs typeface="Times New Roman" panose="02020603050405020304" pitchFamily="18" charset="0"/>
+            </a:endParaRPr>
+          </a:p>
+          <a:p>
+            <a:pPr marL="384175" lvl="1" indent="-182880" algn="just" defTabSz="914400">
               <a:lnSpc>
                 <a:spcPct val="90000"/>
               </a:lnSpc>
@@ -10796,7 +10329,7 @@
               <a:buClr>
                 <a:schemeClr val="accent1"/>
               </a:buClr>
-              <a:buFont typeface="Wingdings" pitchFamily="2" charset="2"/>
+              <a:buFont typeface="Wingdings" panose="05000000000000000000" pitchFamily="2" charset="2"/>
               <a:buChar char="§"/>
             </a:pPr>
             <a:r>
@@ -10806,18 +10339,16 @@
               </a:rPr>
               <a:t>We bundle the nutritional profile analysis and the recipe recommendation into one functional system making it the novel feature of this project.</a:t>
             </a:r>
-          </a:p>
-        </p:txBody>
-      </p:sp>
-      <p:sp>
-        <p:nvSpPr>
-          <p:cNvPr id="8" name="TextBox 7">
-            <a:extLst>
-              <a:ext uri="{FF2B5EF4-FFF2-40B4-BE49-F238E27FC236}">
-                <a16:creationId xmlns:a16="http://schemas.microsoft.com/office/drawing/2014/main" id="{B6E1683A-D85D-7DB3-3728-98E482C38E64}"/>
-              </a:ext>
-            </a:extLst>
-          </p:cNvPr>
+            <a:endParaRPr lang="en-US" sz="1600" dirty="0">
+              <a:latin typeface="Times New Roman" panose="02020603050405020304" pitchFamily="18" charset="0"/>
+              <a:cs typeface="Times New Roman" panose="02020603050405020304" pitchFamily="18" charset="0"/>
+            </a:endParaRPr>
+          </a:p>
+        </p:txBody>
+      </p:sp>
+      <p:sp>
+        <p:nvSpPr>
+          <p:cNvPr id="8" name="TextBox 7"/>
           <p:cNvSpPr txBox="1"/>
           <p:nvPr/>
         </p:nvSpPr>
@@ -10841,13 +10372,13 @@
               <a:rPr lang="en-US" sz="1600" dirty="0">
                 <a:latin typeface="Times New Roman" panose="02020603050405020304" pitchFamily="18" charset="0"/>
                 <a:cs typeface="Times New Roman" panose="02020603050405020304" pitchFamily="18" charset="0"/>
-                <a:hlinkClick r:id="rId2"/>
+                <a:hlinkClick r:id="rId1"/>
               </a:rPr>
               <a:t>References</a:t>
             </a:r>
             <a:r>
               <a:rPr lang="en-US" dirty="0">
-                <a:hlinkClick r:id="rId2"/>
+                <a:hlinkClick r:id="rId1"/>
               </a:rPr>
               <a:t>.</a:t>
             </a:r>
@@ -10856,11 +10387,6 @@
         </p:txBody>
       </p:sp>
     </p:spTree>
-    <p:extLst>
-      <p:ext uri="{BB962C8B-B14F-4D97-AF65-F5344CB8AC3E}">
-        <p14:creationId xmlns:p14="http://schemas.microsoft.com/office/powerpoint/2010/main" val="530202752"/>
-      </p:ext>
-    </p:extLst>
   </p:cSld>
   <p:clrMapOvr>
     <a:masterClrMapping/>
@@ -10905,10 +10431,6 @@
             </a:pPr>
             <a:fld id="{EED0D648-989B-4034-9BD3-6FBF9A769E5B}" type="slidenum">
               <a:rPr lang="en-US" smtClean="0"/>
-              <a:pPr>
-                <a:defRPr/>
-              </a:pPr>
-              <a:t>8</a:t>
             </a:fld>
             <a:endParaRPr lang="en-US"/>
           </a:p>
@@ -10916,13 +10438,7 @@
       </p:sp>
       <p:sp>
         <p:nvSpPr>
-          <p:cNvPr id="15" name="Content Placeholder 14">
-            <a:extLst>
-              <a:ext uri="{FF2B5EF4-FFF2-40B4-BE49-F238E27FC236}">
-                <a16:creationId xmlns:a16="http://schemas.microsoft.com/office/drawing/2014/main" id="{3362D711-46F2-6BA8-E00C-474A705E01F6}"/>
-              </a:ext>
-            </a:extLst>
-          </p:cNvPr>
+          <p:cNvPr id="15" name="Content Placeholder 14"/>
           <p:cNvSpPr>
             <a:spLocks noGrp="1"/>
           </p:cNvSpPr>
@@ -10942,6 +10458,10 @@
               </a:rPr>
               <a:t>PROPOSED METHODOLOGY </a:t>
             </a:r>
+            <a:endParaRPr lang="en-US" dirty="0">
+              <a:latin typeface="Times New Roman" panose="02020603050405020304" pitchFamily="18" charset="0"/>
+              <a:cs typeface="Times New Roman" panose="02020603050405020304" pitchFamily="18" charset="0"/>
+            </a:endParaRPr>
           </a:p>
           <a:p>
             <a:r>
@@ -10951,6 +10471,10 @@
               </a:rPr>
               <a:t>&amp; CONCEPT DIAGRAM </a:t>
             </a:r>
+            <a:endParaRPr lang="en-US" dirty="0">
+              <a:latin typeface="Times New Roman" panose="02020603050405020304" pitchFamily="18" charset="0"/>
+              <a:cs typeface="Times New Roman" panose="02020603050405020304" pitchFamily="18" charset="0"/>
+            </a:endParaRPr>
           </a:p>
           <a:p>
             <a:endParaRPr lang="en-US" dirty="0"/>
@@ -10959,13 +10483,7 @@
       </p:sp>
       <p:sp>
         <p:nvSpPr>
-          <p:cNvPr id="17" name="Rectangle 16">
-            <a:extLst>
-              <a:ext uri="{FF2B5EF4-FFF2-40B4-BE49-F238E27FC236}">
-                <a16:creationId xmlns:a16="http://schemas.microsoft.com/office/drawing/2014/main" id="{494792DD-121B-A163-B0D3-0C1C013E079C}"/>
-              </a:ext>
-            </a:extLst>
-          </p:cNvPr>
+          <p:cNvPr id="17" name="Rectangle 16"/>
           <p:cNvSpPr/>
           <p:nvPr/>
         </p:nvSpPr>
@@ -11008,20 +10526,14 @@
       </p:sp>
       <p:pic>
         <p:nvPicPr>
-          <p:cNvPr id="10" name="Picture 9">
-            <a:extLst>
-              <a:ext uri="{FF2B5EF4-FFF2-40B4-BE49-F238E27FC236}">
-                <a16:creationId xmlns:a16="http://schemas.microsoft.com/office/drawing/2014/main" id="{A0C469A7-B530-361F-C725-B1155D800311}"/>
-              </a:ext>
-            </a:extLst>
-          </p:cNvPr>
+          <p:cNvPr id="10" name="Picture 9"/>
           <p:cNvPicPr>
             <a:picLocks noChangeAspect="1"/>
           </p:cNvPicPr>
           <p:nvPr/>
         </p:nvPicPr>
         <p:blipFill>
-          <a:blip r:embed="rId3">
+          <a:blip r:embed="rId1">
             <a:extLst>
               <a:ext uri="{28A0092B-C50C-407E-A947-70E740481C1C}">
                 <a14:useLocalDpi xmlns:a14="http://schemas.microsoft.com/office/drawing/2010/main" val="0"/>
@@ -11043,11 +10555,6 @@
         </p:spPr>
       </p:pic>
     </p:spTree>
-    <p:extLst>
-      <p:ext uri="{BB962C8B-B14F-4D97-AF65-F5344CB8AC3E}">
-        <p14:creationId xmlns:p14="http://schemas.microsoft.com/office/powerpoint/2010/main" val="491290833"/>
-      </p:ext>
-    </p:extLst>
   </p:cSld>
   <p:clrMapOvr>
     <a:masterClrMapping/>
@@ -11074,13 +10581,7 @@
       </p:grpSpPr>
       <p:sp>
         <p:nvSpPr>
-          <p:cNvPr id="2" name="Rectangle 1">
-            <a:extLst>
-              <a:ext uri="{FF2B5EF4-FFF2-40B4-BE49-F238E27FC236}">
-                <a16:creationId xmlns:a16="http://schemas.microsoft.com/office/drawing/2014/main" id="{152CF1B9-0F14-2EAD-AB2B-9557E8695D45}"/>
-              </a:ext>
-            </a:extLst>
-          </p:cNvPr>
+          <p:cNvPr id="2" name="Rectangle 1"/>
           <p:cNvSpPr/>
           <p:nvPr/>
         </p:nvSpPr>
@@ -11141,10 +10642,6 @@
             </a:pPr>
             <a:fld id="{EED0D648-989B-4034-9BD3-6FBF9A769E5B}" type="slidenum">
               <a:rPr lang="en-US" smtClean="0"/>
-              <a:pPr>
-                <a:defRPr/>
-              </a:pPr>
-              <a:t>9</a:t>
             </a:fld>
             <a:endParaRPr lang="en-US"/>
           </a:p>
@@ -11152,13 +10649,7 @@
       </p:sp>
       <p:sp>
         <p:nvSpPr>
-          <p:cNvPr id="6" name="TextBox 5">
-            <a:extLst>
-              <a:ext uri="{FF2B5EF4-FFF2-40B4-BE49-F238E27FC236}">
-                <a16:creationId xmlns:a16="http://schemas.microsoft.com/office/drawing/2014/main" id="{423932A5-468D-E506-F342-558D5C048AE4}"/>
-              </a:ext>
-            </a:extLst>
-          </p:cNvPr>
+          <p:cNvPr id="6" name="TextBox 5"/>
           <p:cNvSpPr txBox="1"/>
           <p:nvPr/>
         </p:nvSpPr>
@@ -11185,18 +10676,16 @@
               </a:rPr>
               <a:t>SYSTEM REQUIREMENTS</a:t>
             </a:r>
-          </a:p>
-        </p:txBody>
-      </p:sp>
-      <p:sp>
-        <p:nvSpPr>
-          <p:cNvPr id="9" name="Content Placeholder 8">
-            <a:extLst>
-              <a:ext uri="{FF2B5EF4-FFF2-40B4-BE49-F238E27FC236}">
-                <a16:creationId xmlns:a16="http://schemas.microsoft.com/office/drawing/2014/main" id="{E8636D79-2F68-5F7F-0A5C-9B7D2A7D72D6}"/>
-              </a:ext>
-            </a:extLst>
-          </p:cNvPr>
+            <a:endParaRPr lang="en-US" sz="2000" dirty="0">
+              <a:latin typeface="Times New Roman" panose="02020603050405020304" pitchFamily="18" charset="0"/>
+              <a:cs typeface="Times New Roman" panose="02020603050405020304" pitchFamily="18" charset="0"/>
+            </a:endParaRPr>
+          </a:p>
+        </p:txBody>
+      </p:sp>
+      <p:sp>
+        <p:nvSpPr>
+          <p:cNvPr id="9" name="Content Placeholder 8"/>
           <p:cNvSpPr>
             <a:spLocks noGrp="1"/>
           </p:cNvSpPr>
@@ -11242,7 +10731,7 @@
               <a:spcBef>
                 <a:spcPts val="600"/>
               </a:spcBef>
-              <a:buFont typeface="Wingdings" pitchFamily="2" charset="2"/>
+              <a:buFont typeface="Wingdings" panose="05000000000000000000" pitchFamily="2" charset="2"/>
               <a:buChar char="§"/>
             </a:pPr>
             <a:r>
@@ -11268,7 +10757,7 @@
               <a:spcBef>
                 <a:spcPts val="600"/>
               </a:spcBef>
-              <a:buFont typeface="Wingdings" pitchFamily="2" charset="2"/>
+              <a:buFont typeface="Wingdings" panose="05000000000000000000" pitchFamily="2" charset="2"/>
               <a:buChar char="§"/>
             </a:pPr>
             <a:r>
@@ -11294,7 +10783,7 @@
               <a:spcBef>
                 <a:spcPts val="600"/>
               </a:spcBef>
-              <a:buFont typeface="Wingdings" pitchFamily="2" charset="2"/>
+              <a:buFont typeface="Wingdings" panose="05000000000000000000" pitchFamily="2" charset="2"/>
               <a:buChar char="§"/>
             </a:pPr>
             <a:r>
@@ -11320,7 +10809,7 @@
               <a:spcBef>
                 <a:spcPts val="600"/>
               </a:spcBef>
-              <a:buFont typeface="Wingdings" pitchFamily="2" charset="2"/>
+              <a:buFont typeface="Wingdings" panose="05000000000000000000" pitchFamily="2" charset="2"/>
               <a:buChar char="§"/>
             </a:pPr>
             <a:r>
@@ -11346,7 +10835,7 @@
               <a:spcBef>
                 <a:spcPts val="600"/>
               </a:spcBef>
-              <a:buFont typeface="Wingdings" pitchFamily="2" charset="2"/>
+              <a:buFont typeface="Wingdings" panose="05000000000000000000" pitchFamily="2" charset="2"/>
               <a:buChar char="§"/>
             </a:pPr>
             <a:r>
@@ -11372,7 +10861,7 @@
               <a:spcBef>
                 <a:spcPts val="600"/>
               </a:spcBef>
-              <a:buFont typeface="Wingdings" pitchFamily="2" charset="2"/>
+              <a:buFont typeface="Wingdings" panose="05000000000000000000" pitchFamily="2" charset="2"/>
               <a:buChar char="§"/>
             </a:pPr>
             <a:r>
@@ -11385,6 +10874,13 @@
               </a:rPr>
               <a:t>Internet access and support</a:t>
             </a:r>
+            <a:endParaRPr lang="en-US" sz="1600" dirty="0">
+              <a:solidFill>
+                <a:schemeClr val="tx1"/>
+              </a:solidFill>
+              <a:latin typeface="Times New Roman" panose="02020603050405020304" pitchFamily="18" charset="0"/>
+              <a:cs typeface="Times New Roman" panose="02020603050405020304" pitchFamily="18" charset="0"/>
+            </a:endParaRPr>
           </a:p>
           <a:p>
             <a:pPr marL="0" lvl="1" indent="0" algn="just" fontAlgn="base">
@@ -11502,7 +10998,7 @@
             <a:endParaRPr lang="en-US" dirty="0"/>
           </a:p>
           <a:p>
-            <a:pPr marL="201168" lvl="1" indent="0" algn="just">
+            <a:pPr marL="201295" lvl="1" indent="0" algn="just">
               <a:spcBef>
                 <a:spcPts val="1200"/>
               </a:spcBef>
@@ -11554,13 +11050,7 @@
       </p:sp>
       <p:sp>
         <p:nvSpPr>
-          <p:cNvPr id="11" name="TextBox 10">
-            <a:extLst>
-              <a:ext uri="{FF2B5EF4-FFF2-40B4-BE49-F238E27FC236}">
-                <a16:creationId xmlns:a16="http://schemas.microsoft.com/office/drawing/2014/main" id="{4FAE9A85-E2C3-1CFA-173E-F01D5083E5A9}"/>
-              </a:ext>
-            </a:extLst>
-          </p:cNvPr>
+          <p:cNvPr id="11" name="TextBox 10"/>
           <p:cNvSpPr txBox="1"/>
           <p:nvPr/>
         </p:nvSpPr>
@@ -11603,7 +11093,7 @@
               <a:buClr>
                 <a:schemeClr val="accent1"/>
               </a:buClr>
-              <a:buFont typeface="Wingdings" pitchFamily="2" charset="2"/>
+              <a:buFont typeface="Wingdings" panose="05000000000000000000" pitchFamily="2" charset="2"/>
               <a:buChar char="§"/>
             </a:pPr>
             <a:r>
@@ -11613,6 +11103,10 @@
               </a:rPr>
               <a:t>A fully functional system capable of suggesting recipes based on users’ nutritional requirements and preferences.</a:t>
             </a:r>
+            <a:endParaRPr lang="en-IN" sz="1600" dirty="0">
+              <a:latin typeface="Times New Roman" panose="02020603050405020304" pitchFamily="18" charset="0"/>
+              <a:cs typeface="Times New Roman" panose="02020603050405020304" pitchFamily="18" charset="0"/>
+            </a:endParaRPr>
           </a:p>
           <a:p>
             <a:pPr marL="0" lvl="1" indent="-182880" algn="just" defTabSz="914400" fontAlgn="base">
@@ -11625,7 +11119,7 @@
               <a:buClr>
                 <a:schemeClr val="accent1"/>
               </a:buClr>
-              <a:buFont typeface="Wingdings" pitchFamily="2" charset="2"/>
+              <a:buFont typeface="Wingdings" panose="05000000000000000000" pitchFamily="2" charset="2"/>
               <a:buChar char="§"/>
             </a:pPr>
             <a:r>
@@ -11635,6 +11129,10 @@
               </a:rPr>
               <a:t>Verified authentication system to secure user’s data against theft.</a:t>
             </a:r>
+            <a:endParaRPr lang="en-IN" sz="1600" dirty="0">
+              <a:latin typeface="Times New Roman" panose="02020603050405020304" pitchFamily="18" charset="0"/>
+              <a:cs typeface="Times New Roman" panose="02020603050405020304" pitchFamily="18" charset="0"/>
+            </a:endParaRPr>
           </a:p>
           <a:p>
             <a:pPr marL="0" lvl="1" indent="-182880" algn="just" defTabSz="914400" fontAlgn="base">
@@ -11647,7 +11145,7 @@
               <a:buClr>
                 <a:schemeClr val="accent1"/>
               </a:buClr>
-              <a:buFont typeface="Wingdings" pitchFamily="2" charset="2"/>
+              <a:buFont typeface="Wingdings" panose="05000000000000000000" pitchFamily="2" charset="2"/>
               <a:buChar char="§"/>
             </a:pPr>
             <a:r>
@@ -11657,6 +11155,10 @@
               </a:rPr>
               <a:t>Attractive and simple UI/UX for interaction.</a:t>
             </a:r>
+            <a:endParaRPr lang="en-IN" sz="1600" dirty="0">
+              <a:latin typeface="Times New Roman" panose="02020603050405020304" pitchFamily="18" charset="0"/>
+              <a:cs typeface="Times New Roman" panose="02020603050405020304" pitchFamily="18" charset="0"/>
+            </a:endParaRPr>
           </a:p>
           <a:p>
             <a:pPr marL="0" lvl="1" indent="-182880" algn="just" defTabSz="914400" fontAlgn="base">
@@ -11669,7 +11171,7 @@
               <a:buClr>
                 <a:schemeClr val="accent1"/>
               </a:buClr>
-              <a:buFont typeface="Wingdings" pitchFamily="2" charset="2"/>
+              <a:buFont typeface="Wingdings" panose="05000000000000000000" pitchFamily="2" charset="2"/>
               <a:buChar char="§"/>
             </a:pPr>
             <a:r>
@@ -11679,6 +11181,10 @@
               </a:rPr>
               <a:t>Inputs from the user about their nutritional profile and their preferences.</a:t>
             </a:r>
+            <a:endParaRPr lang="en-IN" sz="1600" dirty="0">
+              <a:latin typeface="Times New Roman" panose="02020603050405020304" pitchFamily="18" charset="0"/>
+              <a:cs typeface="Times New Roman" panose="02020603050405020304" pitchFamily="18" charset="0"/>
+            </a:endParaRPr>
           </a:p>
           <a:p>
             <a:pPr marL="0" lvl="1" indent="-182880" algn="just" defTabSz="914400" fontAlgn="base">
@@ -11691,7 +11197,7 @@
               <a:buClr>
                 <a:schemeClr val="accent1"/>
               </a:buClr>
-              <a:buFont typeface="Wingdings" pitchFamily="2" charset="2"/>
+              <a:buFont typeface="Wingdings" panose="05000000000000000000" pitchFamily="2" charset="2"/>
               <a:buChar char="§"/>
             </a:pPr>
             <a:r>
@@ -11701,6 +11207,10 @@
               </a:rPr>
               <a:t>User systems capable of handling and running complex mathematical tasks on-premise.</a:t>
             </a:r>
+            <a:endParaRPr lang="en-IN" sz="1600" dirty="0">
+              <a:latin typeface="Times New Roman" panose="02020603050405020304" pitchFamily="18" charset="0"/>
+              <a:cs typeface="Times New Roman" panose="02020603050405020304" pitchFamily="18" charset="0"/>
+            </a:endParaRPr>
           </a:p>
           <a:p>
             <a:pPr algn="just"/>
@@ -11736,7 +11246,7 @@
               <a:buClr>
                 <a:schemeClr val="accent1"/>
               </a:buClr>
-              <a:buFont typeface="Wingdings" pitchFamily="2" charset="2"/>
+              <a:buFont typeface="Wingdings" panose="05000000000000000000" pitchFamily="2" charset="2"/>
               <a:buChar char="§"/>
             </a:pPr>
             <a:r>
@@ -11746,6 +11256,10 @@
               </a:rPr>
               <a:t>Reliable application with strong recovery pipelines when an error is encountered.</a:t>
             </a:r>
+            <a:endParaRPr lang="en-IN" sz="1600" dirty="0">
+              <a:latin typeface="Times New Roman" panose="02020603050405020304" pitchFamily="18" charset="0"/>
+              <a:cs typeface="Times New Roman" panose="02020603050405020304" pitchFamily="18" charset="0"/>
+            </a:endParaRPr>
           </a:p>
           <a:p>
             <a:pPr marL="0" lvl="1" indent="-182880" algn="just" defTabSz="914400" fontAlgn="base">
@@ -11761,7 +11275,7 @@
               <a:buClr>
                 <a:schemeClr val="accent1"/>
               </a:buClr>
-              <a:buFont typeface="Wingdings" pitchFamily="2" charset="2"/>
+              <a:buFont typeface="Wingdings" panose="05000000000000000000" pitchFamily="2" charset="2"/>
               <a:buChar char="§"/>
             </a:pPr>
             <a:r>
@@ -11771,6 +11285,10 @@
               </a:rPr>
               <a:t>Scalable application as the user base grows.</a:t>
             </a:r>
+            <a:endParaRPr lang="en-IN" sz="1600" dirty="0">
+              <a:latin typeface="Times New Roman" panose="02020603050405020304" pitchFamily="18" charset="0"/>
+              <a:cs typeface="Times New Roman" panose="02020603050405020304" pitchFamily="18" charset="0"/>
+            </a:endParaRPr>
           </a:p>
           <a:p>
             <a:pPr marL="0" lvl="1" indent="-182880" algn="just" defTabSz="914400" fontAlgn="base">
@@ -11786,7 +11304,7 @@
               <a:buClr>
                 <a:schemeClr val="accent1"/>
               </a:buClr>
-              <a:buFont typeface="Wingdings" pitchFamily="2" charset="2"/>
+              <a:buFont typeface="Wingdings" panose="05000000000000000000" pitchFamily="2" charset="2"/>
               <a:buChar char="§"/>
             </a:pPr>
             <a:r>
@@ -11796,6 +11314,10 @@
               </a:rPr>
               <a:t>Consistent responses for similar inputs.</a:t>
             </a:r>
+            <a:endParaRPr lang="en-IN" sz="1600" dirty="0">
+              <a:latin typeface="Times New Roman" panose="02020603050405020304" pitchFamily="18" charset="0"/>
+              <a:cs typeface="Times New Roman" panose="02020603050405020304" pitchFamily="18" charset="0"/>
+            </a:endParaRPr>
           </a:p>
           <a:p>
             <a:pPr marL="0" lvl="1" indent="-182880" algn="just" defTabSz="914400" fontAlgn="base">
@@ -11811,7 +11333,7 @@
               <a:buClr>
                 <a:schemeClr val="accent1"/>
               </a:buClr>
-              <a:buFont typeface="Wingdings" pitchFamily="2" charset="2"/>
+              <a:buFont typeface="Wingdings" panose="05000000000000000000" pitchFamily="2" charset="2"/>
               <a:buChar char="§"/>
             </a:pPr>
             <a:r>
@@ -11821,21 +11343,17 @@
               </a:rPr>
               <a:t>Traceable solution for logging mechanisms.</a:t>
             </a:r>
+            <a:endParaRPr lang="en-IN" sz="1600" dirty="0">
+              <a:latin typeface="Times New Roman" panose="02020603050405020304" pitchFamily="18" charset="0"/>
+              <a:cs typeface="Times New Roman" panose="02020603050405020304" pitchFamily="18" charset="0"/>
+            </a:endParaRPr>
           </a:p>
         </p:txBody>
       </p:sp>
       <p:cxnSp>
         <p:nvCxnSpPr>
-          <p:cNvPr id="7" name="Straight Connector 6">
-            <a:extLst>
-              <a:ext uri="{FF2B5EF4-FFF2-40B4-BE49-F238E27FC236}">
-                <a16:creationId xmlns:a16="http://schemas.microsoft.com/office/drawing/2014/main" id="{0E6B4C9A-3B86-FAD9-166F-58A92049A51C}"/>
-              </a:ext>
-            </a:extLst>
-          </p:cNvPr>
-          <p:cNvCxnSpPr>
-            <a:cxnSpLocks/>
-          </p:cNvCxnSpPr>
+          <p:cNvPr id="7" name="Straight Connector 6"/>
+          <p:cNvCxnSpPr/>
           <p:nvPr/>
         </p:nvCxnSpPr>
         <p:spPr>
@@ -11871,11 +11389,6 @@
         </p:style>
       </p:cxnSp>
     </p:spTree>
-    <p:extLst>
-      <p:ext uri="{BB962C8B-B14F-4D97-AF65-F5344CB8AC3E}">
-        <p14:creationId xmlns:p14="http://schemas.microsoft.com/office/powerpoint/2010/main" val="2690875661"/>
-      </p:ext>
-    </p:extLst>
   </p:cSld>
   <p:clrMapOvr>
     <a:masterClrMapping/>
@@ -12156,11 +11669,9 @@
       </a:bgFillStyleLst>
     </a:fmtScheme>
   </a:themeElements>
-  <a:objectDefaults/>
-  <a:extraClrSchemeLst/>
   <a:extLst>
     <a:ext uri="{05A4C25C-085E-4340-85A3-A5531E510DB2}">
-      <thm15:themeFamily xmlns:thm15="http://schemas.microsoft.com/office/thememl/2012/main" name="Retrospect" id="{5F128B03-DCCA-4EEB-AB3B-CF2899314A46}" vid="{3F1AAB62-24C6-49D2-8E01-B56FAC9A3DCD}"/>
+      <thm15:themeFamily xmlns:thm15="http://schemas.microsoft.com/office/thememl/2012/main" name="Office Theme" id="{62F939B6-93AF-4DB8-9C6B-D6C7DFDC589F}" vid="{4A3C46E8-61CC-4603-A589-7422A47A8E4A}"/>
     </a:ext>
   </a:extLst>
 </a:theme>
@@ -12242,23 +11753,6 @@
         <a:font script="Viet" typeface="Times New Roman"/>
         <a:font script="Uigh" typeface="Microsoft Uighur"/>
         <a:font script="Geor" typeface="Sylfaen"/>
-        <a:font script="Armn" typeface="Arial"/>
-        <a:font script="Bugi" typeface="Leelawadee UI"/>
-        <a:font script="Bopo" typeface="Microsoft JhengHei"/>
-        <a:font script="Java" typeface="Javanese Text"/>
-        <a:font script="Lisu" typeface="Segoe UI"/>
-        <a:font script="Mymr" typeface="Myanmar Text"/>
-        <a:font script="Nkoo" typeface="Ebrima"/>
-        <a:font script="Olck" typeface="Nirmala UI"/>
-        <a:font script="Osma" typeface="Ebrima"/>
-        <a:font script="Phag" typeface="Phagspa"/>
-        <a:font script="Syrn" typeface="Estrangelo Edessa"/>
-        <a:font script="Syrj" typeface="Estrangelo Edessa"/>
-        <a:font script="Syre" typeface="Estrangelo Edessa"/>
-        <a:font script="Sora" typeface="Nirmala UI"/>
-        <a:font script="Tale" typeface="Microsoft Tai Le"/>
-        <a:font script="Talu" typeface="Microsoft New Tai Lue"/>
-        <a:font script="Tfng" typeface="Ebrima"/>
       </a:majorFont>
       <a:minorFont>
         <a:latin typeface="Calibri"/>
@@ -12294,23 +11788,6 @@
         <a:font script="Viet" typeface="Arial"/>
         <a:font script="Uigh" typeface="Microsoft Uighur"/>
         <a:font script="Geor" typeface="Sylfaen"/>
-        <a:font script="Armn" typeface="Arial"/>
-        <a:font script="Bugi" typeface="Leelawadee UI"/>
-        <a:font script="Bopo" typeface="Microsoft JhengHei"/>
-        <a:font script="Java" typeface="Javanese Text"/>
-        <a:font script="Lisu" typeface="Segoe UI"/>
-        <a:font script="Mymr" typeface="Myanmar Text"/>
-        <a:font script="Nkoo" typeface="Ebrima"/>
-        <a:font script="Olck" typeface="Nirmala UI"/>
-        <a:font script="Osma" typeface="Ebrima"/>
-        <a:font script="Phag" typeface="Phagspa"/>
-        <a:font script="Syrn" typeface="Estrangelo Edessa"/>
-        <a:font script="Syrj" typeface="Estrangelo Edessa"/>
-        <a:font script="Syre" typeface="Estrangelo Edessa"/>
-        <a:font script="Sora" typeface="Nirmala UI"/>
-        <a:font script="Tale" typeface="Microsoft Tai Le"/>
-        <a:font script="Talu" typeface="Microsoft New Tai Lue"/>
-        <a:font script="Tfng" typeface="Ebrima"/>
       </a:minorFont>
     </a:fontScheme>
     <a:fmtScheme name="Office">
@@ -12451,8 +11928,6 @@
       </a:bgFillStyleLst>
     </a:fmtScheme>
   </a:themeElements>
-  <a:objectDefaults/>
-  <a:extraClrSchemeLst/>
   <a:extLst>
     <a:ext uri="{05A4C25C-085E-4340-85A3-A5531E510DB2}">
       <thm15:themeFamily xmlns:thm15="http://schemas.microsoft.com/office/thememl/2012/main" name="Office Theme" id="{62F939B6-93AF-4DB8-9C6B-D6C7DFDC589F}" vid="{4A3C46E8-61CC-4603-A589-7422A47A8E4A}"/>

</xml_diff>